<commit_message>
finalizing ppt for segment 1
</commit_message>
<xml_diff>
--- a/FK_HL_Model_Remake.pptx
+++ b/FK_HL_Model_Remake.pptx
@@ -9073,8 +9073,8 @@
         </p:nvSpPr>
         <p:spPr>
           <a:xfrm rot="-900000">
-            <a:off x="4963060" y="2468045"/>
-            <a:ext cx="2646878" cy="923330"/>
+            <a:off x="3456773" y="1545162"/>
+            <a:ext cx="5996920" cy="2585323"/>
           </a:xfrm>
           <a:prstGeom prst="rect">
             <a:avLst/>
@@ -9082,13 +9082,13 @@
           <a:noFill/>
         </p:spPr>
         <p:txBody>
-          <a:bodyPr wrap="none" rtlCol="0">
+          <a:bodyPr wrap="square" rtlCol="0">
             <a:spAutoFit/>
           </a:bodyPr>
           <a:lstStyle/>
           <a:p>
             <a:r>
-              <a:rPr lang="en-US" sz="5400" b="1" dirty="0">
+              <a:rPr lang="en-US" sz="5400" b="1" dirty="0" smtClean="0">
                 <a:solidFill>
                   <a:schemeClr val="bg1">
                     <a:alpha val="75000"/>
@@ -9096,8 +9096,29 @@
                 </a:solidFill>
                 <a:latin typeface="+mj-lt"/>
               </a:rPr>
-              <a:t>Sample</a:t>
-            </a:r>
+              <a:t>Plan to put some </a:t>
+            </a:r>
+          </a:p>
+          <a:p>
+            <a:r>
+              <a:rPr lang="en-US" sz="5400" b="1" dirty="0" smtClean="0">
+                <a:solidFill>
+                  <a:schemeClr val="bg1">
+                    <a:alpha val="75000"/>
+                  </a:schemeClr>
+                </a:solidFill>
+                <a:latin typeface="+mj-lt"/>
+              </a:rPr>
+              <a:t>Relative picture here</a:t>
+            </a:r>
+            <a:endParaRPr lang="en-US" sz="5400" b="1" dirty="0">
+              <a:solidFill>
+                <a:schemeClr val="bg1">
+                  <a:alpha val="75000"/>
+                </a:schemeClr>
+              </a:solidFill>
+              <a:latin typeface="+mj-lt"/>
+            </a:endParaRPr>
           </a:p>
         </p:txBody>
       </p:sp>

</xml_diff>

<commit_message>
updating recovery calculation files
</commit_message>
<xml_diff>
--- a/FK_HL_Model_Remake.pptx
+++ b/FK_HL_Model_Remake.pptx
@@ -5,18 +5,21 @@
     <p:sldMasterId id="2147483660" r:id="rId4"/>
   </p:sldMasterIdLst>
   <p:notesMasterIdLst>
-    <p:notesMasterId r:id="rId14"/>
+    <p:notesMasterId r:id="rId17"/>
   </p:notesMasterIdLst>
   <p:sldIdLst>
     <p:sldId id="285" r:id="rId5"/>
     <p:sldId id="275" r:id="rId6"/>
     <p:sldId id="262" r:id="rId7"/>
-    <p:sldId id="257" r:id="rId8"/>
-    <p:sldId id="305" r:id="rId9"/>
-    <p:sldId id="258" r:id="rId10"/>
-    <p:sldId id="259" r:id="rId11"/>
-    <p:sldId id="263" r:id="rId12"/>
-    <p:sldId id="268" r:id="rId13"/>
+    <p:sldId id="306" r:id="rId8"/>
+    <p:sldId id="257" r:id="rId9"/>
+    <p:sldId id="305" r:id="rId10"/>
+    <p:sldId id="258" r:id="rId11"/>
+    <p:sldId id="259" r:id="rId12"/>
+    <p:sldId id="307" r:id="rId13"/>
+    <p:sldId id="308" r:id="rId14"/>
+    <p:sldId id="263" r:id="rId15"/>
+    <p:sldId id="268" r:id="rId16"/>
   </p:sldIdLst>
   <p:sldSz cx="9144000" cy="5143500" type="screen16x9"/>
   <p:notesSz cx="6858000" cy="9144000"/>
@@ -205,7 +208,7 @@
           <a:p>
             <a:fld id="{21164539-4278-BE42-8F61-4C94F5FD0226}" type="datetimeFigureOut">
               <a:rPr lang="en-US" smtClean="0"/>
-              <a:t>7/11/2021</a:t>
+              <a:t>7/23/2021</a:t>
             </a:fld>
             <a:endParaRPr lang="en-US"/>
           </a:p>
@@ -621,7 +624,7 @@
           <a:p>
             <a:fld id="{819D4EE1-14A9-CE4B-823B-CB2A32A8C395}" type="slidenum">
               <a:rPr lang="en-US" smtClean="0"/>
-              <a:t>8</a:t>
+              <a:t>11</a:t>
             </a:fld>
             <a:endParaRPr lang="en-US"/>
           </a:p>
@@ -840,7 +843,7 @@
           <a:p>
             <a:fld id="{C6689B86-083C-4A42-8888-BAB16E4B4DA7}" type="datetime4">
               <a:rPr lang="en-CA" smtClean="0"/>
-              <a:t>July 11, 2021</a:t>
+              <a:t>July 23, 2021</a:t>
             </a:fld>
             <a:endParaRPr lang="en-US" dirty="0"/>
           </a:p>
@@ -1015,7 +1018,7 @@
           <a:p>
             <a:fld id="{8EC16C23-3C30-CD46-877E-3E22753DE2DD}" type="datetime4">
               <a:rPr lang="en-CA" smtClean="0"/>
-              <a:t>July 11, 2021</a:t>
+              <a:t>July 23, 2021</a:t>
             </a:fld>
             <a:endParaRPr lang="en-US" dirty="0"/>
           </a:p>
@@ -1362,7 +1365,7 @@
           <a:p>
             <a:fld id="{18DAA47B-4062-2645-ADD8-10E70E79D0BB}" type="datetime4">
               <a:rPr lang="en-CA" smtClean="0"/>
-              <a:t>July 11, 2021</a:t>
+              <a:t>July 23, 2021</a:t>
             </a:fld>
             <a:endParaRPr lang="en-US" dirty="0"/>
           </a:p>
@@ -1776,7 +1779,7 @@
           <a:p>
             <a:fld id="{10E38F1C-BEA5-784A-83C8-5B6DC70122C6}" type="datetime4">
               <a:rPr lang="en-CA" smtClean="0"/>
-              <a:t>July 11, 2021</a:t>
+              <a:t>July 23, 2021</a:t>
             </a:fld>
             <a:endParaRPr lang="en-US" dirty="0"/>
           </a:p>
@@ -2297,7 +2300,7 @@
           <a:p>
             <a:fld id="{685E96B0-41DE-F440-80BA-6CFE5B0D6B94}" type="datetime4">
               <a:rPr lang="en-CA" smtClean="0"/>
-              <a:t>July 11, 2021</a:t>
+              <a:t>July 23, 2021</a:t>
             </a:fld>
             <a:endParaRPr lang="en-US"/>
           </a:p>
@@ -2688,7 +2691,7 @@
           <a:p>
             <a:fld id="{8FDE5476-5569-604A-8A87-08C5982958A2}" type="datetime4">
               <a:rPr lang="en-CA" smtClean="0"/>
-              <a:t>July 11, 2021</a:t>
+              <a:t>July 23, 2021</a:t>
             </a:fld>
             <a:endParaRPr lang="en-US" dirty="0"/>
           </a:p>
@@ -2907,7 +2910,7 @@
           <a:p>
             <a:fld id="{E7C71A3B-F3C1-4447-8716-2DA1915E9000}" type="datetime4">
               <a:rPr lang="en-CA" smtClean="0"/>
-              <a:t>July 11, 2021</a:t>
+              <a:t>July 23, 2021</a:t>
             </a:fld>
             <a:endParaRPr lang="en-US"/>
           </a:p>
@@ -3101,7 +3104,7 @@
           <a:p>
             <a:fld id="{788EC684-F565-6140-A5D6-DA9A9407E56E}" type="datetime4">
               <a:rPr lang="en-CA" smtClean="0"/>
-              <a:t>July 11, 2021</a:t>
+              <a:t>July 23, 2021</a:t>
             </a:fld>
             <a:endParaRPr lang="en-US"/>
           </a:p>
@@ -3632,7 +3635,7 @@
           <a:p>
             <a:fld id="{9C84DA30-0C2B-9F48-A1E1-0748AFD0DC6B}" type="datetime4">
               <a:rPr lang="en-CA" smtClean="0"/>
-              <a:t>July 11, 2021</a:t>
+              <a:t>July 23, 2021</a:t>
             </a:fld>
             <a:endParaRPr lang="en-US"/>
           </a:p>
@@ -3946,7 +3949,7 @@
           <a:p>
             <a:fld id="{BE5294DF-69CC-B446-91AB-0C6001469F63}" type="datetime4">
               <a:rPr lang="en-CA" smtClean="0"/>
-              <a:t>July 11, 2021</a:t>
+              <a:t>July 23, 2021</a:t>
             </a:fld>
             <a:endParaRPr lang="en-US"/>
           </a:p>
@@ -4125,7 +4128,7 @@
           <a:p>
             <a:fld id="{1E192792-884A-AD43-BE8E-8F1FC1D5646F}" type="datetime4">
               <a:rPr lang="en-CA" smtClean="0"/>
-              <a:t>July 11, 2021</a:t>
+              <a:t>July 23, 2021</a:t>
             </a:fld>
             <a:endParaRPr lang="en-US" dirty="0"/>
           </a:p>
@@ -4319,7 +4322,7 @@
           <a:p>
             <a:fld id="{4ABFA5F4-1252-224A-99A5-A35556FE5E1C}" type="datetime4">
               <a:rPr lang="en-CA" smtClean="0"/>
-              <a:t>July 11, 2021</a:t>
+              <a:t>July 23, 2021</a:t>
             </a:fld>
             <a:endParaRPr lang="en-US"/>
           </a:p>
@@ -4709,7 +4712,7 @@
           <a:p>
             <a:fld id="{C0814498-84C9-1446-B8F0-92F3EC01D033}" type="datetime4">
               <a:rPr lang="en-CA" smtClean="0"/>
-              <a:t>July 11, 2021</a:t>
+              <a:t>July 23, 2021</a:t>
             </a:fld>
             <a:endParaRPr lang="en-US"/>
           </a:p>
@@ -5241,7 +5244,7 @@
           <a:p>
             <a:fld id="{F8D88939-0256-8E43-94E7-E508EE61424E}" type="datetime4">
               <a:rPr lang="en-CA" smtClean="0"/>
-              <a:t>July 11, 2021</a:t>
+              <a:t>July 23, 2021</a:t>
             </a:fld>
             <a:endParaRPr lang="en-US" dirty="0"/>
           </a:p>
@@ -6443,7 +6446,7 @@
             <a:fld id="{84A601FB-51CE-0D47-9BCA-D722657D0795}" type="datetime4">
               <a:rPr lang="en-CA" smtClean="0"/>
               <a:pPr/>
-              <a:t>July 11, 2021</a:t>
+              <a:t>July 23, 2021</a:t>
             </a:fld>
             <a:endParaRPr lang="en-US" dirty="0"/>
           </a:p>
@@ -6496,6 +6499,577 @@
     <p:extLst>
       <p:ext uri="{BB962C8B-B14F-4D97-AF65-F5344CB8AC3E}">
         <p14:creationId xmlns:p14="http://schemas.microsoft.com/office/powerpoint/2010/main" val="65507504"/>
+      </p:ext>
+    </p:extLst>
+  </p:cSld>
+  <p:clrMapOvr>
+    <a:masterClrMapping/>
+  </p:clrMapOvr>
+</p:sld>
+</file>
+
+<file path=ppt/slides/slide10.xml><?xml version="1.0" encoding="utf-8"?>
+<p:sld xmlns:a="http://schemas.openxmlformats.org/drawingml/2006/main" xmlns:r="http://schemas.openxmlformats.org/officeDocument/2006/relationships" xmlns:p="http://schemas.openxmlformats.org/presentationml/2006/main">
+  <p:cSld>
+    <p:spTree>
+      <p:nvGrpSpPr>
+        <p:cNvPr id="1" name=""/>
+        <p:cNvGrpSpPr/>
+        <p:nvPr/>
+      </p:nvGrpSpPr>
+      <p:grpSpPr>
+        <a:xfrm>
+          <a:off x="0" y="0"/>
+          <a:ext cx="0" cy="0"/>
+          <a:chOff x="0" y="0"/>
+          <a:chExt cx="0" cy="0"/>
+        </a:xfrm>
+      </p:grpSpPr>
+      <p:sp>
+        <p:nvSpPr>
+          <p:cNvPr id="2" name="Title 1"/>
+          <p:cNvSpPr>
+            <a:spLocks noGrp="1"/>
+          </p:cNvSpPr>
+          <p:nvPr>
+            <p:ph type="title"/>
+          </p:nvPr>
+        </p:nvSpPr>
+        <p:spPr/>
+        <p:txBody>
+          <a:bodyPr/>
+          <a:lstStyle/>
+          <a:p>
+            <a:r>
+              <a:rPr lang="en-US" dirty="0" smtClean="0"/>
+              <a:t>Data analysis</a:t>
+            </a:r>
+            <a:endParaRPr lang="en-US" dirty="0"/>
+          </a:p>
+        </p:txBody>
+      </p:sp>
+      <p:sp>
+        <p:nvSpPr>
+          <p:cNvPr id="3" name="Date Placeholder 2"/>
+          <p:cNvSpPr>
+            <a:spLocks noGrp="1"/>
+          </p:cNvSpPr>
+          <p:nvPr>
+            <p:ph type="dt" sz="half" idx="10"/>
+          </p:nvPr>
+        </p:nvSpPr>
+        <p:spPr/>
+        <p:txBody>
+          <a:bodyPr/>
+          <a:lstStyle/>
+          <a:p>
+            <a:fld id="{49FF2BEF-23C6-5D43-816C-81833513DDC1}" type="datetime4">
+              <a:rPr lang="en-CA" smtClean="0"/>
+              <a:pPr/>
+              <a:t>July 23, 2021</a:t>
+            </a:fld>
+            <a:endParaRPr lang="en-US"/>
+          </a:p>
+        </p:txBody>
+      </p:sp>
+      <p:sp>
+        <p:nvSpPr>
+          <p:cNvPr id="7" name="Footer Placeholder 6"/>
+          <p:cNvSpPr>
+            <a:spLocks noGrp="1"/>
+          </p:cNvSpPr>
+          <p:nvPr>
+            <p:ph type="ftr" sz="quarter" idx="11"/>
+          </p:nvPr>
+        </p:nvSpPr>
+        <p:spPr/>
+        <p:txBody>
+          <a:bodyPr/>
+          <a:lstStyle/>
+          <a:p>
+            <a:endParaRPr lang="en-US"/>
+          </a:p>
+        </p:txBody>
+      </p:sp>
+      <p:sp>
+        <p:nvSpPr>
+          <p:cNvPr id="6" name="Slide Number Placeholder 5"/>
+          <p:cNvSpPr>
+            <a:spLocks noGrp="1"/>
+          </p:cNvSpPr>
+          <p:nvPr>
+            <p:ph type="sldNum" sz="quarter" idx="12"/>
+          </p:nvPr>
+        </p:nvSpPr>
+        <p:spPr/>
+        <p:txBody>
+          <a:bodyPr/>
+          <a:lstStyle/>
+          <a:p>
+            <a:fld id="{70341EDA-DF76-394C-B359-28542C3A7753}" type="slidenum">
+              <a:rPr lang="en-US" smtClean="0"/>
+              <a:pPr/>
+              <a:t>10</a:t>
+            </a:fld>
+            <a:endParaRPr lang="en-US"/>
+          </a:p>
+        </p:txBody>
+      </p:sp>
+      <p:sp>
+        <p:nvSpPr>
+          <p:cNvPr id="4" name="Content Placeholder 3"/>
+          <p:cNvSpPr>
+            <a:spLocks noGrp="1"/>
+          </p:cNvSpPr>
+          <p:nvPr>
+            <p:ph idx="13"/>
+          </p:nvPr>
+        </p:nvSpPr>
+        <p:spPr>
+          <a:xfrm>
+            <a:off x="687600" y="1149599"/>
+            <a:ext cx="7768800" cy="3418375"/>
+          </a:xfrm>
+        </p:spPr>
+        <p:txBody>
+          <a:bodyPr/>
+          <a:lstStyle/>
+          <a:p>
+            <a:r>
+              <a:rPr lang="en-US" dirty="0" smtClean="0"/>
+              <a:t>Heap leach model data structure:</a:t>
+            </a:r>
+          </a:p>
+          <a:p>
+            <a:pPr lvl="1"/>
+            <a:r>
+              <a:rPr lang="en-US" dirty="0" smtClean="0"/>
+              <a:t>Leach cell leach date conflicts check.</a:t>
+            </a:r>
+          </a:p>
+          <a:p>
+            <a:pPr marL="685800" lvl="2" indent="0">
+              <a:buNone/>
+            </a:pPr>
+            <a:r>
+              <a:rPr lang="en-US" dirty="0" smtClean="0"/>
+              <a:t>The leaching end date of area that is on an lower elevation must be prior to the stacking finish date of area that is directly above it. The analysis uses shapely module to check if two areas overlap. If so, check the lower area’s leach end date and the upper area’s stacking finish date. Adjust the lower area’s leach end date accordingly to avoid date conflict.</a:t>
+            </a:r>
+          </a:p>
+          <a:p>
+            <a:r>
+              <a:rPr lang="en-US" dirty="0" smtClean="0"/>
+              <a:t>Geochemistry information</a:t>
+            </a:r>
+          </a:p>
+          <a:p>
+            <a:endParaRPr lang="en-US" dirty="0" smtClean="0"/>
+          </a:p>
+        </p:txBody>
+      </p:sp>
+      <p:sp>
+        <p:nvSpPr>
+          <p:cNvPr id="14" name="Text Placeholder 13"/>
+          <p:cNvSpPr>
+            <a:spLocks noGrp="1"/>
+          </p:cNvSpPr>
+          <p:nvPr>
+            <p:ph type="body" sz="quarter" idx="15"/>
+          </p:nvPr>
+        </p:nvSpPr>
+        <p:spPr/>
+        <p:txBody>
+          <a:bodyPr/>
+          <a:lstStyle/>
+          <a:p>
+            <a:r>
+              <a:rPr lang="en-US" dirty="0"/>
+              <a:t>Fort Knox Heap Leach Model Remake</a:t>
+            </a:r>
+            <a:endParaRPr lang="en-US" dirty="0"/>
+          </a:p>
+        </p:txBody>
+      </p:sp>
+    </p:spTree>
+    <p:extLst>
+      <p:ext uri="{BB962C8B-B14F-4D97-AF65-F5344CB8AC3E}">
+        <p14:creationId xmlns:p14="http://schemas.microsoft.com/office/powerpoint/2010/main" val="3483734029"/>
+      </p:ext>
+    </p:extLst>
+  </p:cSld>
+  <p:clrMapOvr>
+    <a:masterClrMapping/>
+  </p:clrMapOvr>
+</p:sld>
+</file>
+
+<file path=ppt/slides/slide11.xml><?xml version="1.0" encoding="utf-8"?>
+<p:sld xmlns:a="http://schemas.openxmlformats.org/drawingml/2006/main" xmlns:r="http://schemas.openxmlformats.org/officeDocument/2006/relationships" xmlns:p="http://schemas.openxmlformats.org/presentationml/2006/main">
+  <p:cSld>
+    <p:spTree>
+      <p:nvGrpSpPr>
+        <p:cNvPr id="1" name=""/>
+        <p:cNvGrpSpPr/>
+        <p:nvPr/>
+      </p:nvGrpSpPr>
+      <p:grpSpPr>
+        <a:xfrm>
+          <a:off x="0" y="0"/>
+          <a:ext cx="0" cy="0"/>
+          <a:chOff x="0" y="0"/>
+          <a:chExt cx="0" cy="0"/>
+        </a:xfrm>
+      </p:grpSpPr>
+      <p:pic>
+        <p:nvPicPr>
+          <p:cNvPr id="12" name="Picture Placeholder 11"/>
+          <p:cNvPicPr>
+            <a:picLocks noGrp="1" noChangeAspect="1"/>
+          </p:cNvPicPr>
+          <p:nvPr>
+            <p:ph type="pic" sz="quarter" idx="13"/>
+          </p:nvPr>
+        </p:nvPicPr>
+        <p:blipFill>
+          <a:blip r:embed="rId3" cstate="screen">
+            <a:alphaModFix amt="5000"/>
+            <a:extLst>
+              <a:ext uri="{28A0092B-C50C-407E-A947-70E740481C1C}">
+                <a14:useLocalDpi xmlns:a14="http://schemas.microsoft.com/office/drawing/2010/main"/>
+              </a:ext>
+            </a:extLst>
+          </a:blip>
+          <a:srcRect/>
+          <a:stretch>
+            <a:fillRect/>
+          </a:stretch>
+        </p:blipFill>
+        <p:spPr/>
+      </p:pic>
+      <p:sp>
+        <p:nvSpPr>
+          <p:cNvPr id="2" name="Title 1"/>
+          <p:cNvSpPr>
+            <a:spLocks noGrp="1"/>
+          </p:cNvSpPr>
+          <p:nvPr>
+            <p:ph type="title"/>
+          </p:nvPr>
+        </p:nvSpPr>
+        <p:spPr/>
+        <p:txBody>
+          <a:bodyPr/>
+          <a:lstStyle/>
+          <a:p>
+            <a:r>
+              <a:rPr lang="en-US"/>
+              <a:t>This is an alternate divider slide</a:t>
+            </a:r>
+            <a:endParaRPr lang="en-US" dirty="0"/>
+          </a:p>
+        </p:txBody>
+      </p:sp>
+      <p:sp>
+        <p:nvSpPr>
+          <p:cNvPr id="3" name="Text Placeholder 2"/>
+          <p:cNvSpPr>
+            <a:spLocks noGrp="1"/>
+          </p:cNvSpPr>
+          <p:nvPr>
+            <p:ph type="body" idx="1"/>
+          </p:nvPr>
+        </p:nvSpPr>
+        <p:spPr/>
+        <p:txBody>
+          <a:bodyPr/>
+          <a:lstStyle/>
+          <a:p>
+            <a:r>
+              <a:rPr lang="en-US" dirty="0" err="1"/>
+              <a:t>Sed</a:t>
+            </a:r>
+            <a:r>
+              <a:rPr lang="en-US" dirty="0"/>
+              <a:t> </a:t>
+            </a:r>
+            <a:r>
+              <a:rPr lang="en-US" dirty="0" err="1"/>
+              <a:t>elementum</a:t>
+            </a:r>
+            <a:r>
+              <a:rPr lang="en-US" dirty="0"/>
+              <a:t> semper </a:t>
+            </a:r>
+            <a:r>
+              <a:rPr lang="en-US" dirty="0" err="1"/>
+              <a:t>consequat</a:t>
+            </a:r>
+            <a:r>
+              <a:rPr lang="en-US" dirty="0"/>
+              <a:t>. </a:t>
+            </a:r>
+            <a:r>
+              <a:rPr lang="en-US" dirty="0" err="1"/>
+              <a:t>Donec</a:t>
+            </a:r>
+            <a:r>
+              <a:rPr lang="en-US" dirty="0"/>
+              <a:t> a quam </a:t>
+            </a:r>
+            <a:r>
+              <a:rPr lang="en-US" dirty="0" err="1"/>
+              <a:t>iaculis</a:t>
+            </a:r>
+            <a:r>
+              <a:rPr lang="en-US" dirty="0"/>
+              <a:t>, gravida ipsum </a:t>
+            </a:r>
+            <a:r>
+              <a:rPr lang="en-US" dirty="0" err="1"/>
+              <a:t>sed</a:t>
+            </a:r>
+            <a:r>
+              <a:rPr lang="en-US" dirty="0"/>
+              <a:t>, </a:t>
+            </a:r>
+            <a:r>
+              <a:rPr lang="en-US" dirty="0" err="1"/>
+              <a:t>euismod</a:t>
+            </a:r>
+            <a:r>
+              <a:rPr lang="en-US" dirty="0"/>
+              <a:t> </a:t>
+            </a:r>
+            <a:r>
+              <a:rPr lang="en-US" dirty="0" err="1"/>
+              <a:t>arcu</a:t>
+            </a:r>
+            <a:r>
+              <a:rPr lang="en-US" dirty="0"/>
+              <a:t>. </a:t>
+            </a:r>
+            <a:r>
+              <a:rPr lang="en-US" dirty="0" err="1"/>
+              <a:t>Phasellus</a:t>
+            </a:r>
+            <a:r>
+              <a:rPr lang="en-US" dirty="0"/>
+              <a:t> </a:t>
+            </a:r>
+            <a:r>
+              <a:rPr lang="en-US" dirty="0" err="1"/>
+              <a:t>tincidunt</a:t>
+            </a:r>
+            <a:r>
+              <a:rPr lang="en-US" dirty="0"/>
+              <a:t> id </a:t>
+            </a:r>
+            <a:r>
+              <a:rPr lang="en-US" dirty="0" err="1"/>
+              <a:t>metus</a:t>
+            </a:r>
+            <a:r>
+              <a:rPr lang="en-US" dirty="0"/>
+              <a:t> at </a:t>
+            </a:r>
+            <a:r>
+              <a:rPr lang="en-US" dirty="0" err="1"/>
+              <a:t>iaculis</a:t>
+            </a:r>
+            <a:r>
+              <a:rPr lang="en-US" dirty="0"/>
+              <a:t>.</a:t>
+            </a:r>
+          </a:p>
+        </p:txBody>
+      </p:sp>
+      <p:sp>
+        <p:nvSpPr>
+          <p:cNvPr id="4" name="Date Placeholder 3"/>
+          <p:cNvSpPr>
+            <a:spLocks noGrp="1"/>
+          </p:cNvSpPr>
+          <p:nvPr>
+            <p:ph type="dt" sz="half" idx="10"/>
+          </p:nvPr>
+        </p:nvSpPr>
+        <p:spPr/>
+        <p:txBody>
+          <a:bodyPr/>
+          <a:lstStyle/>
+          <a:p>
+            <a:fld id="{F78F707E-E062-5C47-A7FE-62DAAA8D2156}" type="datetime4">
+              <a:rPr lang="en-CA" smtClean="0"/>
+              <a:pPr/>
+              <a:t>July 23, 2021</a:t>
+            </a:fld>
+            <a:endParaRPr lang="en-US"/>
+          </a:p>
+        </p:txBody>
+      </p:sp>
+      <p:sp>
+        <p:nvSpPr>
+          <p:cNvPr id="6" name="Footer Placeholder 5"/>
+          <p:cNvSpPr>
+            <a:spLocks noGrp="1"/>
+          </p:cNvSpPr>
+          <p:nvPr>
+            <p:ph type="ftr" sz="quarter" idx="11"/>
+          </p:nvPr>
+        </p:nvSpPr>
+        <p:spPr/>
+        <p:txBody>
+          <a:bodyPr/>
+          <a:lstStyle/>
+          <a:p>
+            <a:endParaRPr lang="en-US"/>
+          </a:p>
+        </p:txBody>
+      </p:sp>
+      <p:sp>
+        <p:nvSpPr>
+          <p:cNvPr id="5" name="Slide Number Placeholder 4"/>
+          <p:cNvSpPr>
+            <a:spLocks noGrp="1"/>
+          </p:cNvSpPr>
+          <p:nvPr>
+            <p:ph type="sldNum" sz="quarter" idx="12"/>
+          </p:nvPr>
+        </p:nvSpPr>
+        <p:spPr/>
+        <p:txBody>
+          <a:bodyPr/>
+          <a:lstStyle/>
+          <a:p>
+            <a:fld id="{70341EDA-DF76-394C-B359-28542C3A7753}" type="slidenum">
+              <a:rPr lang="en-US" smtClean="0"/>
+              <a:pPr/>
+              <a:t>11</a:t>
+            </a:fld>
+            <a:endParaRPr lang="en-US"/>
+          </a:p>
+        </p:txBody>
+      </p:sp>
+    </p:spTree>
+    <p:extLst>
+      <p:ext uri="{BB962C8B-B14F-4D97-AF65-F5344CB8AC3E}">
+        <p14:creationId xmlns:p14="http://schemas.microsoft.com/office/powerpoint/2010/main" val="392478255"/>
+      </p:ext>
+    </p:extLst>
+  </p:cSld>
+  <p:clrMapOvr>
+    <a:masterClrMapping/>
+  </p:clrMapOvr>
+</p:sld>
+</file>
+
+<file path=ppt/slides/slide12.xml><?xml version="1.0" encoding="utf-8"?>
+<p:sld xmlns:a="http://schemas.openxmlformats.org/drawingml/2006/main" xmlns:r="http://schemas.openxmlformats.org/officeDocument/2006/relationships" xmlns:p="http://schemas.openxmlformats.org/presentationml/2006/main">
+  <p:cSld>
+    <p:spTree>
+      <p:nvGrpSpPr>
+        <p:cNvPr id="1" name=""/>
+        <p:cNvGrpSpPr/>
+        <p:nvPr/>
+      </p:nvGrpSpPr>
+      <p:grpSpPr>
+        <a:xfrm>
+          <a:off x="0" y="0"/>
+          <a:ext cx="0" cy="0"/>
+          <a:chOff x="0" y="0"/>
+          <a:chExt cx="0" cy="0"/>
+        </a:xfrm>
+      </p:grpSpPr>
+      <p:sp>
+        <p:nvSpPr>
+          <p:cNvPr id="3" name="Date Placeholder 2"/>
+          <p:cNvSpPr>
+            <a:spLocks noGrp="1"/>
+          </p:cNvSpPr>
+          <p:nvPr>
+            <p:ph type="dt" sz="half" idx="10"/>
+          </p:nvPr>
+        </p:nvSpPr>
+        <p:spPr/>
+        <p:txBody>
+          <a:bodyPr/>
+          <a:lstStyle/>
+          <a:p>
+            <a:fld id="{9FCBCA37-E9DE-A841-81BB-554CC890BCE4}" type="datetime4">
+              <a:rPr lang="en-CA" smtClean="0"/>
+              <a:pPr/>
+              <a:t>July 23, 2021</a:t>
+            </a:fld>
+            <a:endParaRPr lang="en-US"/>
+          </a:p>
+        </p:txBody>
+      </p:sp>
+      <p:sp>
+        <p:nvSpPr>
+          <p:cNvPr id="5" name="Footer Placeholder 4"/>
+          <p:cNvSpPr>
+            <a:spLocks noGrp="1"/>
+          </p:cNvSpPr>
+          <p:nvPr>
+            <p:ph type="ftr" sz="quarter" idx="11"/>
+          </p:nvPr>
+        </p:nvSpPr>
+        <p:spPr/>
+        <p:txBody>
+          <a:bodyPr/>
+          <a:lstStyle/>
+          <a:p>
+            <a:endParaRPr lang="en-US"/>
+          </a:p>
+        </p:txBody>
+      </p:sp>
+      <p:sp>
+        <p:nvSpPr>
+          <p:cNvPr id="4" name="Slide Number Placeholder 3"/>
+          <p:cNvSpPr>
+            <a:spLocks noGrp="1"/>
+          </p:cNvSpPr>
+          <p:nvPr>
+            <p:ph type="sldNum" sz="quarter" idx="12"/>
+          </p:nvPr>
+        </p:nvSpPr>
+        <p:spPr/>
+        <p:txBody>
+          <a:bodyPr/>
+          <a:lstStyle/>
+          <a:p>
+            <a:fld id="{70341EDA-DF76-394C-B359-28542C3A7753}" type="slidenum">
+              <a:rPr lang="en-US" smtClean="0"/>
+              <a:pPr/>
+              <a:t>12</a:t>
+            </a:fld>
+            <a:endParaRPr lang="en-US"/>
+          </a:p>
+        </p:txBody>
+      </p:sp>
+      <p:sp>
+        <p:nvSpPr>
+          <p:cNvPr id="6" name="Content Placeholder 5"/>
+          <p:cNvSpPr>
+            <a:spLocks noGrp="1"/>
+          </p:cNvSpPr>
+          <p:nvPr>
+            <p:ph idx="1"/>
+          </p:nvPr>
+        </p:nvSpPr>
+        <p:spPr/>
+        <p:txBody>
+          <a:bodyPr/>
+          <a:lstStyle/>
+          <a:p>
+            <a:endParaRPr lang="en-CA"/>
+          </a:p>
+        </p:txBody>
+      </p:sp>
+    </p:spTree>
+    <p:extLst>
+      <p:ext uri="{BB962C8B-B14F-4D97-AF65-F5344CB8AC3E}">
+        <p14:creationId xmlns:p14="http://schemas.microsoft.com/office/powerpoint/2010/main" val="1638810932"/>
       </p:ext>
     </p:extLst>
   </p:cSld>
@@ -6648,7 +7222,7 @@
           <a:p>
             <a:fld id="{938A8CA3-7F0C-5446-9644-486EEACF7FAF}" type="datetime4">
               <a:rPr lang="en-CA" smtClean="0"/>
-              <a:t>July 11, 2021</a:t>
+              <a:t>July 23, 2021</a:t>
             </a:fld>
             <a:endParaRPr lang="en-US"/>
           </a:p>
@@ -6782,7 +7356,7 @@
             <a:fld id="{01726941-DB26-E74E-AA79-985F679517B7}" type="datetime4">
               <a:rPr lang="en-CA" smtClean="0"/>
               <a:pPr/>
-              <a:t>July 11, 2021</a:t>
+              <a:t>July 23, 2021</a:t>
             </a:fld>
             <a:endParaRPr lang="en-US"/>
           </a:p>
@@ -6861,6 +7435,32 @@
           <a:chExt cx="0" cy="0"/>
         </a:xfrm>
       </p:grpSpPr>
+      <p:pic>
+        <p:nvPicPr>
+          <p:cNvPr id="9" name="Picture Placeholder 8"/>
+          <p:cNvPicPr>
+            <a:picLocks noGrp="1" noChangeAspect="1"/>
+          </p:cNvPicPr>
+          <p:nvPr>
+            <p:ph type="pic" sz="quarter" idx="13"/>
+          </p:nvPr>
+        </p:nvPicPr>
+        <p:blipFill>
+          <a:blip r:embed="rId2" cstate="screen">
+            <a:alphaModFix amt="5000"/>
+            <a:extLst>
+              <a:ext uri="{28A0092B-C50C-407E-A947-70E740481C1C}">
+                <a14:useLocalDpi xmlns:a14="http://schemas.microsoft.com/office/drawing/2010/main"/>
+              </a:ext>
+            </a:extLst>
+          </a:blip>
+          <a:srcRect/>
+          <a:stretch>
+            <a:fillRect/>
+          </a:stretch>
+        </p:blipFill>
+        <p:spPr/>
+      </p:pic>
       <p:sp>
         <p:nvSpPr>
           <p:cNvPr id="2" name="Title 1"/>
@@ -6878,7 +7478,7 @@
           <a:p>
             <a:r>
               <a:rPr lang="en-US" dirty="0" smtClean="0"/>
-              <a:t>Background</a:t>
+              <a:t>I poured root beer in a square glass. What did I get?</a:t>
             </a:r>
             <a:endParaRPr lang="en-US" dirty="0"/>
           </a:p>
@@ -6886,58 +7486,29 @@
       </p:sp>
       <p:sp>
         <p:nvSpPr>
-          <p:cNvPr id="3" name="Content Placeholder 2"/>
-          <p:cNvSpPr>
-            <a:spLocks noGrp="1"/>
-          </p:cNvSpPr>
-          <p:nvPr>
-            <p:ph idx="1"/>
+          <p:cNvPr id="3" name="Text Placeholder 2"/>
+          <p:cNvSpPr>
+            <a:spLocks noGrp="1"/>
+          </p:cNvSpPr>
+          <p:nvPr>
+            <p:ph type="body" idx="1"/>
           </p:nvPr>
         </p:nvSpPr>
         <p:spPr/>
         <p:txBody>
-          <a:bodyPr>
-            <a:normAutofit lnSpcReduction="10000"/>
-          </a:bodyPr>
-          <a:lstStyle/>
-          <a:p>
-            <a:r>
-              <a:rPr lang="en-US" dirty="0"/>
-              <a:t>Founded in 1993, Kinross Gold is a senior gold mining company with a diverse portfolio of mines and projects in the United States, Brazil, Chile, Ghana, Mauritania, and Russia. Headquartered in Toronto, Canada, Kinross employs approximately 9,000 people </a:t>
-            </a:r>
+          <a:bodyPr/>
+          <a:lstStyle/>
+          <a:p>
             <a:r>
               <a:rPr lang="en-US" dirty="0" smtClean="0"/>
-              <a:t>worldwide.</a:t>
-            </a:r>
-          </a:p>
-          <a:p>
-            <a:r>
-              <a:rPr lang="en-US" dirty="0"/>
-              <a:t>Fort Knox is an open-pit gold mine located near the city of Fairbanks, Alaska. It is mined by conventional open-pit methods, with ore processed at a mill and heap leach facility</a:t>
+              <a:t>Just beer</a:t>
             </a:r>
             <a:r>
               <a:rPr lang="en-US" dirty="0" smtClean="0"/>
               <a:t>.</a:t>
             </a:r>
-          </a:p>
-          <a:p>
-            <a:r>
-              <a:rPr lang="en-US" dirty="0" smtClean="0"/>
-              <a:t>Heap Leaching is a low-cost method that is most suitable for treatment of low-grade materials that do not justify the higher costs of grinding and agitation leaching. The ores are placed on a liner, cyanide solution is dripped on the pad and percolates through the ores. Dissolved gold in the solution is extracted through adsorption, desorption and regeneration (ADR) plant.</a:t>
-            </a:r>
             <a:endParaRPr lang="en-US" dirty="0"/>
           </a:p>
-          <a:p>
-            <a:r>
-              <a:rPr lang="en-US" dirty="0" smtClean="0"/>
-              <a:t>The heap leach production acts similar to a “black box” function, where inputs are cyanide solution, gold ores, time, etc. and the output is pregnant solution (solution with gold dissolved). </a:t>
-            </a:r>
-            <a:r>
-              <a:rPr lang="en-US" dirty="0" smtClean="0"/>
-              <a:t>Understanding the heap leaching process can help the mining operation plan for the ore stacking and leaching cycle. On the financial side, a well established heap leach model can help the company foresee the upcoming challenges and opportunities.</a:t>
-            </a:r>
-            <a:endParaRPr lang="en-US" dirty="0" smtClean="0"/>
-          </a:p>
         </p:txBody>
       </p:sp>
       <p:sp>
@@ -6955,10 +7526,10 @@
           <a:bodyPr/>
           <a:lstStyle/>
           <a:p>
-            <a:fld id="{E35C74F7-D47D-EC46-9833-7ECFE3470865}" type="datetime4">
+            <a:fld id="{01726941-DB26-E74E-AA79-985F679517B7}" type="datetime4">
               <a:rPr lang="en-CA" smtClean="0"/>
               <a:pPr/>
-              <a:t>July 11, 2021</a:t>
+              <a:t>July 23, 2021</a:t>
             </a:fld>
             <a:endParaRPr lang="en-US"/>
           </a:p>
@@ -6966,7 +7537,7 @@
       </p:sp>
       <p:sp>
         <p:nvSpPr>
-          <p:cNvPr id="6" name="Footer Placeholder 5"/>
+          <p:cNvPr id="19" name="Footer Placeholder 18"/>
           <p:cNvSpPr>
             <a:spLocks noGrp="1"/>
           </p:cNvSpPr>
@@ -6979,7 +7550,7 @@
           <a:bodyPr/>
           <a:lstStyle/>
           <a:p>
-            <a:endParaRPr lang="en-US"/>
+            <a:endParaRPr lang="en-US" dirty="0"/>
           </a:p>
         </p:txBody>
       </p:sp>
@@ -7007,6 +7578,177 @@
           </a:p>
         </p:txBody>
       </p:sp>
+    </p:spTree>
+    <p:extLst>
+      <p:ext uri="{BB962C8B-B14F-4D97-AF65-F5344CB8AC3E}">
+        <p14:creationId xmlns:p14="http://schemas.microsoft.com/office/powerpoint/2010/main" val="1719727536"/>
+      </p:ext>
+    </p:extLst>
+  </p:cSld>
+  <p:clrMapOvr>
+    <a:masterClrMapping/>
+  </p:clrMapOvr>
+</p:sld>
+</file>
+
+<file path=ppt/slides/slide5.xml><?xml version="1.0" encoding="utf-8"?>
+<p:sld xmlns:a="http://schemas.openxmlformats.org/drawingml/2006/main" xmlns:r="http://schemas.openxmlformats.org/officeDocument/2006/relationships" xmlns:p="http://schemas.openxmlformats.org/presentationml/2006/main">
+  <p:cSld>
+    <p:spTree>
+      <p:nvGrpSpPr>
+        <p:cNvPr id="1" name=""/>
+        <p:cNvGrpSpPr/>
+        <p:nvPr/>
+      </p:nvGrpSpPr>
+      <p:grpSpPr>
+        <a:xfrm>
+          <a:off x="0" y="0"/>
+          <a:ext cx="0" cy="0"/>
+          <a:chOff x="0" y="0"/>
+          <a:chExt cx="0" cy="0"/>
+        </a:xfrm>
+      </p:grpSpPr>
+      <p:sp>
+        <p:nvSpPr>
+          <p:cNvPr id="2" name="Title 1"/>
+          <p:cNvSpPr>
+            <a:spLocks noGrp="1"/>
+          </p:cNvSpPr>
+          <p:nvPr>
+            <p:ph type="title"/>
+          </p:nvPr>
+        </p:nvSpPr>
+        <p:spPr/>
+        <p:txBody>
+          <a:bodyPr/>
+          <a:lstStyle/>
+          <a:p>
+            <a:r>
+              <a:rPr lang="en-US" dirty="0" smtClean="0"/>
+              <a:t>Background</a:t>
+            </a:r>
+            <a:endParaRPr lang="en-US" dirty="0"/>
+          </a:p>
+        </p:txBody>
+      </p:sp>
+      <p:sp>
+        <p:nvSpPr>
+          <p:cNvPr id="3" name="Content Placeholder 2"/>
+          <p:cNvSpPr>
+            <a:spLocks noGrp="1"/>
+          </p:cNvSpPr>
+          <p:nvPr>
+            <p:ph idx="1"/>
+          </p:nvPr>
+        </p:nvSpPr>
+        <p:spPr/>
+        <p:txBody>
+          <a:bodyPr>
+            <a:normAutofit lnSpcReduction="10000"/>
+          </a:bodyPr>
+          <a:lstStyle/>
+          <a:p>
+            <a:r>
+              <a:rPr lang="en-US" dirty="0"/>
+              <a:t>Founded in 1993, Kinross Gold is a senior gold mining company with a diverse portfolio of mines and projects in the United States, Brazil, Chile, Ghana, Mauritania, and Russia. Headquartered in Toronto, Canada, Kinross employs approximately 9,000 people </a:t>
+            </a:r>
+            <a:r>
+              <a:rPr lang="en-US" dirty="0" smtClean="0"/>
+              <a:t>worldwide.</a:t>
+            </a:r>
+          </a:p>
+          <a:p>
+            <a:r>
+              <a:rPr lang="en-US" dirty="0"/>
+              <a:t>Fort Knox is an open-pit gold mine located near the city of Fairbanks, Alaska. It is mined by conventional open-pit methods, with ore processed at a mill and heap leach facility</a:t>
+            </a:r>
+            <a:r>
+              <a:rPr lang="en-US" dirty="0" smtClean="0"/>
+              <a:t>.</a:t>
+            </a:r>
+          </a:p>
+          <a:p>
+            <a:r>
+              <a:rPr lang="en-US" dirty="0" smtClean="0"/>
+              <a:t>Heap Leaching is a low-cost method that is most suitable for treatment of low-grade materials that do not justify the higher costs of grinding and agitation leaching. The ores are placed on a liner, cyanide solution is dripped on the pad and percolates through the ores. Dissolved gold in the solution is extracted through adsorption, desorption and regeneration (ADR) plant.</a:t>
+            </a:r>
+            <a:endParaRPr lang="en-US" dirty="0"/>
+          </a:p>
+          <a:p>
+            <a:r>
+              <a:rPr lang="en-US" dirty="0" smtClean="0"/>
+              <a:t>The heap leach production acts similar to a “black box” function, where inputs are cyanide solution, gold ores, time, etc. and the output is pregnant solution (solution with gold dissolved). Understanding the heap leaching process can help the mining operation plan for the ore stacking and leaching cycle. On the financial side, a well established heap leach model can help the company foresee the upcoming challenges and opportunities.</a:t>
+            </a:r>
+          </a:p>
+        </p:txBody>
+      </p:sp>
+      <p:sp>
+        <p:nvSpPr>
+          <p:cNvPr id="4" name="Date Placeholder 3"/>
+          <p:cNvSpPr>
+            <a:spLocks noGrp="1"/>
+          </p:cNvSpPr>
+          <p:nvPr>
+            <p:ph type="dt" sz="half" idx="10"/>
+          </p:nvPr>
+        </p:nvSpPr>
+        <p:spPr/>
+        <p:txBody>
+          <a:bodyPr/>
+          <a:lstStyle/>
+          <a:p>
+            <a:fld id="{E35C74F7-D47D-EC46-9833-7ECFE3470865}" type="datetime4">
+              <a:rPr lang="en-CA" smtClean="0"/>
+              <a:pPr/>
+              <a:t>July 23, 2021</a:t>
+            </a:fld>
+            <a:endParaRPr lang="en-US"/>
+          </a:p>
+        </p:txBody>
+      </p:sp>
+      <p:sp>
+        <p:nvSpPr>
+          <p:cNvPr id="6" name="Footer Placeholder 5"/>
+          <p:cNvSpPr>
+            <a:spLocks noGrp="1"/>
+          </p:cNvSpPr>
+          <p:nvPr>
+            <p:ph type="ftr" sz="quarter" idx="11"/>
+          </p:nvPr>
+        </p:nvSpPr>
+        <p:spPr/>
+        <p:txBody>
+          <a:bodyPr/>
+          <a:lstStyle/>
+          <a:p>
+            <a:endParaRPr lang="en-US"/>
+          </a:p>
+        </p:txBody>
+      </p:sp>
+      <p:sp>
+        <p:nvSpPr>
+          <p:cNvPr id="5" name="Slide Number Placeholder 4"/>
+          <p:cNvSpPr>
+            <a:spLocks noGrp="1"/>
+          </p:cNvSpPr>
+          <p:nvPr>
+            <p:ph type="sldNum" sz="quarter" idx="12"/>
+          </p:nvPr>
+        </p:nvSpPr>
+        <p:spPr/>
+        <p:txBody>
+          <a:bodyPr/>
+          <a:lstStyle/>
+          <a:p>
+            <a:fld id="{70341EDA-DF76-394C-B359-28542C3A7753}" type="slidenum">
+              <a:rPr lang="en-US" smtClean="0"/>
+              <a:pPr/>
+              <a:t>5</a:t>
+            </a:fld>
+            <a:endParaRPr lang="en-US"/>
+          </a:p>
+        </p:txBody>
+      </p:sp>
       <p:sp>
         <p:nvSpPr>
           <p:cNvPr id="12" name="Text Placeholder 11"/>
@@ -7024,8 +7766,9 @@
           <a:p>
             <a:r>
               <a:rPr lang="en-US" dirty="0"/>
-              <a:t>PowerPoint Style Guide</a:t>
-            </a:r>
+              <a:t>Fort Knox Heap Leach Model Remake</a:t>
+            </a:r>
+            <a:endParaRPr lang="en-US" dirty="0"/>
           </a:p>
         </p:txBody>
       </p:sp>
@@ -7042,7 +7785,7 @@
 </p:sld>
 </file>
 
-<file path=ppt/slides/slide5.xml><?xml version="1.0" encoding="utf-8"?>
+<file path=ppt/slides/slide6.xml><?xml version="1.0" encoding="utf-8"?>
 <p:sld xmlns:a="http://schemas.openxmlformats.org/drawingml/2006/main" xmlns:r="http://schemas.openxmlformats.org/officeDocument/2006/relationships" xmlns:p="http://schemas.openxmlformats.org/presentationml/2006/main">
   <p:cSld>
     <p:spTree>
@@ -7147,7 +7890,7 @@
             <a:fld id="{1E192792-884A-AD43-BE8E-8F1FC1D5646F}" type="datetime4">
               <a:rPr lang="en-CA" smtClean="0"/>
               <a:pPr/>
-              <a:t>July 11, 2021</a:t>
+              <a:t>July 23, 2021</a:t>
             </a:fld>
             <a:endParaRPr lang="en-US" dirty="0"/>
           </a:p>
@@ -7202,7 +7945,7 @@
             <a:fld id="{70341EDA-DF76-394C-B359-28542C3A7753}" type="slidenum">
               <a:rPr lang="en-US" smtClean="0"/>
               <a:pPr/>
-              <a:t>5</a:t>
+              <a:t>6</a:t>
             </a:fld>
             <a:endParaRPr lang="en-US"/>
           </a:p>
@@ -7231,8 +7974,9 @@
           <a:p>
             <a:r>
               <a:rPr lang="en-US" dirty="0"/>
-              <a:t>Kinross</a:t>
-            </a:r>
+              <a:t>Fort Knox Heap Leach Model Remake</a:t>
+            </a:r>
+            <a:endParaRPr lang="en-US" dirty="0"/>
           </a:p>
         </p:txBody>
       </p:sp>
@@ -8642,222 +9386,6 @@
 </p:sld>
 </file>
 
-<file path=ppt/slides/slide6.xml><?xml version="1.0" encoding="utf-8"?>
-<p:sld xmlns:a="http://schemas.openxmlformats.org/drawingml/2006/main" xmlns:r="http://schemas.openxmlformats.org/officeDocument/2006/relationships" xmlns:p="http://schemas.openxmlformats.org/presentationml/2006/main">
-  <p:cSld>
-    <p:spTree>
-      <p:nvGrpSpPr>
-        <p:cNvPr id="1" name=""/>
-        <p:cNvGrpSpPr/>
-        <p:nvPr/>
-      </p:nvGrpSpPr>
-      <p:grpSpPr>
-        <a:xfrm>
-          <a:off x="0" y="0"/>
-          <a:ext cx="0" cy="0"/>
-          <a:chOff x="0" y="0"/>
-          <a:chExt cx="0" cy="0"/>
-        </a:xfrm>
-      </p:grpSpPr>
-      <p:sp>
-        <p:nvSpPr>
-          <p:cNvPr id="2" name="Title 1"/>
-          <p:cNvSpPr>
-            <a:spLocks noGrp="1"/>
-          </p:cNvSpPr>
-          <p:nvPr>
-            <p:ph type="title"/>
-          </p:nvPr>
-        </p:nvSpPr>
-        <p:spPr/>
-        <p:txBody>
-          <a:bodyPr/>
-          <a:lstStyle/>
-          <a:p>
-            <a:r>
-              <a:rPr lang="en-US" dirty="0" smtClean="0"/>
-              <a:t>Data Sources</a:t>
-            </a:r>
-            <a:endParaRPr lang="en-US" dirty="0"/>
-          </a:p>
-        </p:txBody>
-      </p:sp>
-      <p:sp>
-        <p:nvSpPr>
-          <p:cNvPr id="3" name="Date Placeholder 2"/>
-          <p:cNvSpPr>
-            <a:spLocks noGrp="1"/>
-          </p:cNvSpPr>
-          <p:nvPr>
-            <p:ph type="dt" sz="half" idx="10"/>
-          </p:nvPr>
-        </p:nvSpPr>
-        <p:spPr/>
-        <p:txBody>
-          <a:bodyPr/>
-          <a:lstStyle/>
-          <a:p>
-            <a:fld id="{49FF2BEF-23C6-5D43-816C-81833513DDC1}" type="datetime4">
-              <a:rPr lang="en-CA" smtClean="0"/>
-              <a:pPr/>
-              <a:t>July 11, 2021</a:t>
-            </a:fld>
-            <a:endParaRPr lang="en-US"/>
-          </a:p>
-        </p:txBody>
-      </p:sp>
-      <p:sp>
-        <p:nvSpPr>
-          <p:cNvPr id="7" name="Footer Placeholder 6"/>
-          <p:cNvSpPr>
-            <a:spLocks noGrp="1"/>
-          </p:cNvSpPr>
-          <p:nvPr>
-            <p:ph type="ftr" sz="quarter" idx="11"/>
-          </p:nvPr>
-        </p:nvSpPr>
-        <p:spPr/>
-        <p:txBody>
-          <a:bodyPr/>
-          <a:lstStyle/>
-          <a:p>
-            <a:endParaRPr lang="en-US"/>
-          </a:p>
-        </p:txBody>
-      </p:sp>
-      <p:sp>
-        <p:nvSpPr>
-          <p:cNvPr id="6" name="Slide Number Placeholder 5"/>
-          <p:cNvSpPr>
-            <a:spLocks noGrp="1"/>
-          </p:cNvSpPr>
-          <p:nvPr>
-            <p:ph type="sldNum" sz="quarter" idx="12"/>
-          </p:nvPr>
-        </p:nvSpPr>
-        <p:spPr/>
-        <p:txBody>
-          <a:bodyPr/>
-          <a:lstStyle/>
-          <a:p>
-            <a:fld id="{70341EDA-DF76-394C-B359-28542C3A7753}" type="slidenum">
-              <a:rPr lang="en-US" smtClean="0"/>
-              <a:pPr/>
-              <a:t>6</a:t>
-            </a:fld>
-            <a:endParaRPr lang="en-US"/>
-          </a:p>
-        </p:txBody>
-      </p:sp>
-      <p:sp>
-        <p:nvSpPr>
-          <p:cNvPr id="4" name="Content Placeholder 3"/>
-          <p:cNvSpPr>
-            <a:spLocks noGrp="1"/>
-          </p:cNvSpPr>
-          <p:nvPr>
-            <p:ph idx="13"/>
-          </p:nvPr>
-        </p:nvSpPr>
-        <p:spPr>
-          <a:xfrm>
-            <a:off x="687600" y="1149599"/>
-            <a:ext cx="7768800" cy="3418375"/>
-          </a:xfrm>
-        </p:spPr>
-        <p:txBody>
-          <a:bodyPr/>
-          <a:lstStyle/>
-          <a:p>
-            <a:r>
-              <a:rPr lang="en-US" dirty="0" smtClean="0"/>
-              <a:t>Mine technical services team – pad information</a:t>
-            </a:r>
-          </a:p>
-          <a:p>
-            <a:pPr lvl="1"/>
-            <a:r>
-              <a:rPr lang="en-US" dirty="0"/>
-              <a:t>O</a:t>
-            </a:r>
-            <a:r>
-              <a:rPr lang="en-US" dirty="0" smtClean="0"/>
-              <a:t>res information placed on the heap leach pad. Ores tonnage, contained gold ounces, time placed and location.</a:t>
-            </a:r>
-          </a:p>
-          <a:p>
-            <a:pPr lvl="1"/>
-            <a:r>
-              <a:rPr lang="en-US" dirty="0" smtClean="0"/>
-              <a:t>Leaching information. This describes the time when leaching at a certain area started and ended.</a:t>
-            </a:r>
-            <a:endParaRPr lang="en-US" dirty="0" smtClean="0"/>
-          </a:p>
-          <a:p>
-            <a:r>
-              <a:rPr lang="en-US" dirty="0" smtClean="0"/>
-              <a:t>Metallurgy team – solution information and metal production</a:t>
-            </a:r>
-          </a:p>
-          <a:p>
-            <a:pPr lvl="1"/>
-            <a:r>
-              <a:rPr lang="en-US" dirty="0" smtClean="0"/>
-              <a:t>Solution information. This records the cyanide solution strength and the gold grade in the barren and pregnant solutions.</a:t>
-            </a:r>
-            <a:r>
-              <a:rPr lang="en-US" dirty="0"/>
-              <a:t> </a:t>
-            </a:r>
-            <a:r>
-              <a:rPr lang="en-US" dirty="0" smtClean="0"/>
-              <a:t>Solution information also includes the solution flowrate to the heap leach pad and the flowrate back to the ADR plant.</a:t>
-            </a:r>
-          </a:p>
-          <a:p>
-            <a:pPr lvl="1"/>
-            <a:r>
-              <a:rPr lang="en-US" dirty="0" smtClean="0"/>
-              <a:t>Metal production. This records the about of gold produced.</a:t>
-            </a:r>
-          </a:p>
-        </p:txBody>
-      </p:sp>
-      <p:sp>
-        <p:nvSpPr>
-          <p:cNvPr id="14" name="Text Placeholder 13"/>
-          <p:cNvSpPr>
-            <a:spLocks noGrp="1"/>
-          </p:cNvSpPr>
-          <p:nvPr>
-            <p:ph type="body" sz="quarter" idx="15"/>
-          </p:nvPr>
-        </p:nvSpPr>
-        <p:spPr/>
-        <p:txBody>
-          <a:bodyPr/>
-          <a:lstStyle/>
-          <a:p>
-            <a:r>
-              <a:rPr lang="en-US" dirty="0"/>
-              <a:t>PowerPoint Style Guide</a:t>
-            </a:r>
-          </a:p>
-        </p:txBody>
-      </p:sp>
-    </p:spTree>
-    <p:extLst>
-      <p:ext uri="{BB962C8B-B14F-4D97-AF65-F5344CB8AC3E}">
-        <p14:creationId xmlns:p14="http://schemas.microsoft.com/office/powerpoint/2010/main" val="104191935"/>
-      </p:ext>
-    </p:extLst>
-  </p:cSld>
-  <p:clrMapOvr>
-    <a:masterClrMapping/>
-  </p:clrMapOvr>
-</p:sld>
-</file>
-
 <file path=ppt/slides/slide7.xml><?xml version="1.0" encoding="utf-8"?>
 <p:sld xmlns:a="http://schemas.openxmlformats.org/drawingml/2006/main" xmlns:r="http://schemas.openxmlformats.org/officeDocument/2006/relationships" xmlns:p="http://schemas.openxmlformats.org/presentationml/2006/main">
   <p:cSld>
@@ -8892,7 +9420,7 @@
           <a:p>
             <a:r>
               <a:rPr lang="en-US" dirty="0" smtClean="0"/>
-              <a:t>Project Goals</a:t>
+              <a:t>Data Sources</a:t>
             </a:r>
             <a:endParaRPr lang="en-US" dirty="0"/>
           </a:p>
@@ -8900,7 +9428,7 @@
       </p:sp>
       <p:sp>
         <p:nvSpPr>
-          <p:cNvPr id="4" name="Date Placeholder 3"/>
+          <p:cNvPr id="3" name="Date Placeholder 2"/>
           <p:cNvSpPr>
             <a:spLocks noGrp="1"/>
           </p:cNvSpPr>
@@ -8913,10 +9441,10 @@
           <a:bodyPr/>
           <a:lstStyle/>
           <a:p>
-            <a:fld id="{53176067-3430-564D-886D-71DF85FF18D6}" type="datetime4">
+            <a:fld id="{49FF2BEF-23C6-5D43-816C-81833513DDC1}" type="datetime4">
               <a:rPr lang="en-CA" smtClean="0"/>
               <a:pPr/>
-              <a:t>July 11, 2021</a:t>
+              <a:t>July 23, 2021</a:t>
             </a:fld>
             <a:endParaRPr lang="en-US"/>
           </a:p>
@@ -8924,7 +9452,7 @@
       </p:sp>
       <p:sp>
         <p:nvSpPr>
-          <p:cNvPr id="6" name="Footer Placeholder 5"/>
+          <p:cNvPr id="7" name="Footer Placeholder 6"/>
           <p:cNvSpPr>
             <a:spLocks noGrp="1"/>
           </p:cNvSpPr>
@@ -8943,7 +9471,7 @@
       </p:sp>
       <p:sp>
         <p:nvSpPr>
-          <p:cNvPr id="5" name="Slide Number Placeholder 4"/>
+          <p:cNvPr id="6" name="Slide Number Placeholder 5"/>
           <p:cNvSpPr>
             <a:spLocks noGrp="1"/>
           </p:cNvSpPr>
@@ -8965,167 +9493,119 @@
           </a:p>
         </p:txBody>
       </p:sp>
-      <p:pic>
-        <p:nvPicPr>
-          <p:cNvPr id="8" name="Picture Placeholder 7"/>
-          <p:cNvPicPr>
-            <a:picLocks noGrp="1" noChangeAspect="1"/>
-          </p:cNvPicPr>
-          <p:nvPr>
-            <p:ph type="pic" idx="13"/>
-          </p:nvPr>
-        </p:nvPicPr>
-        <p:blipFill>
-          <a:blip r:embed="rId2" cstate="screen">
-            <a:extLst>
-              <a:ext uri="{28A0092B-C50C-407E-A947-70E740481C1C}">
-                <a14:useLocalDpi xmlns:a14="http://schemas.microsoft.com/office/drawing/2010/main"/>
-              </a:ext>
-            </a:extLst>
-          </a:blip>
-          <a:srcRect/>
-          <a:stretch>
-            <a:fillRect/>
-          </a:stretch>
-        </p:blipFill>
+      <p:sp>
+        <p:nvSpPr>
+          <p:cNvPr id="4" name="Content Placeholder 3"/>
+          <p:cNvSpPr>
+            <a:spLocks noGrp="1"/>
+          </p:cNvSpPr>
+          <p:nvPr>
+            <p:ph idx="13"/>
+          </p:nvPr>
+        </p:nvSpPr>
+        <p:spPr>
+          <a:xfrm>
+            <a:off x="687600" y="1149599"/>
+            <a:ext cx="7768800" cy="3418375"/>
+          </a:xfrm>
+        </p:spPr>
+        <p:txBody>
+          <a:bodyPr/>
+          <a:lstStyle/>
+          <a:p>
+            <a:r>
+              <a:rPr lang="en-US" dirty="0" smtClean="0"/>
+              <a:t>Mine technical services team – pad information</a:t>
+            </a:r>
+          </a:p>
+          <a:p>
+            <a:pPr lvl="1"/>
+            <a:r>
+              <a:rPr lang="en-US" dirty="0"/>
+              <a:t>O</a:t>
+            </a:r>
+            <a:r>
+              <a:rPr lang="en-US" dirty="0" smtClean="0"/>
+              <a:t>res information placed on the heap leach pad. Ores tonnage, contained gold ounces, time placed and location.</a:t>
+            </a:r>
+          </a:p>
+          <a:p>
+            <a:pPr lvl="1"/>
+            <a:r>
+              <a:rPr lang="en-US" dirty="0" smtClean="0"/>
+              <a:t>Leaching information. This describes the time when leaching at a certain area started and ended.</a:t>
+            </a:r>
+          </a:p>
+          <a:p>
+            <a:r>
+              <a:rPr lang="en-US" dirty="0" smtClean="0"/>
+              <a:t>Metallurgy team – solution information and metal production</a:t>
+            </a:r>
+          </a:p>
+          <a:p>
+            <a:pPr lvl="1"/>
+            <a:r>
+              <a:rPr lang="en-US" dirty="0" smtClean="0"/>
+              <a:t>Solution information. This records the cyanide solution strength and the gold grade in the barren and pregnant solutions.</a:t>
+            </a:r>
+            <a:r>
+              <a:rPr lang="en-US" dirty="0"/>
+              <a:t> </a:t>
+            </a:r>
+            <a:r>
+              <a:rPr lang="en-US" dirty="0" smtClean="0"/>
+              <a:t>Solution information also includes the solution flowrate to the heap leach pad and the flowrate back to the ADR plant.</a:t>
+            </a:r>
+          </a:p>
+          <a:p>
+            <a:pPr lvl="1"/>
+            <a:r>
+              <a:rPr lang="en-US" dirty="0" smtClean="0"/>
+              <a:t>Metal production. This records the </a:t>
+            </a:r>
+            <a:r>
+              <a:rPr lang="en-US" dirty="0" smtClean="0"/>
+              <a:t>amount </a:t>
+            </a:r>
+            <a:r>
+              <a:rPr lang="en-US" dirty="0" smtClean="0"/>
+              <a:t>of gold </a:t>
+            </a:r>
+            <a:r>
+              <a:rPr lang="en-US" dirty="0" smtClean="0"/>
+              <a:t>produced by month.</a:t>
+            </a:r>
+            <a:endParaRPr lang="en-US" dirty="0" smtClean="0"/>
+          </a:p>
+        </p:txBody>
+      </p:sp>
+      <p:sp>
+        <p:nvSpPr>
+          <p:cNvPr id="14" name="Text Placeholder 13"/>
+          <p:cNvSpPr>
+            <a:spLocks noGrp="1"/>
+          </p:cNvSpPr>
+          <p:nvPr>
+            <p:ph type="body" sz="quarter" idx="15"/>
+          </p:nvPr>
+        </p:nvSpPr>
         <p:spPr/>
-      </p:pic>
-      <p:sp>
-        <p:nvSpPr>
-          <p:cNvPr id="3" name="Content Placeholder 2"/>
-          <p:cNvSpPr>
-            <a:spLocks noGrp="1"/>
-          </p:cNvSpPr>
-          <p:nvPr>
-            <p:ph idx="14"/>
-          </p:nvPr>
-        </p:nvSpPr>
-        <p:spPr/>
-        <p:txBody>
-          <a:bodyPr/>
-          <a:lstStyle/>
-          <a:p>
-            <a:pPr marL="285750" indent="-285750">
-              <a:buFont typeface="Arial" panose="020B0604020202020204" pitchFamily="34" charset="0"/>
-              <a:buChar char="•"/>
-            </a:pPr>
-            <a:r>
-              <a:rPr lang="en-US" dirty="0" smtClean="0"/>
-              <a:t>Explain the historical gold production coming out from the heap leach pad.</a:t>
-            </a:r>
-          </a:p>
-          <a:p>
-            <a:pPr marL="285750" indent="-285750">
-              <a:buFont typeface="Arial" panose="020B0604020202020204" pitchFamily="34" charset="0"/>
-              <a:buChar char="•"/>
-            </a:pPr>
-            <a:r>
-              <a:rPr lang="en-US" dirty="0" smtClean="0"/>
-              <a:t>Create a heap leach model that can help predict future gold production given pad loading sequence, material information, and operation options.</a:t>
-            </a:r>
-          </a:p>
-          <a:p>
-            <a:pPr marL="285750" indent="-285750">
-              <a:buFont typeface="Arial" panose="020B0604020202020204" pitchFamily="34" charset="0"/>
-              <a:buChar char="•"/>
-            </a:pPr>
-            <a:r>
-              <a:rPr lang="en-US" dirty="0" smtClean="0"/>
-              <a:t>Provide suggestions on operation options.</a:t>
+        <p:txBody>
+          <a:bodyPr/>
+          <a:lstStyle/>
+          <a:p>
+            <a:r>
+              <a:rPr lang="en-US" dirty="0"/>
+              <a:t>Fort Knox Heap Leach Model Remake</a:t>
             </a:r>
             <a:endParaRPr lang="en-US" dirty="0"/>
-          </a:p>
-        </p:txBody>
-      </p:sp>
-      <p:sp>
-        <p:nvSpPr>
-          <p:cNvPr id="14" name="Text Placeholder 13"/>
-          <p:cNvSpPr>
-            <a:spLocks noGrp="1"/>
-          </p:cNvSpPr>
-          <p:nvPr>
-            <p:ph type="body" sz="quarter" idx="15"/>
-          </p:nvPr>
-        </p:nvSpPr>
-        <p:spPr/>
-        <p:txBody>
-          <a:bodyPr/>
-          <a:lstStyle/>
-          <a:p>
-            <a:r>
-              <a:rPr lang="en-US" dirty="0"/>
-              <a:t>PowerPoint Style Guide</a:t>
-            </a:r>
-          </a:p>
-        </p:txBody>
-      </p:sp>
-      <p:sp>
-        <p:nvSpPr>
-          <p:cNvPr id="7" name="TextBox 6">
-            <a:extLst>
-              <a:ext uri="{FF2B5EF4-FFF2-40B4-BE49-F238E27FC236}">
-                <a16:creationId xmlns:a16="http://schemas.microsoft.com/office/drawing/2014/main" id="{0AB25EBC-9A2C-B04B-8B20-B81D98946878}"/>
-              </a:ext>
-            </a:extLst>
-          </p:cNvPr>
-          <p:cNvSpPr txBox="1"/>
-          <p:nvPr/>
-        </p:nvSpPr>
-        <p:spPr>
-          <a:xfrm rot="-900000">
-            <a:off x="3456773" y="1545162"/>
-            <a:ext cx="5996920" cy="2585323"/>
-          </a:xfrm>
-          <a:prstGeom prst="rect">
-            <a:avLst/>
-          </a:prstGeom>
-          <a:noFill/>
-        </p:spPr>
-        <p:txBody>
-          <a:bodyPr wrap="square" rtlCol="0">
-            <a:spAutoFit/>
-          </a:bodyPr>
-          <a:lstStyle/>
-          <a:p>
-            <a:r>
-              <a:rPr lang="en-US" sz="5400" b="1" dirty="0" smtClean="0">
-                <a:solidFill>
-                  <a:schemeClr val="bg1">
-                    <a:alpha val="75000"/>
-                  </a:schemeClr>
-                </a:solidFill>
-                <a:latin typeface="+mj-lt"/>
-              </a:rPr>
-              <a:t>Plan to put some </a:t>
-            </a:r>
-          </a:p>
-          <a:p>
-            <a:r>
-              <a:rPr lang="en-US" sz="5400" b="1" dirty="0" smtClean="0">
-                <a:solidFill>
-                  <a:schemeClr val="bg1">
-                    <a:alpha val="75000"/>
-                  </a:schemeClr>
-                </a:solidFill>
-                <a:latin typeface="+mj-lt"/>
-              </a:rPr>
-              <a:t>Relative picture here</a:t>
-            </a:r>
-            <a:endParaRPr lang="en-US" sz="5400" b="1" dirty="0">
-              <a:solidFill>
-                <a:schemeClr val="bg1">
-                  <a:alpha val="75000"/>
-                </a:schemeClr>
-              </a:solidFill>
-              <a:latin typeface="+mj-lt"/>
-            </a:endParaRPr>
           </a:p>
         </p:txBody>
       </p:sp>
     </p:spTree>
     <p:extLst>
       <p:ext uri="{BB962C8B-B14F-4D97-AF65-F5344CB8AC3E}">
-        <p14:creationId xmlns:p14="http://schemas.microsoft.com/office/powerpoint/2010/main" val="376995651"/>
+        <p14:creationId xmlns:p14="http://schemas.microsoft.com/office/powerpoint/2010/main" val="104191935"/>
       </p:ext>
     </p:extLst>
   </p:cSld>
@@ -9152,19 +9632,108 @@
           <a:chExt cx="0" cy="0"/>
         </a:xfrm>
       </p:grpSpPr>
+      <p:sp>
+        <p:nvSpPr>
+          <p:cNvPr id="2" name="Title 1"/>
+          <p:cNvSpPr>
+            <a:spLocks noGrp="1"/>
+          </p:cNvSpPr>
+          <p:nvPr>
+            <p:ph type="title"/>
+          </p:nvPr>
+        </p:nvSpPr>
+        <p:spPr/>
+        <p:txBody>
+          <a:bodyPr/>
+          <a:lstStyle/>
+          <a:p>
+            <a:r>
+              <a:rPr lang="en-US" dirty="0" smtClean="0"/>
+              <a:t>Project Goals</a:t>
+            </a:r>
+            <a:endParaRPr lang="en-US" dirty="0"/>
+          </a:p>
+        </p:txBody>
+      </p:sp>
+      <p:sp>
+        <p:nvSpPr>
+          <p:cNvPr id="4" name="Date Placeholder 3"/>
+          <p:cNvSpPr>
+            <a:spLocks noGrp="1"/>
+          </p:cNvSpPr>
+          <p:nvPr>
+            <p:ph type="dt" sz="half" idx="10"/>
+          </p:nvPr>
+        </p:nvSpPr>
+        <p:spPr/>
+        <p:txBody>
+          <a:bodyPr/>
+          <a:lstStyle/>
+          <a:p>
+            <a:fld id="{53176067-3430-564D-886D-71DF85FF18D6}" type="datetime4">
+              <a:rPr lang="en-CA" smtClean="0"/>
+              <a:pPr/>
+              <a:t>July 23, 2021</a:t>
+            </a:fld>
+            <a:endParaRPr lang="en-US"/>
+          </a:p>
+        </p:txBody>
+      </p:sp>
+      <p:sp>
+        <p:nvSpPr>
+          <p:cNvPr id="6" name="Footer Placeholder 5"/>
+          <p:cNvSpPr>
+            <a:spLocks noGrp="1"/>
+          </p:cNvSpPr>
+          <p:nvPr>
+            <p:ph type="ftr" sz="quarter" idx="11"/>
+          </p:nvPr>
+        </p:nvSpPr>
+        <p:spPr/>
+        <p:txBody>
+          <a:bodyPr/>
+          <a:lstStyle/>
+          <a:p>
+            <a:endParaRPr lang="en-US"/>
+          </a:p>
+        </p:txBody>
+      </p:sp>
+      <p:sp>
+        <p:nvSpPr>
+          <p:cNvPr id="5" name="Slide Number Placeholder 4"/>
+          <p:cNvSpPr>
+            <a:spLocks noGrp="1"/>
+          </p:cNvSpPr>
+          <p:nvPr>
+            <p:ph type="sldNum" sz="quarter" idx="12"/>
+          </p:nvPr>
+        </p:nvSpPr>
+        <p:spPr/>
+        <p:txBody>
+          <a:bodyPr/>
+          <a:lstStyle/>
+          <a:p>
+            <a:fld id="{70341EDA-DF76-394C-B359-28542C3A7753}" type="slidenum">
+              <a:rPr lang="en-US" smtClean="0"/>
+              <a:pPr/>
+              <a:t>8</a:t>
+            </a:fld>
+            <a:endParaRPr lang="en-US"/>
+          </a:p>
+        </p:txBody>
+      </p:sp>
       <p:pic>
         <p:nvPicPr>
-          <p:cNvPr id="12" name="Picture Placeholder 11"/>
+          <p:cNvPr id="8" name="Picture Placeholder 7"/>
           <p:cNvPicPr>
             <a:picLocks noGrp="1" noChangeAspect="1"/>
           </p:cNvPicPr>
           <p:nvPr>
-            <p:ph type="pic" sz="quarter" idx="13"/>
+            <p:ph type="pic" idx="13"/>
           </p:nvPr>
         </p:nvPicPr>
         <p:blipFill>
-          <a:blip r:embed="rId3" cstate="screen">
-            <a:alphaModFix amt="5000"/>
+          <a:blip r:embed="rId2" cstate="screen">
             <a:extLst>
               <a:ext uri="{28A0092B-C50C-407E-A947-70E740481C1C}">
                 <a14:useLocalDpi xmlns:a14="http://schemas.microsoft.com/office/drawing/2010/main"/>
@@ -9180,12 +9749,12 @@
       </p:pic>
       <p:sp>
         <p:nvSpPr>
-          <p:cNvPr id="2" name="Title 1"/>
-          <p:cNvSpPr>
-            <a:spLocks noGrp="1"/>
-          </p:cNvSpPr>
-          <p:nvPr>
-            <p:ph type="title"/>
+          <p:cNvPr id="3" name="Content Placeholder 2"/>
+          <p:cNvSpPr>
+            <a:spLocks noGrp="1"/>
+          </p:cNvSpPr>
+          <p:nvPr>
+            <p:ph idx="14"/>
           </p:nvPr>
         </p:nvSpPr>
         <p:spPr/>
@@ -9193,9 +9762,33 @@
           <a:bodyPr/>
           <a:lstStyle/>
           <a:p>
-            <a:r>
-              <a:rPr lang="en-US"/>
-              <a:t>This is an alternate divider slide</a:t>
+            <a:pPr marL="285750" indent="-285750">
+              <a:buFont typeface="Arial" panose="020B0604020202020204" pitchFamily="34" charset="0"/>
+              <a:buChar char="•"/>
+            </a:pPr>
+            <a:r>
+              <a:rPr lang="en-US" dirty="0" smtClean="0"/>
+              <a:t>Explain the historical gold production coming out from the heap leach pad.</a:t>
+            </a:r>
+          </a:p>
+          <a:p>
+            <a:pPr marL="285750" indent="-285750">
+              <a:buFont typeface="Arial" panose="020B0604020202020204" pitchFamily="34" charset="0"/>
+              <a:buChar char="•"/>
+            </a:pPr>
+            <a:r>
+              <a:rPr lang="en-US" dirty="0" smtClean="0"/>
+              <a:t>Create a heap leach model that can help predict future gold production given pad loading sequence, material information, and operation options.</a:t>
+            </a:r>
+          </a:p>
+          <a:p>
+            <a:pPr marL="285750" indent="-285750">
+              <a:buFont typeface="Arial" panose="020B0604020202020204" pitchFamily="34" charset="0"/>
+              <a:buChar char="•"/>
+            </a:pPr>
+            <a:r>
+              <a:rPr lang="en-US" dirty="0" smtClean="0"/>
+              <a:t>Provide suggestions on operation options.</a:t>
             </a:r>
             <a:endParaRPr lang="en-US" dirty="0"/>
           </a:p>
@@ -9203,12 +9796,12 @@
       </p:sp>
       <p:sp>
         <p:nvSpPr>
-          <p:cNvPr id="3" name="Text Placeholder 2"/>
-          <p:cNvSpPr>
-            <a:spLocks noGrp="1"/>
-          </p:cNvSpPr>
-          <p:nvPr>
-            <p:ph type="body" idx="1"/>
+          <p:cNvPr id="14" name="Text Placeholder 13"/>
+          <p:cNvSpPr>
+            <a:spLocks noGrp="1"/>
+          </p:cNvSpPr>
+          <p:nvPr>
+            <p:ph type="body" sz="quarter" idx="15"/>
           </p:nvPr>
         </p:nvSpPr>
         <p:spPr/>
@@ -9217,175 +9810,80 @@
           <a:lstStyle/>
           <a:p>
             <a:r>
-              <a:rPr lang="en-US" dirty="0" err="1"/>
-              <a:t>Sed</a:t>
-            </a:r>
-            <a:r>
               <a:rPr lang="en-US" dirty="0"/>
-              <a:t> </a:t>
-            </a:r>
-            <a:r>
-              <a:rPr lang="en-US" dirty="0" err="1"/>
-              <a:t>elementum</a:t>
-            </a:r>
-            <a:r>
-              <a:rPr lang="en-US" dirty="0"/>
-              <a:t> semper </a:t>
-            </a:r>
-            <a:r>
-              <a:rPr lang="en-US" dirty="0" err="1"/>
-              <a:t>consequat</a:t>
-            </a:r>
-            <a:r>
-              <a:rPr lang="en-US" dirty="0"/>
-              <a:t>. </a:t>
-            </a:r>
-            <a:r>
-              <a:rPr lang="en-US" dirty="0" err="1"/>
-              <a:t>Donec</a:t>
-            </a:r>
-            <a:r>
-              <a:rPr lang="en-US" dirty="0"/>
-              <a:t> a quam </a:t>
-            </a:r>
-            <a:r>
-              <a:rPr lang="en-US" dirty="0" err="1"/>
-              <a:t>iaculis</a:t>
-            </a:r>
-            <a:r>
-              <a:rPr lang="en-US" dirty="0"/>
-              <a:t>, gravida ipsum </a:t>
-            </a:r>
-            <a:r>
-              <a:rPr lang="en-US" dirty="0" err="1"/>
-              <a:t>sed</a:t>
-            </a:r>
-            <a:r>
-              <a:rPr lang="en-US" dirty="0"/>
-              <a:t>, </a:t>
-            </a:r>
-            <a:r>
-              <a:rPr lang="en-US" dirty="0" err="1"/>
-              <a:t>euismod</a:t>
-            </a:r>
-            <a:r>
-              <a:rPr lang="en-US" dirty="0"/>
-              <a:t> </a:t>
-            </a:r>
-            <a:r>
-              <a:rPr lang="en-US" dirty="0" err="1"/>
-              <a:t>arcu</a:t>
-            </a:r>
-            <a:r>
-              <a:rPr lang="en-US" dirty="0"/>
-              <a:t>. </a:t>
-            </a:r>
-            <a:r>
-              <a:rPr lang="en-US" dirty="0" err="1"/>
-              <a:t>Phasellus</a:t>
-            </a:r>
-            <a:r>
-              <a:rPr lang="en-US" dirty="0"/>
-              <a:t> </a:t>
-            </a:r>
-            <a:r>
-              <a:rPr lang="en-US" dirty="0" err="1"/>
-              <a:t>tincidunt</a:t>
-            </a:r>
-            <a:r>
-              <a:rPr lang="en-US" dirty="0"/>
-              <a:t> id </a:t>
-            </a:r>
-            <a:r>
-              <a:rPr lang="en-US" dirty="0" err="1"/>
-              <a:t>metus</a:t>
-            </a:r>
-            <a:r>
-              <a:rPr lang="en-US" dirty="0"/>
-              <a:t> at </a:t>
-            </a:r>
-            <a:r>
-              <a:rPr lang="en-US" dirty="0" err="1"/>
-              <a:t>iaculis</a:t>
-            </a:r>
-            <a:r>
-              <a:rPr lang="en-US" dirty="0"/>
-              <a:t>.</a:t>
-            </a:r>
-          </a:p>
-        </p:txBody>
-      </p:sp>
-      <p:sp>
-        <p:nvSpPr>
-          <p:cNvPr id="4" name="Date Placeholder 3"/>
-          <p:cNvSpPr>
-            <a:spLocks noGrp="1"/>
-          </p:cNvSpPr>
-          <p:nvPr>
-            <p:ph type="dt" sz="half" idx="10"/>
-          </p:nvPr>
-        </p:nvSpPr>
-        <p:spPr/>
-        <p:txBody>
-          <a:bodyPr/>
-          <a:lstStyle/>
-          <a:p>
-            <a:fld id="{F78F707E-E062-5C47-A7FE-62DAAA8D2156}" type="datetime4">
-              <a:rPr lang="en-CA" smtClean="0"/>
-              <a:pPr/>
-              <a:t>July 11, 2021</a:t>
-            </a:fld>
-            <a:endParaRPr lang="en-US"/>
-          </a:p>
-        </p:txBody>
-      </p:sp>
-      <p:sp>
-        <p:nvSpPr>
-          <p:cNvPr id="6" name="Footer Placeholder 5"/>
-          <p:cNvSpPr>
-            <a:spLocks noGrp="1"/>
-          </p:cNvSpPr>
-          <p:nvPr>
-            <p:ph type="ftr" sz="quarter" idx="11"/>
-          </p:nvPr>
-        </p:nvSpPr>
-        <p:spPr/>
-        <p:txBody>
-          <a:bodyPr/>
-          <a:lstStyle/>
-          <a:p>
-            <a:endParaRPr lang="en-US"/>
-          </a:p>
-        </p:txBody>
-      </p:sp>
-      <p:sp>
-        <p:nvSpPr>
-          <p:cNvPr id="5" name="Slide Number Placeholder 4"/>
-          <p:cNvSpPr>
-            <a:spLocks noGrp="1"/>
-          </p:cNvSpPr>
-          <p:nvPr>
-            <p:ph type="sldNum" sz="quarter" idx="12"/>
-          </p:nvPr>
-        </p:nvSpPr>
-        <p:spPr/>
-        <p:txBody>
-          <a:bodyPr/>
-          <a:lstStyle/>
-          <a:p>
-            <a:fld id="{70341EDA-DF76-394C-B359-28542C3A7753}" type="slidenum">
-              <a:rPr lang="en-US" smtClean="0"/>
-              <a:pPr/>
-              <a:t>8</a:t>
-            </a:fld>
-            <a:endParaRPr lang="en-US"/>
+              <a:t>Fort Knox Heap Leach Model Remake</a:t>
+            </a:r>
+            <a:endParaRPr lang="en-US" dirty="0"/>
+          </a:p>
+        </p:txBody>
+      </p:sp>
+      <p:sp>
+        <p:nvSpPr>
+          <p:cNvPr id="7" name="TextBox 6">
+            <a:extLst>
+              <a:ext uri="{FF2B5EF4-FFF2-40B4-BE49-F238E27FC236}">
+                <a16:creationId xmlns:a16="http://schemas.microsoft.com/office/drawing/2014/main" id="{0AB25EBC-9A2C-B04B-8B20-B81D98946878}"/>
+              </a:ext>
+            </a:extLst>
+          </p:cNvPr>
+          <p:cNvSpPr txBox="1"/>
+          <p:nvPr/>
+        </p:nvSpPr>
+        <p:spPr>
+          <a:xfrm rot="-900000">
+            <a:off x="3456773" y="1545162"/>
+            <a:ext cx="5996920" cy="2585323"/>
+          </a:xfrm>
+          <a:prstGeom prst="rect">
+            <a:avLst/>
+          </a:prstGeom>
+          <a:noFill/>
+        </p:spPr>
+        <p:txBody>
+          <a:bodyPr wrap="square" rtlCol="0">
+            <a:spAutoFit/>
+          </a:bodyPr>
+          <a:lstStyle/>
+          <a:p>
+            <a:r>
+              <a:rPr lang="en-US" sz="5400" b="1" dirty="0" smtClean="0">
+                <a:solidFill>
+                  <a:schemeClr val="bg1">
+                    <a:alpha val="75000"/>
+                  </a:schemeClr>
+                </a:solidFill>
+                <a:latin typeface="+mj-lt"/>
+              </a:rPr>
+              <a:t>Plan to put some </a:t>
+            </a:r>
+          </a:p>
+          <a:p>
+            <a:r>
+              <a:rPr lang="en-US" sz="5400" b="1" dirty="0" smtClean="0">
+                <a:solidFill>
+                  <a:schemeClr val="bg1">
+                    <a:alpha val="75000"/>
+                  </a:schemeClr>
+                </a:solidFill>
+                <a:latin typeface="+mj-lt"/>
+              </a:rPr>
+              <a:t>Relative picture here</a:t>
+            </a:r>
+            <a:endParaRPr lang="en-US" sz="5400" b="1" dirty="0">
+              <a:solidFill>
+                <a:schemeClr val="bg1">
+                  <a:alpha val="75000"/>
+                </a:schemeClr>
+              </a:solidFill>
+              <a:latin typeface="+mj-lt"/>
+            </a:endParaRPr>
           </a:p>
         </p:txBody>
       </p:sp>
     </p:spTree>
     <p:extLst>
       <p:ext uri="{BB962C8B-B14F-4D97-AF65-F5344CB8AC3E}">
-        <p14:creationId xmlns:p14="http://schemas.microsoft.com/office/powerpoint/2010/main" val="392478255"/>
+        <p14:creationId xmlns:p14="http://schemas.microsoft.com/office/powerpoint/2010/main" val="376995651"/>
       </p:ext>
     </p:extLst>
   </p:cSld>
@@ -9414,6 +9912,29 @@
       </p:grpSpPr>
       <p:sp>
         <p:nvSpPr>
+          <p:cNvPr id="2" name="Title 1"/>
+          <p:cNvSpPr>
+            <a:spLocks noGrp="1"/>
+          </p:cNvSpPr>
+          <p:nvPr>
+            <p:ph type="title"/>
+          </p:nvPr>
+        </p:nvSpPr>
+        <p:spPr/>
+        <p:txBody>
+          <a:bodyPr/>
+          <a:lstStyle/>
+          <a:p>
+            <a:r>
+              <a:rPr lang="en-US" dirty="0" smtClean="0"/>
+              <a:t>Data Exploration</a:t>
+            </a:r>
+            <a:endParaRPr lang="en-US" dirty="0"/>
+          </a:p>
+        </p:txBody>
+      </p:sp>
+      <p:sp>
+        <p:nvSpPr>
           <p:cNvPr id="3" name="Date Placeholder 2"/>
           <p:cNvSpPr>
             <a:spLocks noGrp="1"/>
@@ -9427,10 +9948,10 @@
           <a:bodyPr/>
           <a:lstStyle/>
           <a:p>
-            <a:fld id="{9FCBCA37-E9DE-A841-81BB-554CC890BCE4}" type="datetime4">
+            <a:fld id="{49FF2BEF-23C6-5D43-816C-81833513DDC1}" type="datetime4">
               <a:rPr lang="en-CA" smtClean="0"/>
               <a:pPr/>
-              <a:t>July 11, 2021</a:t>
+              <a:t>July 23, 2021</a:t>
             </a:fld>
             <a:endParaRPr lang="en-US"/>
           </a:p>
@@ -9438,7 +9959,7 @@
       </p:sp>
       <p:sp>
         <p:nvSpPr>
-          <p:cNvPr id="5" name="Footer Placeholder 4"/>
+          <p:cNvPr id="7" name="Footer Placeholder 6"/>
           <p:cNvSpPr>
             <a:spLocks noGrp="1"/>
           </p:cNvSpPr>
@@ -9457,7 +9978,7 @@
       </p:sp>
       <p:sp>
         <p:nvSpPr>
-          <p:cNvPr id="4" name="Slide Number Placeholder 3"/>
+          <p:cNvPr id="6" name="Slide Number Placeholder 5"/>
           <p:cNvSpPr>
             <a:spLocks noGrp="1"/>
           </p:cNvSpPr>
@@ -9481,12 +10002,68 @@
       </p:sp>
       <p:sp>
         <p:nvSpPr>
-          <p:cNvPr id="6" name="Content Placeholder 5"/>
-          <p:cNvSpPr>
-            <a:spLocks noGrp="1"/>
-          </p:cNvSpPr>
-          <p:nvPr>
-            <p:ph idx="1"/>
+          <p:cNvPr id="4" name="Content Placeholder 3"/>
+          <p:cNvSpPr>
+            <a:spLocks noGrp="1"/>
+          </p:cNvSpPr>
+          <p:nvPr>
+            <p:ph idx="13"/>
+          </p:nvPr>
+        </p:nvSpPr>
+        <p:spPr>
+          <a:xfrm>
+            <a:off x="687600" y="1149599"/>
+            <a:ext cx="7768800" cy="3418375"/>
+          </a:xfrm>
+        </p:spPr>
+        <p:txBody>
+          <a:bodyPr/>
+          <a:lstStyle/>
+          <a:p>
+            <a:r>
+              <a:rPr lang="en-US" dirty="0" smtClean="0"/>
+              <a:t>Leach pad information:</a:t>
+            </a:r>
+          </a:p>
+          <a:p>
+            <a:pPr lvl="1"/>
+            <a:r>
+              <a:rPr lang="en-US" dirty="0" smtClean="0"/>
+              <a:t>Cells polygons</a:t>
+            </a:r>
+          </a:p>
+          <a:p>
+            <a:pPr lvl="1"/>
+            <a:r>
+              <a:rPr lang="en-US" dirty="0" smtClean="0"/>
+              <a:t>Cells material information</a:t>
+            </a:r>
+          </a:p>
+          <a:p>
+            <a:pPr marL="342900" lvl="1" indent="0">
+              <a:buNone/>
+            </a:pPr>
+            <a:endParaRPr lang="en-US" dirty="0" smtClean="0"/>
+          </a:p>
+          <a:p>
+            <a:r>
+              <a:rPr lang="en-US" dirty="0" smtClean="0"/>
+              <a:t>Geochemistry information</a:t>
+            </a:r>
+          </a:p>
+          <a:p>
+            <a:endParaRPr lang="en-US" dirty="0" smtClean="0"/>
+          </a:p>
+        </p:txBody>
+      </p:sp>
+      <p:sp>
+        <p:nvSpPr>
+          <p:cNvPr id="14" name="Text Placeholder 13"/>
+          <p:cNvSpPr>
+            <a:spLocks noGrp="1"/>
+          </p:cNvSpPr>
+          <p:nvPr>
+            <p:ph type="body" sz="quarter" idx="15"/>
           </p:nvPr>
         </p:nvSpPr>
         <p:spPr/>
@@ -9494,14 +10071,18 @@
           <a:bodyPr/>
           <a:lstStyle/>
           <a:p>
-            <a:endParaRPr lang="en-CA"/>
+            <a:r>
+              <a:rPr lang="en-US" dirty="0"/>
+              <a:t>Fort Knox Heap Leach Model Remake</a:t>
+            </a:r>
+            <a:endParaRPr lang="en-US" dirty="0"/>
           </a:p>
         </p:txBody>
       </p:sp>
     </p:spTree>
     <p:extLst>
       <p:ext uri="{BB962C8B-B14F-4D97-AF65-F5344CB8AC3E}">
-        <p14:creationId xmlns:p14="http://schemas.microsoft.com/office/powerpoint/2010/main" val="1638810932"/>
+        <p14:creationId xmlns:p14="http://schemas.microsoft.com/office/powerpoint/2010/main" val="1335716075"/>
       </p:ext>
     </p:extLst>
   </p:cSld>
@@ -10034,9 +10615,12 @@
 </file>
 
 <file path=customXml/item1.xml><?xml version="1.0" encoding="utf-8"?>
-<p:properties xmlns:p="http://schemas.microsoft.com/office/2006/metadata/properties" xmlns:xsi="http://www.w3.org/2001/XMLSchema-instance" xmlns:pc="http://schemas.microsoft.com/office/infopath/2007/PartnerControls">
-  <documentManagement/>
-</p:properties>
+<?mso-contentType ?>
+<FormTemplates xmlns="http://schemas.microsoft.com/sharepoint/v3/contenttype/forms">
+  <Display>DocumentLibraryForm</Display>
+  <Edit>DocumentLibraryForm</Edit>
+  <New>DocumentLibraryForm</New>
+</FormTemplates>
 </file>
 
 <file path=customXml/item2.xml><?xml version="1.0" encoding="utf-8"?>
@@ -10154,25 +10738,15 @@
 </file>
 
 <file path=customXml/item3.xml><?xml version="1.0" encoding="utf-8"?>
-<?mso-contentType ?>
-<FormTemplates xmlns="http://schemas.microsoft.com/sharepoint/v3/contenttype/forms">
-  <Display>DocumentLibraryForm</Display>
-  <Edit>DocumentLibraryForm</Edit>
-  <New>DocumentLibraryForm</New>
-</FormTemplates>
+<p:properties xmlns:p="http://schemas.microsoft.com/office/2006/metadata/properties" xmlns:xsi="http://www.w3.org/2001/XMLSchema-instance" xmlns:pc="http://schemas.microsoft.com/office/infopath/2007/PartnerControls">
+  <documentManagement/>
+</p:properties>
 </file>
 
 <file path=customXml/itemProps1.xml><?xml version="1.0" encoding="utf-8"?>
-<ds:datastoreItem xmlns:ds="http://schemas.openxmlformats.org/officeDocument/2006/customXml" ds:itemID="{87EC307F-6696-4FF8-8677-D3EF1D29AE74}">
+<ds:datastoreItem xmlns:ds="http://schemas.openxmlformats.org/officeDocument/2006/customXml" ds:itemID="{19036592-6B47-4660-8F42-1BC6503C71A9}">
   <ds:schemaRefs>
-    <ds:schemaRef ds:uri="http://schemas.openxmlformats.org/package/2006/metadata/core-properties"/>
-    <ds:schemaRef ds:uri="http://purl.org/dc/dcmitype/"/>
-    <ds:schemaRef ds:uri="http://purl.org/dc/elements/1.1/"/>
-    <ds:schemaRef ds:uri="http://purl.org/dc/terms/"/>
-    <ds:schemaRef ds:uri="http://schemas.microsoft.com/office/2006/metadata/properties"/>
-    <ds:schemaRef ds:uri="http://schemas.microsoft.com/office/2006/documentManagement/types"/>
-    <ds:schemaRef ds:uri="http://www.w3.org/XML/1998/namespace"/>
-    <ds:schemaRef ds:uri="http://schemas.microsoft.com/office/infopath/2007/PartnerControls"/>
+    <ds:schemaRef ds:uri="http://schemas.microsoft.com/sharepoint/v3/contenttype/forms"/>
   </ds:schemaRefs>
 </ds:datastoreItem>
 </file>
@@ -10194,9 +10768,16 @@
 </file>
 
 <file path=customXml/itemProps3.xml><?xml version="1.0" encoding="utf-8"?>
-<ds:datastoreItem xmlns:ds="http://schemas.openxmlformats.org/officeDocument/2006/customXml" ds:itemID="{19036592-6B47-4660-8F42-1BC6503C71A9}">
+<ds:datastoreItem xmlns:ds="http://schemas.openxmlformats.org/officeDocument/2006/customXml" ds:itemID="{87EC307F-6696-4FF8-8677-D3EF1D29AE74}">
   <ds:schemaRefs>
-    <ds:schemaRef ds:uri="http://schemas.microsoft.com/sharepoint/v3/contenttype/forms"/>
+    <ds:schemaRef ds:uri="http://schemas.openxmlformats.org/package/2006/metadata/core-properties"/>
+    <ds:schemaRef ds:uri="http://schemas.microsoft.com/office/2006/documentManagement/types"/>
+    <ds:schemaRef ds:uri="http://schemas.microsoft.com/office/infopath/2007/PartnerControls"/>
+    <ds:schemaRef ds:uri="http://purl.org/dc/terms/"/>
+    <ds:schemaRef ds:uri="http://purl.org/dc/dcmitype/"/>
+    <ds:schemaRef ds:uri="http://www.w3.org/XML/1998/namespace"/>
+    <ds:schemaRef ds:uri="http://schemas.microsoft.com/office/2006/metadata/properties"/>
+    <ds:schemaRef ds:uri="http://purl.org/dc/elements/1.1/"/>
   </ds:schemaRefs>
 </ds:datastoreItem>
 </file>
</xml_diff>

<commit_message>
small change on .ppt
</commit_message>
<xml_diff>
--- a/FK_HL_Model_Remake.pptx
+++ b/FK_HL_Model_Remake.pptx
@@ -5,7 +5,7 @@
     <p:sldMasterId id="2147483660" r:id="rId4"/>
   </p:sldMasterIdLst>
   <p:notesMasterIdLst>
-    <p:notesMasterId r:id="rId14"/>
+    <p:notesMasterId r:id="rId17"/>
   </p:notesMasterIdLst>
   <p:sldIdLst>
     <p:sldId id="285" r:id="rId5"/>
@@ -14,9 +14,12 @@
     <p:sldId id="257" r:id="rId8"/>
     <p:sldId id="305" r:id="rId9"/>
     <p:sldId id="258" r:id="rId10"/>
-    <p:sldId id="259" r:id="rId11"/>
-    <p:sldId id="263" r:id="rId12"/>
-    <p:sldId id="268" r:id="rId13"/>
+    <p:sldId id="306" r:id="rId11"/>
+    <p:sldId id="259" r:id="rId12"/>
+    <p:sldId id="307" r:id="rId13"/>
+    <p:sldId id="308" r:id="rId14"/>
+    <p:sldId id="263" r:id="rId15"/>
+    <p:sldId id="268" r:id="rId16"/>
   </p:sldIdLst>
   <p:sldSz cx="9144000" cy="5143500" type="screen16x9"/>
   <p:notesSz cx="6858000" cy="9144000"/>
@@ -205,7 +208,7 @@
           <a:p>
             <a:fld id="{21164539-4278-BE42-8F61-4C94F5FD0226}" type="datetimeFigureOut">
               <a:rPr lang="en-US" smtClean="0"/>
-              <a:t>7/11/2021</a:t>
+              <a:t>8/4/2021</a:t>
             </a:fld>
             <a:endParaRPr lang="en-US"/>
           </a:p>
@@ -621,7 +624,7 @@
           <a:p>
             <a:fld id="{819D4EE1-14A9-CE4B-823B-CB2A32A8C395}" type="slidenum">
               <a:rPr lang="en-US" smtClean="0"/>
-              <a:t>8</a:t>
+              <a:t>11</a:t>
             </a:fld>
             <a:endParaRPr lang="en-US"/>
           </a:p>
@@ -840,7 +843,7 @@
           <a:p>
             <a:fld id="{C6689B86-083C-4A42-8888-BAB16E4B4DA7}" type="datetime4">
               <a:rPr lang="en-CA" smtClean="0"/>
-              <a:t>July 11, 2021</a:t>
+              <a:t>August 4, 2021</a:t>
             </a:fld>
             <a:endParaRPr lang="en-US" dirty="0"/>
           </a:p>
@@ -1015,7 +1018,7 @@
           <a:p>
             <a:fld id="{8EC16C23-3C30-CD46-877E-3E22753DE2DD}" type="datetime4">
               <a:rPr lang="en-CA" smtClean="0"/>
-              <a:t>July 11, 2021</a:t>
+              <a:t>August 4, 2021</a:t>
             </a:fld>
             <a:endParaRPr lang="en-US" dirty="0"/>
           </a:p>
@@ -1362,7 +1365,7 @@
           <a:p>
             <a:fld id="{18DAA47B-4062-2645-ADD8-10E70E79D0BB}" type="datetime4">
               <a:rPr lang="en-CA" smtClean="0"/>
-              <a:t>July 11, 2021</a:t>
+              <a:t>August 4, 2021</a:t>
             </a:fld>
             <a:endParaRPr lang="en-US" dirty="0"/>
           </a:p>
@@ -1776,7 +1779,7 @@
           <a:p>
             <a:fld id="{10E38F1C-BEA5-784A-83C8-5B6DC70122C6}" type="datetime4">
               <a:rPr lang="en-CA" smtClean="0"/>
-              <a:t>July 11, 2021</a:t>
+              <a:t>August 4, 2021</a:t>
             </a:fld>
             <a:endParaRPr lang="en-US" dirty="0"/>
           </a:p>
@@ -2297,7 +2300,7 @@
           <a:p>
             <a:fld id="{685E96B0-41DE-F440-80BA-6CFE5B0D6B94}" type="datetime4">
               <a:rPr lang="en-CA" smtClean="0"/>
-              <a:t>July 11, 2021</a:t>
+              <a:t>August 4, 2021</a:t>
             </a:fld>
             <a:endParaRPr lang="en-US"/>
           </a:p>
@@ -2688,7 +2691,7 @@
           <a:p>
             <a:fld id="{8FDE5476-5569-604A-8A87-08C5982958A2}" type="datetime4">
               <a:rPr lang="en-CA" smtClean="0"/>
-              <a:t>July 11, 2021</a:t>
+              <a:t>August 4, 2021</a:t>
             </a:fld>
             <a:endParaRPr lang="en-US" dirty="0"/>
           </a:p>
@@ -2907,7 +2910,7 @@
           <a:p>
             <a:fld id="{E7C71A3B-F3C1-4447-8716-2DA1915E9000}" type="datetime4">
               <a:rPr lang="en-CA" smtClean="0"/>
-              <a:t>July 11, 2021</a:t>
+              <a:t>August 4, 2021</a:t>
             </a:fld>
             <a:endParaRPr lang="en-US"/>
           </a:p>
@@ -3101,7 +3104,7 @@
           <a:p>
             <a:fld id="{788EC684-F565-6140-A5D6-DA9A9407E56E}" type="datetime4">
               <a:rPr lang="en-CA" smtClean="0"/>
-              <a:t>July 11, 2021</a:t>
+              <a:t>August 4, 2021</a:t>
             </a:fld>
             <a:endParaRPr lang="en-US"/>
           </a:p>
@@ -3632,7 +3635,7 @@
           <a:p>
             <a:fld id="{9C84DA30-0C2B-9F48-A1E1-0748AFD0DC6B}" type="datetime4">
               <a:rPr lang="en-CA" smtClean="0"/>
-              <a:t>July 11, 2021</a:t>
+              <a:t>August 4, 2021</a:t>
             </a:fld>
             <a:endParaRPr lang="en-US"/>
           </a:p>
@@ -3946,7 +3949,7 @@
           <a:p>
             <a:fld id="{BE5294DF-69CC-B446-91AB-0C6001469F63}" type="datetime4">
               <a:rPr lang="en-CA" smtClean="0"/>
-              <a:t>July 11, 2021</a:t>
+              <a:t>August 4, 2021</a:t>
             </a:fld>
             <a:endParaRPr lang="en-US"/>
           </a:p>
@@ -4125,7 +4128,7 @@
           <a:p>
             <a:fld id="{1E192792-884A-AD43-BE8E-8F1FC1D5646F}" type="datetime4">
               <a:rPr lang="en-CA" smtClean="0"/>
-              <a:t>July 11, 2021</a:t>
+              <a:t>August 4, 2021</a:t>
             </a:fld>
             <a:endParaRPr lang="en-US" dirty="0"/>
           </a:p>
@@ -4319,7 +4322,7 @@
           <a:p>
             <a:fld id="{4ABFA5F4-1252-224A-99A5-A35556FE5E1C}" type="datetime4">
               <a:rPr lang="en-CA" smtClean="0"/>
-              <a:t>July 11, 2021</a:t>
+              <a:t>August 4, 2021</a:t>
             </a:fld>
             <a:endParaRPr lang="en-US"/>
           </a:p>
@@ -4709,7 +4712,7 @@
           <a:p>
             <a:fld id="{C0814498-84C9-1446-B8F0-92F3EC01D033}" type="datetime4">
               <a:rPr lang="en-CA" smtClean="0"/>
-              <a:t>July 11, 2021</a:t>
+              <a:t>August 4, 2021</a:t>
             </a:fld>
             <a:endParaRPr lang="en-US"/>
           </a:p>
@@ -5241,7 +5244,7 @@
           <a:p>
             <a:fld id="{F8D88939-0256-8E43-94E7-E508EE61424E}" type="datetime4">
               <a:rPr lang="en-CA" smtClean="0"/>
-              <a:t>July 11, 2021</a:t>
+              <a:t>August 4, 2021</a:t>
             </a:fld>
             <a:endParaRPr lang="en-US" dirty="0"/>
           </a:p>
@@ -6443,7 +6446,7 @@
             <a:fld id="{84A601FB-51CE-0D47-9BCA-D722657D0795}" type="datetime4">
               <a:rPr lang="en-CA" smtClean="0"/>
               <a:pPr/>
-              <a:t>July 11, 2021</a:t>
+              <a:t>August 4, 2021</a:t>
             </a:fld>
             <a:endParaRPr lang="en-US" dirty="0"/>
           </a:p>
@@ -6496,6 +6499,616 @@
     <p:extLst>
       <p:ext uri="{BB962C8B-B14F-4D97-AF65-F5344CB8AC3E}">
         <p14:creationId xmlns:p14="http://schemas.microsoft.com/office/powerpoint/2010/main" val="65507504"/>
+      </p:ext>
+    </p:extLst>
+  </p:cSld>
+  <p:clrMapOvr>
+    <a:masterClrMapping/>
+  </p:clrMapOvr>
+</p:sld>
+</file>
+
+<file path=ppt/slides/slide10.xml><?xml version="1.0" encoding="utf-8"?>
+<p:sld xmlns:a="http://schemas.openxmlformats.org/drawingml/2006/main" xmlns:r="http://schemas.openxmlformats.org/officeDocument/2006/relationships" xmlns:p="http://schemas.openxmlformats.org/presentationml/2006/main">
+  <p:cSld>
+    <p:spTree>
+      <p:nvGrpSpPr>
+        <p:cNvPr id="1" name=""/>
+        <p:cNvGrpSpPr/>
+        <p:nvPr/>
+      </p:nvGrpSpPr>
+      <p:grpSpPr>
+        <a:xfrm>
+          <a:off x="0" y="0"/>
+          <a:ext cx="0" cy="0"/>
+          <a:chOff x="0" y="0"/>
+          <a:chExt cx="0" cy="0"/>
+        </a:xfrm>
+      </p:grpSpPr>
+      <p:sp>
+        <p:nvSpPr>
+          <p:cNvPr id="2" name="Title 1"/>
+          <p:cNvSpPr>
+            <a:spLocks noGrp="1"/>
+          </p:cNvSpPr>
+          <p:nvPr>
+            <p:ph type="title"/>
+          </p:nvPr>
+        </p:nvSpPr>
+        <p:spPr/>
+        <p:txBody>
+          <a:bodyPr/>
+          <a:lstStyle/>
+          <a:p>
+            <a:r>
+              <a:rPr lang="en-US" dirty="0" smtClean="0"/>
+              <a:t>Data analysis</a:t>
+            </a:r>
+            <a:endParaRPr lang="en-US" dirty="0"/>
+          </a:p>
+        </p:txBody>
+      </p:sp>
+      <p:sp>
+        <p:nvSpPr>
+          <p:cNvPr id="3" name="Date Placeholder 2"/>
+          <p:cNvSpPr>
+            <a:spLocks noGrp="1"/>
+          </p:cNvSpPr>
+          <p:nvPr>
+            <p:ph type="dt" sz="half" idx="10"/>
+          </p:nvPr>
+        </p:nvSpPr>
+        <p:spPr/>
+        <p:txBody>
+          <a:bodyPr/>
+          <a:lstStyle/>
+          <a:p>
+            <a:fld id="{49FF2BEF-23C6-5D43-816C-81833513DDC1}" type="datetime4">
+              <a:rPr lang="en-CA" smtClean="0"/>
+              <a:pPr/>
+              <a:t>August 4, 2021</a:t>
+            </a:fld>
+            <a:endParaRPr lang="en-US"/>
+          </a:p>
+        </p:txBody>
+      </p:sp>
+      <p:sp>
+        <p:nvSpPr>
+          <p:cNvPr id="7" name="Footer Placeholder 6"/>
+          <p:cNvSpPr>
+            <a:spLocks noGrp="1"/>
+          </p:cNvSpPr>
+          <p:nvPr>
+            <p:ph type="ftr" sz="quarter" idx="11"/>
+          </p:nvPr>
+        </p:nvSpPr>
+        <p:spPr/>
+        <p:txBody>
+          <a:bodyPr/>
+          <a:lstStyle/>
+          <a:p>
+            <a:endParaRPr lang="en-US"/>
+          </a:p>
+        </p:txBody>
+      </p:sp>
+      <p:sp>
+        <p:nvSpPr>
+          <p:cNvPr id="6" name="Slide Number Placeholder 5"/>
+          <p:cNvSpPr>
+            <a:spLocks noGrp="1"/>
+          </p:cNvSpPr>
+          <p:nvPr>
+            <p:ph type="sldNum" sz="quarter" idx="12"/>
+          </p:nvPr>
+        </p:nvSpPr>
+        <p:spPr/>
+        <p:txBody>
+          <a:bodyPr/>
+          <a:lstStyle/>
+          <a:p>
+            <a:fld id="{70341EDA-DF76-394C-B359-28542C3A7753}" type="slidenum">
+              <a:rPr lang="en-US" smtClean="0"/>
+              <a:pPr/>
+              <a:t>10</a:t>
+            </a:fld>
+            <a:endParaRPr lang="en-US"/>
+          </a:p>
+        </p:txBody>
+      </p:sp>
+      <p:sp>
+        <p:nvSpPr>
+          <p:cNvPr id="4" name="Content Placeholder 3"/>
+          <p:cNvSpPr>
+            <a:spLocks noGrp="1"/>
+          </p:cNvSpPr>
+          <p:nvPr>
+            <p:ph idx="13"/>
+          </p:nvPr>
+        </p:nvSpPr>
+        <p:spPr>
+          <a:xfrm>
+            <a:off x="687600" y="1149599"/>
+            <a:ext cx="7768800" cy="3418375"/>
+          </a:xfrm>
+        </p:spPr>
+        <p:txBody>
+          <a:bodyPr/>
+          <a:lstStyle/>
+          <a:p>
+            <a:r>
+              <a:rPr lang="en-US" dirty="0" smtClean="0"/>
+              <a:t>Heap leach model key functions:</a:t>
+            </a:r>
+          </a:p>
+          <a:p>
+            <a:pPr lvl="1"/>
+            <a:r>
+              <a:rPr lang="en-US" dirty="0" smtClean="0"/>
+              <a:t>Leach cell leach date conflicts check.</a:t>
+            </a:r>
+          </a:p>
+          <a:p>
+            <a:pPr marL="685800" lvl="2" indent="0">
+              <a:buNone/>
+            </a:pPr>
+            <a:r>
+              <a:rPr lang="en-US" dirty="0" smtClean="0"/>
+              <a:t>The leaching end date of area that is on an lower elevation must be prior to the stacking finish date of area that is directly above it. The analysis uses shapely module to check if two areas overlap. If so, check the lower area’s leach end date and the upper area’s stacking finish date. Adjust the lower area’s leach end date accordingly to avoid date conflict.</a:t>
+            </a:r>
+          </a:p>
+          <a:p>
+            <a:pPr lvl="1"/>
+            <a:r>
+              <a:rPr lang="en-US" dirty="0" smtClean="0"/>
+              <a:t>Break cells into blocks.</a:t>
+            </a:r>
+          </a:p>
+          <a:p>
+            <a:pPr marL="685800" lvl="2" indent="0">
+              <a:buNone/>
+            </a:pPr>
+            <a:r>
+              <a:rPr lang="en-US" dirty="0" smtClean="0"/>
+              <a:t>Divide cells into multiple equal size blocks along latitude and longitude. Assume each block from the same cell has the same initial physical properties, including tonnage, ounces, leaching performance, etc. The only differences between blocks in the same cell are the coordinates.</a:t>
+            </a:r>
+          </a:p>
+          <a:p>
+            <a:pPr lvl="1"/>
+            <a:r>
+              <a:rPr lang="en-US" dirty="0" smtClean="0"/>
+              <a:t>Calculate blocks gold recovery over months.</a:t>
+            </a:r>
+          </a:p>
+          <a:p>
+            <a:pPr lvl="2"/>
+            <a:r>
+              <a:rPr lang="en-US" dirty="0" smtClean="0"/>
+              <a:t>Primary leach: the material in a block receives cyanide solution for the first time.</a:t>
+            </a:r>
+          </a:p>
+          <a:p>
+            <a:pPr lvl="2"/>
+            <a:r>
+              <a:rPr lang="en-US" dirty="0" smtClean="0"/>
+              <a:t>Secondary leach: block </a:t>
+            </a:r>
+            <a:r>
+              <a:rPr lang="en-US" smtClean="0"/>
+              <a:t>of material </a:t>
+            </a:r>
+            <a:r>
+              <a:rPr lang="en-US" dirty="0" smtClean="0"/>
+              <a:t>receives cyanide solution drained down from the block above this block.</a:t>
+            </a:r>
+          </a:p>
+          <a:p>
+            <a:pPr lvl="1"/>
+            <a:endParaRPr lang="en-US" dirty="0" smtClean="0"/>
+          </a:p>
+        </p:txBody>
+      </p:sp>
+      <p:sp>
+        <p:nvSpPr>
+          <p:cNvPr id="14" name="Text Placeholder 13"/>
+          <p:cNvSpPr>
+            <a:spLocks noGrp="1"/>
+          </p:cNvSpPr>
+          <p:nvPr>
+            <p:ph type="body" sz="quarter" idx="15"/>
+          </p:nvPr>
+        </p:nvSpPr>
+        <p:spPr/>
+        <p:txBody>
+          <a:bodyPr/>
+          <a:lstStyle/>
+          <a:p>
+            <a:r>
+              <a:rPr lang="en-US" dirty="0"/>
+              <a:t>Fort Knox Heap Leach Model Remake</a:t>
+            </a:r>
+          </a:p>
+        </p:txBody>
+      </p:sp>
+    </p:spTree>
+    <p:extLst>
+      <p:ext uri="{BB962C8B-B14F-4D97-AF65-F5344CB8AC3E}">
+        <p14:creationId xmlns:p14="http://schemas.microsoft.com/office/powerpoint/2010/main" val="3483734029"/>
+      </p:ext>
+    </p:extLst>
+  </p:cSld>
+  <p:clrMapOvr>
+    <a:masterClrMapping/>
+  </p:clrMapOvr>
+</p:sld>
+</file>
+
+<file path=ppt/slides/slide11.xml><?xml version="1.0" encoding="utf-8"?>
+<p:sld xmlns:a="http://schemas.openxmlformats.org/drawingml/2006/main" xmlns:r="http://schemas.openxmlformats.org/officeDocument/2006/relationships" xmlns:p="http://schemas.openxmlformats.org/presentationml/2006/main">
+  <p:cSld>
+    <p:spTree>
+      <p:nvGrpSpPr>
+        <p:cNvPr id="1" name=""/>
+        <p:cNvGrpSpPr/>
+        <p:nvPr/>
+      </p:nvGrpSpPr>
+      <p:grpSpPr>
+        <a:xfrm>
+          <a:off x="0" y="0"/>
+          <a:ext cx="0" cy="0"/>
+          <a:chOff x="0" y="0"/>
+          <a:chExt cx="0" cy="0"/>
+        </a:xfrm>
+      </p:grpSpPr>
+      <p:pic>
+        <p:nvPicPr>
+          <p:cNvPr id="12" name="Picture Placeholder 11"/>
+          <p:cNvPicPr>
+            <a:picLocks noGrp="1" noChangeAspect="1"/>
+          </p:cNvPicPr>
+          <p:nvPr>
+            <p:ph type="pic" sz="quarter" idx="13"/>
+          </p:nvPr>
+        </p:nvPicPr>
+        <p:blipFill>
+          <a:blip r:embed="rId3" cstate="screen">
+            <a:alphaModFix amt="5000"/>
+            <a:extLst>
+              <a:ext uri="{28A0092B-C50C-407E-A947-70E740481C1C}">
+                <a14:useLocalDpi xmlns:a14="http://schemas.microsoft.com/office/drawing/2010/main"/>
+              </a:ext>
+            </a:extLst>
+          </a:blip>
+          <a:srcRect/>
+          <a:stretch>
+            <a:fillRect/>
+          </a:stretch>
+        </p:blipFill>
+        <p:spPr/>
+      </p:pic>
+      <p:sp>
+        <p:nvSpPr>
+          <p:cNvPr id="2" name="Title 1"/>
+          <p:cNvSpPr>
+            <a:spLocks noGrp="1"/>
+          </p:cNvSpPr>
+          <p:nvPr>
+            <p:ph type="title"/>
+          </p:nvPr>
+        </p:nvSpPr>
+        <p:spPr/>
+        <p:txBody>
+          <a:bodyPr/>
+          <a:lstStyle/>
+          <a:p>
+            <a:r>
+              <a:rPr lang="en-US"/>
+              <a:t>This is an alternate divider slide</a:t>
+            </a:r>
+            <a:endParaRPr lang="en-US" dirty="0"/>
+          </a:p>
+        </p:txBody>
+      </p:sp>
+      <p:sp>
+        <p:nvSpPr>
+          <p:cNvPr id="3" name="Text Placeholder 2"/>
+          <p:cNvSpPr>
+            <a:spLocks noGrp="1"/>
+          </p:cNvSpPr>
+          <p:nvPr>
+            <p:ph type="body" idx="1"/>
+          </p:nvPr>
+        </p:nvSpPr>
+        <p:spPr/>
+        <p:txBody>
+          <a:bodyPr/>
+          <a:lstStyle/>
+          <a:p>
+            <a:r>
+              <a:rPr lang="en-US" dirty="0" err="1"/>
+              <a:t>Sed</a:t>
+            </a:r>
+            <a:r>
+              <a:rPr lang="en-US" dirty="0"/>
+              <a:t> </a:t>
+            </a:r>
+            <a:r>
+              <a:rPr lang="en-US" dirty="0" err="1"/>
+              <a:t>elementum</a:t>
+            </a:r>
+            <a:r>
+              <a:rPr lang="en-US" dirty="0"/>
+              <a:t> semper </a:t>
+            </a:r>
+            <a:r>
+              <a:rPr lang="en-US" dirty="0" err="1"/>
+              <a:t>consequat</a:t>
+            </a:r>
+            <a:r>
+              <a:rPr lang="en-US" dirty="0"/>
+              <a:t>. </a:t>
+            </a:r>
+            <a:r>
+              <a:rPr lang="en-US" dirty="0" err="1"/>
+              <a:t>Donec</a:t>
+            </a:r>
+            <a:r>
+              <a:rPr lang="en-US" dirty="0"/>
+              <a:t> a quam </a:t>
+            </a:r>
+            <a:r>
+              <a:rPr lang="en-US" dirty="0" err="1"/>
+              <a:t>iaculis</a:t>
+            </a:r>
+            <a:r>
+              <a:rPr lang="en-US" dirty="0"/>
+              <a:t>, gravida ipsum </a:t>
+            </a:r>
+            <a:r>
+              <a:rPr lang="en-US" dirty="0" err="1"/>
+              <a:t>sed</a:t>
+            </a:r>
+            <a:r>
+              <a:rPr lang="en-US" dirty="0"/>
+              <a:t>, </a:t>
+            </a:r>
+            <a:r>
+              <a:rPr lang="en-US" dirty="0" err="1"/>
+              <a:t>euismod</a:t>
+            </a:r>
+            <a:r>
+              <a:rPr lang="en-US" dirty="0"/>
+              <a:t> </a:t>
+            </a:r>
+            <a:r>
+              <a:rPr lang="en-US" dirty="0" err="1"/>
+              <a:t>arcu</a:t>
+            </a:r>
+            <a:r>
+              <a:rPr lang="en-US" dirty="0"/>
+              <a:t>. </a:t>
+            </a:r>
+            <a:r>
+              <a:rPr lang="en-US" dirty="0" err="1"/>
+              <a:t>Phasellus</a:t>
+            </a:r>
+            <a:r>
+              <a:rPr lang="en-US" dirty="0"/>
+              <a:t> </a:t>
+            </a:r>
+            <a:r>
+              <a:rPr lang="en-US" dirty="0" err="1"/>
+              <a:t>tincidunt</a:t>
+            </a:r>
+            <a:r>
+              <a:rPr lang="en-US" dirty="0"/>
+              <a:t> id </a:t>
+            </a:r>
+            <a:r>
+              <a:rPr lang="en-US" dirty="0" err="1"/>
+              <a:t>metus</a:t>
+            </a:r>
+            <a:r>
+              <a:rPr lang="en-US" dirty="0"/>
+              <a:t> at </a:t>
+            </a:r>
+            <a:r>
+              <a:rPr lang="en-US" dirty="0" err="1"/>
+              <a:t>iaculis</a:t>
+            </a:r>
+            <a:r>
+              <a:rPr lang="en-US" dirty="0"/>
+              <a:t>.</a:t>
+            </a:r>
+          </a:p>
+        </p:txBody>
+      </p:sp>
+      <p:sp>
+        <p:nvSpPr>
+          <p:cNvPr id="4" name="Date Placeholder 3"/>
+          <p:cNvSpPr>
+            <a:spLocks noGrp="1"/>
+          </p:cNvSpPr>
+          <p:nvPr>
+            <p:ph type="dt" sz="half" idx="10"/>
+          </p:nvPr>
+        </p:nvSpPr>
+        <p:spPr/>
+        <p:txBody>
+          <a:bodyPr/>
+          <a:lstStyle/>
+          <a:p>
+            <a:fld id="{F78F707E-E062-5C47-A7FE-62DAAA8D2156}" type="datetime4">
+              <a:rPr lang="en-CA" smtClean="0"/>
+              <a:pPr/>
+              <a:t>August 4, 2021</a:t>
+            </a:fld>
+            <a:endParaRPr lang="en-US"/>
+          </a:p>
+        </p:txBody>
+      </p:sp>
+      <p:sp>
+        <p:nvSpPr>
+          <p:cNvPr id="6" name="Footer Placeholder 5"/>
+          <p:cNvSpPr>
+            <a:spLocks noGrp="1"/>
+          </p:cNvSpPr>
+          <p:nvPr>
+            <p:ph type="ftr" sz="quarter" idx="11"/>
+          </p:nvPr>
+        </p:nvSpPr>
+        <p:spPr/>
+        <p:txBody>
+          <a:bodyPr/>
+          <a:lstStyle/>
+          <a:p>
+            <a:endParaRPr lang="en-US"/>
+          </a:p>
+        </p:txBody>
+      </p:sp>
+      <p:sp>
+        <p:nvSpPr>
+          <p:cNvPr id="5" name="Slide Number Placeholder 4"/>
+          <p:cNvSpPr>
+            <a:spLocks noGrp="1"/>
+          </p:cNvSpPr>
+          <p:nvPr>
+            <p:ph type="sldNum" sz="quarter" idx="12"/>
+          </p:nvPr>
+        </p:nvSpPr>
+        <p:spPr/>
+        <p:txBody>
+          <a:bodyPr/>
+          <a:lstStyle/>
+          <a:p>
+            <a:fld id="{70341EDA-DF76-394C-B359-28542C3A7753}" type="slidenum">
+              <a:rPr lang="en-US" smtClean="0"/>
+              <a:pPr/>
+              <a:t>11</a:t>
+            </a:fld>
+            <a:endParaRPr lang="en-US"/>
+          </a:p>
+        </p:txBody>
+      </p:sp>
+    </p:spTree>
+    <p:extLst>
+      <p:ext uri="{BB962C8B-B14F-4D97-AF65-F5344CB8AC3E}">
+        <p14:creationId xmlns:p14="http://schemas.microsoft.com/office/powerpoint/2010/main" val="392478255"/>
+      </p:ext>
+    </p:extLst>
+  </p:cSld>
+  <p:clrMapOvr>
+    <a:masterClrMapping/>
+  </p:clrMapOvr>
+</p:sld>
+</file>
+
+<file path=ppt/slides/slide12.xml><?xml version="1.0" encoding="utf-8"?>
+<p:sld xmlns:a="http://schemas.openxmlformats.org/drawingml/2006/main" xmlns:r="http://schemas.openxmlformats.org/officeDocument/2006/relationships" xmlns:p="http://schemas.openxmlformats.org/presentationml/2006/main">
+  <p:cSld>
+    <p:spTree>
+      <p:nvGrpSpPr>
+        <p:cNvPr id="1" name=""/>
+        <p:cNvGrpSpPr/>
+        <p:nvPr/>
+      </p:nvGrpSpPr>
+      <p:grpSpPr>
+        <a:xfrm>
+          <a:off x="0" y="0"/>
+          <a:ext cx="0" cy="0"/>
+          <a:chOff x="0" y="0"/>
+          <a:chExt cx="0" cy="0"/>
+        </a:xfrm>
+      </p:grpSpPr>
+      <p:sp>
+        <p:nvSpPr>
+          <p:cNvPr id="3" name="Date Placeholder 2"/>
+          <p:cNvSpPr>
+            <a:spLocks noGrp="1"/>
+          </p:cNvSpPr>
+          <p:nvPr>
+            <p:ph type="dt" sz="half" idx="10"/>
+          </p:nvPr>
+        </p:nvSpPr>
+        <p:spPr/>
+        <p:txBody>
+          <a:bodyPr/>
+          <a:lstStyle/>
+          <a:p>
+            <a:fld id="{9FCBCA37-E9DE-A841-81BB-554CC890BCE4}" type="datetime4">
+              <a:rPr lang="en-CA" smtClean="0"/>
+              <a:pPr/>
+              <a:t>August 4, 2021</a:t>
+            </a:fld>
+            <a:endParaRPr lang="en-US"/>
+          </a:p>
+        </p:txBody>
+      </p:sp>
+      <p:sp>
+        <p:nvSpPr>
+          <p:cNvPr id="5" name="Footer Placeholder 4"/>
+          <p:cNvSpPr>
+            <a:spLocks noGrp="1"/>
+          </p:cNvSpPr>
+          <p:nvPr>
+            <p:ph type="ftr" sz="quarter" idx="11"/>
+          </p:nvPr>
+        </p:nvSpPr>
+        <p:spPr/>
+        <p:txBody>
+          <a:bodyPr/>
+          <a:lstStyle/>
+          <a:p>
+            <a:endParaRPr lang="en-US"/>
+          </a:p>
+        </p:txBody>
+      </p:sp>
+      <p:sp>
+        <p:nvSpPr>
+          <p:cNvPr id="4" name="Slide Number Placeholder 3"/>
+          <p:cNvSpPr>
+            <a:spLocks noGrp="1"/>
+          </p:cNvSpPr>
+          <p:nvPr>
+            <p:ph type="sldNum" sz="quarter" idx="12"/>
+          </p:nvPr>
+        </p:nvSpPr>
+        <p:spPr/>
+        <p:txBody>
+          <a:bodyPr/>
+          <a:lstStyle/>
+          <a:p>
+            <a:fld id="{70341EDA-DF76-394C-B359-28542C3A7753}" type="slidenum">
+              <a:rPr lang="en-US" smtClean="0"/>
+              <a:pPr/>
+              <a:t>12</a:t>
+            </a:fld>
+            <a:endParaRPr lang="en-US"/>
+          </a:p>
+        </p:txBody>
+      </p:sp>
+      <p:sp>
+        <p:nvSpPr>
+          <p:cNvPr id="6" name="Content Placeholder 5"/>
+          <p:cNvSpPr>
+            <a:spLocks noGrp="1"/>
+          </p:cNvSpPr>
+          <p:nvPr>
+            <p:ph idx="1"/>
+          </p:nvPr>
+        </p:nvSpPr>
+        <p:spPr/>
+        <p:txBody>
+          <a:bodyPr/>
+          <a:lstStyle/>
+          <a:p>
+            <a:endParaRPr lang="en-CA"/>
+          </a:p>
+        </p:txBody>
+      </p:sp>
+    </p:spTree>
+    <p:extLst>
+      <p:ext uri="{BB962C8B-B14F-4D97-AF65-F5344CB8AC3E}">
+        <p14:creationId xmlns:p14="http://schemas.microsoft.com/office/powerpoint/2010/main" val="1638810932"/>
       </p:ext>
     </p:extLst>
   </p:cSld>
@@ -6648,7 +7261,7 @@
           <a:p>
             <a:fld id="{938A8CA3-7F0C-5446-9644-486EEACF7FAF}" type="datetime4">
               <a:rPr lang="en-CA" smtClean="0"/>
-              <a:t>July 11, 2021</a:t>
+              <a:t>August 4, 2021</a:t>
             </a:fld>
             <a:endParaRPr lang="en-US"/>
           </a:p>
@@ -6782,7 +7395,7 @@
             <a:fld id="{01726941-DB26-E74E-AA79-985F679517B7}" type="datetime4">
               <a:rPr lang="en-CA" smtClean="0"/>
               <a:pPr/>
-              <a:t>July 11, 2021</a:t>
+              <a:t>August 4, 2021</a:t>
             </a:fld>
             <a:endParaRPr lang="en-US"/>
           </a:p>
@@ -6930,13 +7543,8 @@
           <a:p>
             <a:r>
               <a:rPr lang="en-US" dirty="0" smtClean="0"/>
-              <a:t>The heap leach production acts similar to a “black box” function, where inputs are cyanide solution, gold ores, time, etc. and the output is pregnant solution (solution with gold dissolved). </a:t>
-            </a:r>
-            <a:r>
-              <a:rPr lang="en-US" dirty="0" smtClean="0"/>
-              <a:t>Understanding the heap leaching process can help the mining operation plan for the ore stacking and leaching cycle. On the financial side, a well established heap leach model can help the company foresee the upcoming challenges and opportunities.</a:t>
-            </a:r>
-            <a:endParaRPr lang="en-US" dirty="0" smtClean="0"/>
+              <a:t>The heap leach production acts similar to a “black box” function, where inputs are cyanide solution, gold ores, time, etc. and the output is pregnant solution (solution with gold dissolved). Understanding the heap leaching process can help the mining operation plan for the ore stacking and leaching cycle. On the financial side, a well established heap leach model can help the company foresee the upcoming challenges and opportunities.</a:t>
+            </a:r>
           </a:p>
         </p:txBody>
       </p:sp>
@@ -6958,7 +7566,7 @@
             <a:fld id="{E35C74F7-D47D-EC46-9833-7ECFE3470865}" type="datetime4">
               <a:rPr lang="en-CA" smtClean="0"/>
               <a:pPr/>
-              <a:t>July 11, 2021</a:t>
+              <a:t>August 4, 2021</a:t>
             </a:fld>
             <a:endParaRPr lang="en-US"/>
           </a:p>
@@ -7024,7 +7632,7 @@
           <a:p>
             <a:r>
               <a:rPr lang="en-US" dirty="0"/>
-              <a:t>PowerPoint Style Guide</a:t>
+              <a:t>Fort Knox Heap Leach Model Remake</a:t>
             </a:r>
           </a:p>
         </p:txBody>
@@ -7147,7 +7755,7 @@
             <a:fld id="{1E192792-884A-AD43-BE8E-8F1FC1D5646F}" type="datetime4">
               <a:rPr lang="en-CA" smtClean="0"/>
               <a:pPr/>
-              <a:t>July 11, 2021</a:t>
+              <a:t>August 4, 2021</a:t>
             </a:fld>
             <a:endParaRPr lang="en-US" dirty="0"/>
           </a:p>
@@ -7231,7 +7839,7 @@
           <a:p>
             <a:r>
               <a:rPr lang="en-US" dirty="0"/>
-              <a:t>Kinross</a:t>
+              <a:t>Fort Knox Heap Leach Model Remake</a:t>
             </a:r>
           </a:p>
         </p:txBody>
@@ -8700,7 +9308,7 @@
             <a:fld id="{49FF2BEF-23C6-5D43-816C-81833513DDC1}" type="datetime4">
               <a:rPr lang="en-CA" smtClean="0"/>
               <a:pPr/>
-              <a:t>July 11, 2021</a:t>
+              <a:t>August 4, 2021</a:t>
             </a:fld>
             <a:endParaRPr lang="en-US"/>
           </a:p>
@@ -8791,7 +9399,6 @@
               <a:rPr lang="en-US" dirty="0" smtClean="0"/>
               <a:t>Leaching information. This describes the time when leaching at a certain area started and ended.</a:t>
             </a:r>
-            <a:endParaRPr lang="en-US" dirty="0" smtClean="0"/>
           </a:p>
           <a:p>
             <a:r>
@@ -8818,7 +9425,7 @@
             <a:pPr lvl="1"/>
             <a:r>
               <a:rPr lang="en-US" dirty="0" smtClean="0"/>
-              <a:t>Metal production. This records the about of gold produced.</a:t>
+              <a:t>Metal production. This records the amount of gold produced by month.</a:t>
             </a:r>
           </a:p>
         </p:txBody>
@@ -8840,7 +9447,7 @@
           <a:p>
             <a:r>
               <a:rPr lang="en-US" dirty="0"/>
-              <a:t>PowerPoint Style Guide</a:t>
+              <a:t>Fort Knox Heap Leach Model Remake</a:t>
             </a:r>
           </a:p>
         </p:txBody>
@@ -8875,108 +9482,19 @@
           <a:chExt cx="0" cy="0"/>
         </a:xfrm>
       </p:grpSpPr>
-      <p:sp>
-        <p:nvSpPr>
-          <p:cNvPr id="2" name="Title 1"/>
-          <p:cNvSpPr>
-            <a:spLocks noGrp="1"/>
-          </p:cNvSpPr>
-          <p:nvPr>
-            <p:ph type="title"/>
-          </p:nvPr>
-        </p:nvSpPr>
-        <p:spPr/>
-        <p:txBody>
-          <a:bodyPr/>
-          <a:lstStyle/>
-          <a:p>
-            <a:r>
-              <a:rPr lang="en-US" dirty="0" smtClean="0"/>
-              <a:t>Project Goals</a:t>
-            </a:r>
-            <a:endParaRPr lang="en-US" dirty="0"/>
-          </a:p>
-        </p:txBody>
-      </p:sp>
-      <p:sp>
-        <p:nvSpPr>
-          <p:cNvPr id="4" name="Date Placeholder 3"/>
-          <p:cNvSpPr>
-            <a:spLocks noGrp="1"/>
-          </p:cNvSpPr>
-          <p:nvPr>
-            <p:ph type="dt" sz="half" idx="10"/>
-          </p:nvPr>
-        </p:nvSpPr>
-        <p:spPr/>
-        <p:txBody>
-          <a:bodyPr/>
-          <a:lstStyle/>
-          <a:p>
-            <a:fld id="{53176067-3430-564D-886D-71DF85FF18D6}" type="datetime4">
-              <a:rPr lang="en-CA" smtClean="0"/>
-              <a:pPr/>
-              <a:t>July 11, 2021</a:t>
-            </a:fld>
-            <a:endParaRPr lang="en-US"/>
-          </a:p>
-        </p:txBody>
-      </p:sp>
-      <p:sp>
-        <p:nvSpPr>
-          <p:cNvPr id="6" name="Footer Placeholder 5"/>
-          <p:cNvSpPr>
-            <a:spLocks noGrp="1"/>
-          </p:cNvSpPr>
-          <p:nvPr>
-            <p:ph type="ftr" sz="quarter" idx="11"/>
-          </p:nvPr>
-        </p:nvSpPr>
-        <p:spPr/>
-        <p:txBody>
-          <a:bodyPr/>
-          <a:lstStyle/>
-          <a:p>
-            <a:endParaRPr lang="en-US"/>
-          </a:p>
-        </p:txBody>
-      </p:sp>
-      <p:sp>
-        <p:nvSpPr>
-          <p:cNvPr id="5" name="Slide Number Placeholder 4"/>
-          <p:cNvSpPr>
-            <a:spLocks noGrp="1"/>
-          </p:cNvSpPr>
-          <p:nvPr>
-            <p:ph type="sldNum" sz="quarter" idx="12"/>
-          </p:nvPr>
-        </p:nvSpPr>
-        <p:spPr/>
-        <p:txBody>
-          <a:bodyPr/>
-          <a:lstStyle/>
-          <a:p>
-            <a:fld id="{70341EDA-DF76-394C-B359-28542C3A7753}" type="slidenum">
-              <a:rPr lang="en-US" smtClean="0"/>
-              <a:pPr/>
-              <a:t>7</a:t>
-            </a:fld>
-            <a:endParaRPr lang="en-US"/>
-          </a:p>
-        </p:txBody>
-      </p:sp>
       <p:pic>
         <p:nvPicPr>
-          <p:cNvPr id="8" name="Picture Placeholder 7"/>
+          <p:cNvPr id="9" name="Picture Placeholder 8"/>
           <p:cNvPicPr>
             <a:picLocks noGrp="1" noChangeAspect="1"/>
           </p:cNvPicPr>
           <p:nvPr>
-            <p:ph type="pic" idx="13"/>
+            <p:ph type="pic" sz="quarter" idx="13"/>
           </p:nvPr>
         </p:nvPicPr>
         <p:blipFill>
           <a:blip r:embed="rId2" cstate="screen">
+            <a:alphaModFix amt="5000"/>
             <a:extLst>
               <a:ext uri="{28A0092B-C50C-407E-A947-70E740481C1C}">
                 <a14:useLocalDpi xmlns:a14="http://schemas.microsoft.com/office/drawing/2010/main"/>
@@ -8992,12 +9510,12 @@
       </p:pic>
       <p:sp>
         <p:nvSpPr>
-          <p:cNvPr id="3" name="Content Placeholder 2"/>
-          <p:cNvSpPr>
-            <a:spLocks noGrp="1"/>
-          </p:cNvSpPr>
-          <p:nvPr>
-            <p:ph idx="14"/>
+          <p:cNvPr id="2" name="Title 1"/>
+          <p:cNvSpPr>
+            <a:spLocks noGrp="1"/>
+          </p:cNvSpPr>
+          <p:nvPr>
+            <p:ph type="title"/>
           </p:nvPr>
         </p:nvSpPr>
         <p:spPr/>
@@ -9005,33 +9523,32 @@
           <a:bodyPr/>
           <a:lstStyle/>
           <a:p>
-            <a:pPr marL="285750" indent="-285750">
-              <a:buFont typeface="Arial" panose="020B0604020202020204" pitchFamily="34" charset="0"/>
-              <a:buChar char="•"/>
-            </a:pPr>
             <a:r>
               <a:rPr lang="en-US" dirty="0" smtClean="0"/>
-              <a:t>Explain the historical gold production coming out from the heap leach pad.</a:t>
-            </a:r>
-          </a:p>
-          <a:p>
-            <a:pPr marL="285750" indent="-285750">
-              <a:buFont typeface="Arial" panose="020B0604020202020204" pitchFamily="34" charset="0"/>
-              <a:buChar char="•"/>
-            </a:pPr>
+              <a:t>I poured root beer in a square glass. What did I get?</a:t>
+            </a:r>
+            <a:endParaRPr lang="en-US" dirty="0"/>
+          </a:p>
+        </p:txBody>
+      </p:sp>
+      <p:sp>
+        <p:nvSpPr>
+          <p:cNvPr id="3" name="Text Placeholder 2"/>
+          <p:cNvSpPr>
+            <a:spLocks noGrp="1"/>
+          </p:cNvSpPr>
+          <p:nvPr>
+            <p:ph type="body" idx="1"/>
+          </p:nvPr>
+        </p:nvSpPr>
+        <p:spPr/>
+        <p:txBody>
+          <a:bodyPr/>
+          <a:lstStyle/>
+          <a:p>
             <a:r>
               <a:rPr lang="en-US" dirty="0" smtClean="0"/>
-              <a:t>Create a heap leach model that can help predict future gold production given pad loading sequence, material information, and operation options.</a:t>
-            </a:r>
-          </a:p>
-          <a:p>
-            <a:pPr marL="285750" indent="-285750">
-              <a:buFont typeface="Arial" panose="020B0604020202020204" pitchFamily="34" charset="0"/>
-              <a:buChar char="•"/>
-            </a:pPr>
-            <a:r>
-              <a:rPr lang="en-US" dirty="0" smtClean="0"/>
-              <a:t>Provide suggestions on operation options.</a:t>
+              <a:t>Just beer.</a:t>
             </a:r>
             <a:endParaRPr lang="en-US" dirty="0"/>
           </a:p>
@@ -9039,12 +9556,12 @@
       </p:sp>
       <p:sp>
         <p:nvSpPr>
-          <p:cNvPr id="14" name="Text Placeholder 13"/>
-          <p:cNvSpPr>
-            <a:spLocks noGrp="1"/>
-          </p:cNvSpPr>
-          <p:nvPr>
-            <p:ph type="body" sz="quarter" idx="15"/>
+          <p:cNvPr id="4" name="Date Placeholder 3"/>
+          <p:cNvSpPr>
+            <a:spLocks noGrp="1"/>
+          </p:cNvSpPr>
+          <p:nvPr>
+            <p:ph type="dt" sz="half" idx="10"/>
           </p:nvPr>
         </p:nvSpPr>
         <p:spPr/>
@@ -9052,80 +9569,62 @@
           <a:bodyPr/>
           <a:lstStyle/>
           <a:p>
-            <a:r>
-              <a:rPr lang="en-US" dirty="0"/>
-              <a:t>PowerPoint Style Guide</a:t>
-            </a:r>
-          </a:p>
-        </p:txBody>
-      </p:sp>
-      <p:sp>
-        <p:nvSpPr>
-          <p:cNvPr id="7" name="TextBox 6">
-            <a:extLst>
-              <a:ext uri="{FF2B5EF4-FFF2-40B4-BE49-F238E27FC236}">
-                <a16:creationId xmlns:a16="http://schemas.microsoft.com/office/drawing/2014/main" id="{0AB25EBC-9A2C-B04B-8B20-B81D98946878}"/>
-              </a:ext>
-            </a:extLst>
-          </p:cNvPr>
-          <p:cNvSpPr txBox="1"/>
-          <p:nvPr/>
-        </p:nvSpPr>
-        <p:spPr>
-          <a:xfrm rot="-900000">
-            <a:off x="3456773" y="1545162"/>
-            <a:ext cx="5996920" cy="2585323"/>
-          </a:xfrm>
-          <a:prstGeom prst="rect">
-            <a:avLst/>
-          </a:prstGeom>
-          <a:noFill/>
-        </p:spPr>
-        <p:txBody>
-          <a:bodyPr wrap="square" rtlCol="0">
-            <a:spAutoFit/>
-          </a:bodyPr>
-          <a:lstStyle/>
-          <a:p>
-            <a:r>
-              <a:rPr lang="en-US" sz="5400" b="1" dirty="0" smtClean="0">
-                <a:solidFill>
-                  <a:schemeClr val="bg1">
-                    <a:alpha val="75000"/>
-                  </a:schemeClr>
-                </a:solidFill>
-                <a:latin typeface="+mj-lt"/>
-              </a:rPr>
-              <a:t>Plan to put some </a:t>
-            </a:r>
-          </a:p>
-          <a:p>
-            <a:r>
-              <a:rPr lang="en-US" sz="5400" b="1" dirty="0" smtClean="0">
-                <a:solidFill>
-                  <a:schemeClr val="bg1">
-                    <a:alpha val="75000"/>
-                  </a:schemeClr>
-                </a:solidFill>
-                <a:latin typeface="+mj-lt"/>
-              </a:rPr>
-              <a:t>Relative picture here</a:t>
-            </a:r>
-            <a:endParaRPr lang="en-US" sz="5400" b="1" dirty="0">
-              <a:solidFill>
-                <a:schemeClr val="bg1">
-                  <a:alpha val="75000"/>
-                </a:schemeClr>
-              </a:solidFill>
-              <a:latin typeface="+mj-lt"/>
-            </a:endParaRPr>
+            <a:fld id="{01726941-DB26-E74E-AA79-985F679517B7}" type="datetime4">
+              <a:rPr lang="en-CA" smtClean="0"/>
+              <a:pPr/>
+              <a:t>August 4, 2021</a:t>
+            </a:fld>
+            <a:endParaRPr lang="en-US"/>
+          </a:p>
+        </p:txBody>
+      </p:sp>
+      <p:sp>
+        <p:nvSpPr>
+          <p:cNvPr id="19" name="Footer Placeholder 18"/>
+          <p:cNvSpPr>
+            <a:spLocks noGrp="1"/>
+          </p:cNvSpPr>
+          <p:nvPr>
+            <p:ph type="ftr" sz="quarter" idx="11"/>
+          </p:nvPr>
+        </p:nvSpPr>
+        <p:spPr/>
+        <p:txBody>
+          <a:bodyPr/>
+          <a:lstStyle/>
+          <a:p>
+            <a:endParaRPr lang="en-US" dirty="0"/>
+          </a:p>
+        </p:txBody>
+      </p:sp>
+      <p:sp>
+        <p:nvSpPr>
+          <p:cNvPr id="5" name="Slide Number Placeholder 4"/>
+          <p:cNvSpPr>
+            <a:spLocks noGrp="1"/>
+          </p:cNvSpPr>
+          <p:nvPr>
+            <p:ph type="sldNum" sz="quarter" idx="12"/>
+          </p:nvPr>
+        </p:nvSpPr>
+        <p:spPr/>
+        <p:txBody>
+          <a:bodyPr/>
+          <a:lstStyle/>
+          <a:p>
+            <a:fld id="{70341EDA-DF76-394C-B359-28542C3A7753}" type="slidenum">
+              <a:rPr lang="en-US" smtClean="0"/>
+              <a:pPr/>
+              <a:t>7</a:t>
+            </a:fld>
+            <a:endParaRPr lang="en-US"/>
           </a:p>
         </p:txBody>
       </p:sp>
     </p:spTree>
     <p:extLst>
       <p:ext uri="{BB962C8B-B14F-4D97-AF65-F5344CB8AC3E}">
-        <p14:creationId xmlns:p14="http://schemas.microsoft.com/office/powerpoint/2010/main" val="376995651"/>
+        <p14:creationId xmlns:p14="http://schemas.microsoft.com/office/powerpoint/2010/main" val="1719727536"/>
       </p:ext>
     </p:extLst>
   </p:cSld>
@@ -9152,19 +9651,108 @@
           <a:chExt cx="0" cy="0"/>
         </a:xfrm>
       </p:grpSpPr>
+      <p:sp>
+        <p:nvSpPr>
+          <p:cNvPr id="2" name="Title 1"/>
+          <p:cNvSpPr>
+            <a:spLocks noGrp="1"/>
+          </p:cNvSpPr>
+          <p:nvPr>
+            <p:ph type="title"/>
+          </p:nvPr>
+        </p:nvSpPr>
+        <p:spPr/>
+        <p:txBody>
+          <a:bodyPr/>
+          <a:lstStyle/>
+          <a:p>
+            <a:r>
+              <a:rPr lang="en-US" dirty="0" smtClean="0"/>
+              <a:t>Project Goals</a:t>
+            </a:r>
+            <a:endParaRPr lang="en-US" dirty="0"/>
+          </a:p>
+        </p:txBody>
+      </p:sp>
+      <p:sp>
+        <p:nvSpPr>
+          <p:cNvPr id="4" name="Date Placeholder 3"/>
+          <p:cNvSpPr>
+            <a:spLocks noGrp="1"/>
+          </p:cNvSpPr>
+          <p:nvPr>
+            <p:ph type="dt" sz="half" idx="10"/>
+          </p:nvPr>
+        </p:nvSpPr>
+        <p:spPr/>
+        <p:txBody>
+          <a:bodyPr/>
+          <a:lstStyle/>
+          <a:p>
+            <a:fld id="{53176067-3430-564D-886D-71DF85FF18D6}" type="datetime4">
+              <a:rPr lang="en-CA" smtClean="0"/>
+              <a:pPr/>
+              <a:t>August 4, 2021</a:t>
+            </a:fld>
+            <a:endParaRPr lang="en-US"/>
+          </a:p>
+        </p:txBody>
+      </p:sp>
+      <p:sp>
+        <p:nvSpPr>
+          <p:cNvPr id="6" name="Footer Placeholder 5"/>
+          <p:cNvSpPr>
+            <a:spLocks noGrp="1"/>
+          </p:cNvSpPr>
+          <p:nvPr>
+            <p:ph type="ftr" sz="quarter" idx="11"/>
+          </p:nvPr>
+        </p:nvSpPr>
+        <p:spPr/>
+        <p:txBody>
+          <a:bodyPr/>
+          <a:lstStyle/>
+          <a:p>
+            <a:endParaRPr lang="en-US"/>
+          </a:p>
+        </p:txBody>
+      </p:sp>
+      <p:sp>
+        <p:nvSpPr>
+          <p:cNvPr id="5" name="Slide Number Placeholder 4"/>
+          <p:cNvSpPr>
+            <a:spLocks noGrp="1"/>
+          </p:cNvSpPr>
+          <p:nvPr>
+            <p:ph type="sldNum" sz="quarter" idx="12"/>
+          </p:nvPr>
+        </p:nvSpPr>
+        <p:spPr/>
+        <p:txBody>
+          <a:bodyPr/>
+          <a:lstStyle/>
+          <a:p>
+            <a:fld id="{70341EDA-DF76-394C-B359-28542C3A7753}" type="slidenum">
+              <a:rPr lang="en-US" smtClean="0"/>
+              <a:pPr/>
+              <a:t>8</a:t>
+            </a:fld>
+            <a:endParaRPr lang="en-US"/>
+          </a:p>
+        </p:txBody>
+      </p:sp>
       <p:pic>
         <p:nvPicPr>
-          <p:cNvPr id="12" name="Picture Placeholder 11"/>
+          <p:cNvPr id="8" name="Picture Placeholder 7"/>
           <p:cNvPicPr>
             <a:picLocks noGrp="1" noChangeAspect="1"/>
           </p:cNvPicPr>
           <p:nvPr>
-            <p:ph type="pic" sz="quarter" idx="13"/>
+            <p:ph type="pic" idx="13"/>
           </p:nvPr>
         </p:nvPicPr>
         <p:blipFill>
-          <a:blip r:embed="rId3" cstate="screen">
-            <a:alphaModFix amt="5000"/>
+          <a:blip r:embed="rId2" cstate="screen">
             <a:extLst>
               <a:ext uri="{28A0092B-C50C-407E-A947-70E740481C1C}">
                 <a14:useLocalDpi xmlns:a14="http://schemas.microsoft.com/office/drawing/2010/main"/>
@@ -9180,12 +9768,12 @@
       </p:pic>
       <p:sp>
         <p:nvSpPr>
-          <p:cNvPr id="2" name="Title 1"/>
-          <p:cNvSpPr>
-            <a:spLocks noGrp="1"/>
-          </p:cNvSpPr>
-          <p:nvPr>
-            <p:ph type="title"/>
+          <p:cNvPr id="3" name="Content Placeholder 2"/>
+          <p:cNvSpPr>
+            <a:spLocks noGrp="1"/>
+          </p:cNvSpPr>
+          <p:nvPr>
+            <p:ph idx="14"/>
           </p:nvPr>
         </p:nvSpPr>
         <p:spPr/>
@@ -9193,9 +9781,33 @@
           <a:bodyPr/>
           <a:lstStyle/>
           <a:p>
-            <a:r>
-              <a:rPr lang="en-US"/>
-              <a:t>This is an alternate divider slide</a:t>
+            <a:pPr marL="285750" indent="-285750">
+              <a:buFont typeface="Arial" panose="020B0604020202020204" pitchFamily="34" charset="0"/>
+              <a:buChar char="•"/>
+            </a:pPr>
+            <a:r>
+              <a:rPr lang="en-US" dirty="0" smtClean="0"/>
+              <a:t>Explain the historical gold production coming out from the heap leach pad.</a:t>
+            </a:r>
+          </a:p>
+          <a:p>
+            <a:pPr marL="285750" indent="-285750">
+              <a:buFont typeface="Arial" panose="020B0604020202020204" pitchFamily="34" charset="0"/>
+              <a:buChar char="•"/>
+            </a:pPr>
+            <a:r>
+              <a:rPr lang="en-US" dirty="0" smtClean="0"/>
+              <a:t>Create a heap leach model that can help predict future gold production given pad loading sequence, material information, and operation options.</a:t>
+            </a:r>
+          </a:p>
+          <a:p>
+            <a:pPr marL="285750" indent="-285750">
+              <a:buFont typeface="Arial" panose="020B0604020202020204" pitchFamily="34" charset="0"/>
+              <a:buChar char="•"/>
+            </a:pPr>
+            <a:r>
+              <a:rPr lang="en-US" dirty="0" smtClean="0"/>
+              <a:t>Provide suggestions on operation options.</a:t>
             </a:r>
             <a:endParaRPr lang="en-US" dirty="0"/>
           </a:p>
@@ -9203,12 +9815,12 @@
       </p:sp>
       <p:sp>
         <p:nvSpPr>
-          <p:cNvPr id="3" name="Text Placeholder 2"/>
-          <p:cNvSpPr>
-            <a:spLocks noGrp="1"/>
-          </p:cNvSpPr>
-          <p:nvPr>
-            <p:ph type="body" idx="1"/>
+          <p:cNvPr id="14" name="Text Placeholder 13"/>
+          <p:cNvSpPr>
+            <a:spLocks noGrp="1"/>
+          </p:cNvSpPr>
+          <p:nvPr>
+            <p:ph type="body" sz="quarter" idx="15"/>
           </p:nvPr>
         </p:nvSpPr>
         <p:spPr/>
@@ -9217,175 +9829,79 @@
           <a:lstStyle/>
           <a:p>
             <a:r>
-              <a:rPr lang="en-US" dirty="0" err="1"/>
-              <a:t>Sed</a:t>
-            </a:r>
-            <a:r>
               <a:rPr lang="en-US" dirty="0"/>
-              <a:t> </a:t>
-            </a:r>
-            <a:r>
-              <a:rPr lang="en-US" dirty="0" err="1"/>
-              <a:t>elementum</a:t>
-            </a:r>
-            <a:r>
-              <a:rPr lang="en-US" dirty="0"/>
-              <a:t> semper </a:t>
-            </a:r>
-            <a:r>
-              <a:rPr lang="en-US" dirty="0" err="1"/>
-              <a:t>consequat</a:t>
-            </a:r>
-            <a:r>
-              <a:rPr lang="en-US" dirty="0"/>
-              <a:t>. </a:t>
-            </a:r>
-            <a:r>
-              <a:rPr lang="en-US" dirty="0" err="1"/>
-              <a:t>Donec</a:t>
-            </a:r>
-            <a:r>
-              <a:rPr lang="en-US" dirty="0"/>
-              <a:t> a quam </a:t>
-            </a:r>
-            <a:r>
-              <a:rPr lang="en-US" dirty="0" err="1"/>
-              <a:t>iaculis</a:t>
-            </a:r>
-            <a:r>
-              <a:rPr lang="en-US" dirty="0"/>
-              <a:t>, gravida ipsum </a:t>
-            </a:r>
-            <a:r>
-              <a:rPr lang="en-US" dirty="0" err="1"/>
-              <a:t>sed</a:t>
-            </a:r>
-            <a:r>
-              <a:rPr lang="en-US" dirty="0"/>
-              <a:t>, </a:t>
-            </a:r>
-            <a:r>
-              <a:rPr lang="en-US" dirty="0" err="1"/>
-              <a:t>euismod</a:t>
-            </a:r>
-            <a:r>
-              <a:rPr lang="en-US" dirty="0"/>
-              <a:t> </a:t>
-            </a:r>
-            <a:r>
-              <a:rPr lang="en-US" dirty="0" err="1"/>
-              <a:t>arcu</a:t>
-            </a:r>
-            <a:r>
-              <a:rPr lang="en-US" dirty="0"/>
-              <a:t>. </a:t>
-            </a:r>
-            <a:r>
-              <a:rPr lang="en-US" dirty="0" err="1"/>
-              <a:t>Phasellus</a:t>
-            </a:r>
-            <a:r>
-              <a:rPr lang="en-US" dirty="0"/>
-              <a:t> </a:t>
-            </a:r>
-            <a:r>
-              <a:rPr lang="en-US" dirty="0" err="1"/>
-              <a:t>tincidunt</a:t>
-            </a:r>
-            <a:r>
-              <a:rPr lang="en-US" dirty="0"/>
-              <a:t> id </a:t>
-            </a:r>
-            <a:r>
-              <a:rPr lang="en-US" dirty="0" err="1"/>
-              <a:t>metus</a:t>
-            </a:r>
-            <a:r>
-              <a:rPr lang="en-US" dirty="0"/>
-              <a:t> at </a:t>
-            </a:r>
-            <a:r>
-              <a:rPr lang="en-US" dirty="0" err="1"/>
-              <a:t>iaculis</a:t>
-            </a:r>
-            <a:r>
-              <a:rPr lang="en-US" dirty="0"/>
-              <a:t>.</a:t>
-            </a:r>
-          </a:p>
-        </p:txBody>
-      </p:sp>
-      <p:sp>
-        <p:nvSpPr>
-          <p:cNvPr id="4" name="Date Placeholder 3"/>
-          <p:cNvSpPr>
-            <a:spLocks noGrp="1"/>
-          </p:cNvSpPr>
-          <p:nvPr>
-            <p:ph type="dt" sz="half" idx="10"/>
-          </p:nvPr>
-        </p:nvSpPr>
-        <p:spPr/>
-        <p:txBody>
-          <a:bodyPr/>
-          <a:lstStyle/>
-          <a:p>
-            <a:fld id="{F78F707E-E062-5C47-A7FE-62DAAA8D2156}" type="datetime4">
-              <a:rPr lang="en-CA" smtClean="0"/>
-              <a:pPr/>
-              <a:t>July 11, 2021</a:t>
-            </a:fld>
-            <a:endParaRPr lang="en-US"/>
-          </a:p>
-        </p:txBody>
-      </p:sp>
-      <p:sp>
-        <p:nvSpPr>
-          <p:cNvPr id="6" name="Footer Placeholder 5"/>
-          <p:cNvSpPr>
-            <a:spLocks noGrp="1"/>
-          </p:cNvSpPr>
-          <p:nvPr>
-            <p:ph type="ftr" sz="quarter" idx="11"/>
-          </p:nvPr>
-        </p:nvSpPr>
-        <p:spPr/>
-        <p:txBody>
-          <a:bodyPr/>
-          <a:lstStyle/>
-          <a:p>
-            <a:endParaRPr lang="en-US"/>
-          </a:p>
-        </p:txBody>
-      </p:sp>
-      <p:sp>
-        <p:nvSpPr>
-          <p:cNvPr id="5" name="Slide Number Placeholder 4"/>
-          <p:cNvSpPr>
-            <a:spLocks noGrp="1"/>
-          </p:cNvSpPr>
-          <p:nvPr>
-            <p:ph type="sldNum" sz="quarter" idx="12"/>
-          </p:nvPr>
-        </p:nvSpPr>
-        <p:spPr/>
-        <p:txBody>
-          <a:bodyPr/>
-          <a:lstStyle/>
-          <a:p>
-            <a:fld id="{70341EDA-DF76-394C-B359-28542C3A7753}" type="slidenum">
-              <a:rPr lang="en-US" smtClean="0"/>
-              <a:pPr/>
-              <a:t>8</a:t>
-            </a:fld>
-            <a:endParaRPr lang="en-US"/>
+              <a:t>Fort Knox Heap Leach Model Remake</a:t>
+            </a:r>
+          </a:p>
+        </p:txBody>
+      </p:sp>
+      <p:sp>
+        <p:nvSpPr>
+          <p:cNvPr id="7" name="TextBox 6">
+            <a:extLst>
+              <a:ext uri="{FF2B5EF4-FFF2-40B4-BE49-F238E27FC236}">
+                <a16:creationId xmlns:a16="http://schemas.microsoft.com/office/drawing/2014/main" id="{0AB25EBC-9A2C-B04B-8B20-B81D98946878}"/>
+              </a:ext>
+            </a:extLst>
+          </p:cNvPr>
+          <p:cNvSpPr txBox="1"/>
+          <p:nvPr/>
+        </p:nvSpPr>
+        <p:spPr>
+          <a:xfrm rot="-900000">
+            <a:off x="3456773" y="1545162"/>
+            <a:ext cx="5996920" cy="2585323"/>
+          </a:xfrm>
+          <a:prstGeom prst="rect">
+            <a:avLst/>
+          </a:prstGeom>
+          <a:noFill/>
+        </p:spPr>
+        <p:txBody>
+          <a:bodyPr wrap="square" rtlCol="0">
+            <a:spAutoFit/>
+          </a:bodyPr>
+          <a:lstStyle/>
+          <a:p>
+            <a:r>
+              <a:rPr lang="en-US" sz="5400" b="1" dirty="0" smtClean="0">
+                <a:solidFill>
+                  <a:schemeClr val="bg1">
+                    <a:alpha val="75000"/>
+                  </a:schemeClr>
+                </a:solidFill>
+                <a:latin typeface="+mj-lt"/>
+              </a:rPr>
+              <a:t>Plan to put some </a:t>
+            </a:r>
+          </a:p>
+          <a:p>
+            <a:r>
+              <a:rPr lang="en-US" sz="5400" b="1" dirty="0" smtClean="0">
+                <a:solidFill>
+                  <a:schemeClr val="bg1">
+                    <a:alpha val="75000"/>
+                  </a:schemeClr>
+                </a:solidFill>
+                <a:latin typeface="+mj-lt"/>
+              </a:rPr>
+              <a:t>Relative picture here</a:t>
+            </a:r>
+            <a:endParaRPr lang="en-US" sz="5400" b="1" dirty="0">
+              <a:solidFill>
+                <a:schemeClr val="bg1">
+                  <a:alpha val="75000"/>
+                </a:schemeClr>
+              </a:solidFill>
+              <a:latin typeface="+mj-lt"/>
+            </a:endParaRPr>
           </a:p>
         </p:txBody>
       </p:sp>
     </p:spTree>
     <p:extLst>
       <p:ext uri="{BB962C8B-B14F-4D97-AF65-F5344CB8AC3E}">
-        <p14:creationId xmlns:p14="http://schemas.microsoft.com/office/powerpoint/2010/main" val="392478255"/>
+        <p14:creationId xmlns:p14="http://schemas.microsoft.com/office/powerpoint/2010/main" val="376995651"/>
       </p:ext>
     </p:extLst>
   </p:cSld>
@@ -9414,6 +9930,29 @@
       </p:grpSpPr>
       <p:sp>
         <p:nvSpPr>
+          <p:cNvPr id="2" name="Title 1"/>
+          <p:cNvSpPr>
+            <a:spLocks noGrp="1"/>
+          </p:cNvSpPr>
+          <p:nvPr>
+            <p:ph type="title"/>
+          </p:nvPr>
+        </p:nvSpPr>
+        <p:spPr/>
+        <p:txBody>
+          <a:bodyPr/>
+          <a:lstStyle/>
+          <a:p>
+            <a:r>
+              <a:rPr lang="en-US" dirty="0" smtClean="0"/>
+              <a:t>Data Exploration</a:t>
+            </a:r>
+            <a:endParaRPr lang="en-US" dirty="0"/>
+          </a:p>
+        </p:txBody>
+      </p:sp>
+      <p:sp>
+        <p:nvSpPr>
           <p:cNvPr id="3" name="Date Placeholder 2"/>
           <p:cNvSpPr>
             <a:spLocks noGrp="1"/>
@@ -9427,10 +9966,10 @@
           <a:bodyPr/>
           <a:lstStyle/>
           <a:p>
-            <a:fld id="{9FCBCA37-E9DE-A841-81BB-554CC890BCE4}" type="datetime4">
+            <a:fld id="{49FF2BEF-23C6-5D43-816C-81833513DDC1}" type="datetime4">
               <a:rPr lang="en-CA" smtClean="0"/>
               <a:pPr/>
-              <a:t>July 11, 2021</a:t>
+              <a:t>August 4, 2021</a:t>
             </a:fld>
             <a:endParaRPr lang="en-US"/>
           </a:p>
@@ -9438,7 +9977,7 @@
       </p:sp>
       <p:sp>
         <p:nvSpPr>
-          <p:cNvPr id="5" name="Footer Placeholder 4"/>
+          <p:cNvPr id="7" name="Footer Placeholder 6"/>
           <p:cNvSpPr>
             <a:spLocks noGrp="1"/>
           </p:cNvSpPr>
@@ -9457,7 +9996,7 @@
       </p:sp>
       <p:sp>
         <p:nvSpPr>
-          <p:cNvPr id="4" name="Slide Number Placeholder 3"/>
+          <p:cNvPr id="6" name="Slide Number Placeholder 5"/>
           <p:cNvSpPr>
             <a:spLocks noGrp="1"/>
           </p:cNvSpPr>
@@ -9481,12 +10020,82 @@
       </p:sp>
       <p:sp>
         <p:nvSpPr>
-          <p:cNvPr id="6" name="Content Placeholder 5"/>
-          <p:cNvSpPr>
-            <a:spLocks noGrp="1"/>
-          </p:cNvSpPr>
-          <p:nvPr>
-            <p:ph idx="1"/>
+          <p:cNvPr id="4" name="Content Placeholder 3"/>
+          <p:cNvSpPr>
+            <a:spLocks noGrp="1"/>
+          </p:cNvSpPr>
+          <p:nvPr>
+            <p:ph idx="13"/>
+          </p:nvPr>
+        </p:nvSpPr>
+        <p:spPr>
+          <a:xfrm>
+            <a:off x="687600" y="1149599"/>
+            <a:ext cx="7768800" cy="3418375"/>
+          </a:xfrm>
+        </p:spPr>
+        <p:txBody>
+          <a:bodyPr/>
+          <a:lstStyle/>
+          <a:p>
+            <a:r>
+              <a:rPr lang="en-US" dirty="0" smtClean="0"/>
+              <a:t>Leach pad information:</a:t>
+            </a:r>
+          </a:p>
+          <a:p>
+            <a:pPr lvl="1"/>
+            <a:r>
+              <a:rPr lang="en-US" dirty="0" smtClean="0"/>
+              <a:t>Cells polygons</a:t>
+            </a:r>
+          </a:p>
+          <a:p>
+            <a:pPr lvl="1"/>
+            <a:r>
+              <a:rPr lang="en-US" dirty="0" smtClean="0"/>
+              <a:t>Cells material information</a:t>
+            </a:r>
+          </a:p>
+          <a:p>
+            <a:pPr marL="342900" lvl="1" indent="0">
+              <a:buNone/>
+            </a:pPr>
+            <a:endParaRPr lang="en-US" dirty="0" smtClean="0"/>
+          </a:p>
+          <a:p>
+            <a:r>
+              <a:rPr lang="en-US" dirty="0" smtClean="0"/>
+              <a:t>Geochemistry information:</a:t>
+            </a:r>
+          </a:p>
+          <a:p>
+            <a:pPr lvl="1"/>
+            <a:r>
+              <a:rPr lang="en-US" dirty="0" smtClean="0"/>
+              <a:t>Received data from exploration geologists.</a:t>
+            </a:r>
+          </a:p>
+          <a:p>
+            <a:pPr lvl="1"/>
+            <a:r>
+              <a:rPr lang="en-US" dirty="0" smtClean="0"/>
+              <a:t>Data includes multi-element assays, intersection range, drill hole depth.</a:t>
+            </a:r>
+          </a:p>
+          <a:p>
+            <a:endParaRPr lang="en-US" dirty="0" smtClean="0"/>
+          </a:p>
+        </p:txBody>
+      </p:sp>
+      <p:sp>
+        <p:nvSpPr>
+          <p:cNvPr id="14" name="Text Placeholder 13"/>
+          <p:cNvSpPr>
+            <a:spLocks noGrp="1"/>
+          </p:cNvSpPr>
+          <p:nvPr>
+            <p:ph type="body" sz="quarter" idx="15"/>
           </p:nvPr>
         </p:nvSpPr>
         <p:spPr/>
@@ -9494,14 +10103,17 @@
           <a:bodyPr/>
           <a:lstStyle/>
           <a:p>
-            <a:endParaRPr lang="en-CA"/>
+            <a:r>
+              <a:rPr lang="en-US" dirty="0"/>
+              <a:t>Fort Knox Heap Leach Model Remake</a:t>
+            </a:r>
           </a:p>
         </p:txBody>
       </p:sp>
     </p:spTree>
     <p:extLst>
       <p:ext uri="{BB962C8B-B14F-4D97-AF65-F5344CB8AC3E}">
-        <p14:creationId xmlns:p14="http://schemas.microsoft.com/office/powerpoint/2010/main" val="1638810932"/>
+        <p14:creationId xmlns:p14="http://schemas.microsoft.com/office/powerpoint/2010/main" val="1335716075"/>
       </p:ext>
     </p:extLst>
   </p:cSld>
@@ -10034,9 +10646,12 @@
 </file>
 
 <file path=customXml/item1.xml><?xml version="1.0" encoding="utf-8"?>
-<p:properties xmlns:p="http://schemas.microsoft.com/office/2006/metadata/properties" xmlns:xsi="http://www.w3.org/2001/XMLSchema-instance" xmlns:pc="http://schemas.microsoft.com/office/infopath/2007/PartnerControls">
-  <documentManagement/>
-</p:properties>
+<?mso-contentType ?>
+<FormTemplates xmlns="http://schemas.microsoft.com/sharepoint/v3/contenttype/forms">
+  <Display>DocumentLibraryForm</Display>
+  <Edit>DocumentLibraryForm</Edit>
+  <New>DocumentLibraryForm</New>
+</FormTemplates>
 </file>
 
 <file path=customXml/item2.xml><?xml version="1.0" encoding="utf-8"?>
@@ -10154,25 +10769,15 @@
 </file>
 
 <file path=customXml/item3.xml><?xml version="1.0" encoding="utf-8"?>
-<?mso-contentType ?>
-<FormTemplates xmlns="http://schemas.microsoft.com/sharepoint/v3/contenttype/forms">
-  <Display>DocumentLibraryForm</Display>
-  <Edit>DocumentLibraryForm</Edit>
-  <New>DocumentLibraryForm</New>
-</FormTemplates>
+<p:properties xmlns:p="http://schemas.microsoft.com/office/2006/metadata/properties" xmlns:xsi="http://www.w3.org/2001/XMLSchema-instance" xmlns:pc="http://schemas.microsoft.com/office/infopath/2007/PartnerControls">
+  <documentManagement/>
+</p:properties>
 </file>
 
 <file path=customXml/itemProps1.xml><?xml version="1.0" encoding="utf-8"?>
-<ds:datastoreItem xmlns:ds="http://schemas.openxmlformats.org/officeDocument/2006/customXml" ds:itemID="{87EC307F-6696-4FF8-8677-D3EF1D29AE74}">
+<ds:datastoreItem xmlns:ds="http://schemas.openxmlformats.org/officeDocument/2006/customXml" ds:itemID="{19036592-6B47-4660-8F42-1BC6503C71A9}">
   <ds:schemaRefs>
-    <ds:schemaRef ds:uri="http://schemas.openxmlformats.org/package/2006/metadata/core-properties"/>
-    <ds:schemaRef ds:uri="http://purl.org/dc/dcmitype/"/>
-    <ds:schemaRef ds:uri="http://purl.org/dc/elements/1.1/"/>
-    <ds:schemaRef ds:uri="http://purl.org/dc/terms/"/>
-    <ds:schemaRef ds:uri="http://schemas.microsoft.com/office/2006/metadata/properties"/>
-    <ds:schemaRef ds:uri="http://schemas.microsoft.com/office/2006/documentManagement/types"/>
-    <ds:schemaRef ds:uri="http://www.w3.org/XML/1998/namespace"/>
-    <ds:schemaRef ds:uri="http://schemas.microsoft.com/office/infopath/2007/PartnerControls"/>
+    <ds:schemaRef ds:uri="http://schemas.microsoft.com/sharepoint/v3/contenttype/forms"/>
   </ds:schemaRefs>
 </ds:datastoreItem>
 </file>
@@ -10194,9 +10799,16 @@
 </file>
 
 <file path=customXml/itemProps3.xml><?xml version="1.0" encoding="utf-8"?>
-<ds:datastoreItem xmlns:ds="http://schemas.openxmlformats.org/officeDocument/2006/customXml" ds:itemID="{19036592-6B47-4660-8F42-1BC6503C71A9}">
+<ds:datastoreItem xmlns:ds="http://schemas.openxmlformats.org/officeDocument/2006/customXml" ds:itemID="{87EC307F-6696-4FF8-8677-D3EF1D29AE74}">
   <ds:schemaRefs>
-    <ds:schemaRef ds:uri="http://schemas.microsoft.com/sharepoint/v3/contenttype/forms"/>
+    <ds:schemaRef ds:uri="http://schemas.microsoft.com/office/2006/metadata/properties"/>
+    <ds:schemaRef ds:uri="http://schemas.microsoft.com/office/infopath/2007/PartnerControls"/>
+    <ds:schemaRef ds:uri="http://www.w3.org/XML/1998/namespace"/>
+    <ds:schemaRef ds:uri="http://schemas.microsoft.com/office/2006/documentManagement/types"/>
+    <ds:schemaRef ds:uri="http://purl.org/dc/elements/1.1/"/>
+    <ds:schemaRef ds:uri="http://purl.org/dc/terms/"/>
+    <ds:schemaRef ds:uri="http://schemas.openxmlformats.org/package/2006/metadata/core-properties"/>
+    <ds:schemaRef ds:uri="http://purl.org/dc/dcmitype/"/>
   </ds:schemaRefs>
 </ds:datastoreItem>
 </file>
</xml_diff>

<commit_message>
switch selected files to git ignore
</commit_message>
<xml_diff>
--- a/FK_HL_Model_Remake.pptx
+++ b/FK_HL_Model_Remake.pptx
@@ -11,9 +11,9 @@
     <p:sldId id="285" r:id="rId5"/>
     <p:sldId id="275" r:id="rId6"/>
     <p:sldId id="262" r:id="rId7"/>
-    <p:sldId id="306" r:id="rId8"/>
-    <p:sldId id="257" r:id="rId9"/>
-    <p:sldId id="305" r:id="rId10"/>
+    <p:sldId id="257" r:id="rId8"/>
+    <p:sldId id="305" r:id="rId9"/>
+    <p:sldId id="306" r:id="rId10"/>
     <p:sldId id="258" r:id="rId11"/>
     <p:sldId id="259" r:id="rId12"/>
     <p:sldId id="307" r:id="rId13"/>
@@ -208,7 +208,7 @@
           <a:p>
             <a:fld id="{21164539-4278-BE42-8F61-4C94F5FD0226}" type="datetimeFigureOut">
               <a:rPr lang="en-US" smtClean="0"/>
-              <a:t>7/25/2021</a:t>
+              <a:t>8/5/2021</a:t>
             </a:fld>
             <a:endParaRPr lang="en-US"/>
           </a:p>
@@ -843,7 +843,7 @@
           <a:p>
             <a:fld id="{C6689B86-083C-4A42-8888-BAB16E4B4DA7}" type="datetime4">
               <a:rPr lang="en-CA" smtClean="0"/>
-              <a:t>July 25, 2021</a:t>
+              <a:t>August 5, 2021</a:t>
             </a:fld>
             <a:endParaRPr lang="en-US" dirty="0"/>
           </a:p>
@@ -1018,7 +1018,7 @@
           <a:p>
             <a:fld id="{8EC16C23-3C30-CD46-877E-3E22753DE2DD}" type="datetime4">
               <a:rPr lang="en-CA" smtClean="0"/>
-              <a:t>July 25, 2021</a:t>
+              <a:t>August 5, 2021</a:t>
             </a:fld>
             <a:endParaRPr lang="en-US" dirty="0"/>
           </a:p>
@@ -1365,7 +1365,7 @@
           <a:p>
             <a:fld id="{18DAA47B-4062-2645-ADD8-10E70E79D0BB}" type="datetime4">
               <a:rPr lang="en-CA" smtClean="0"/>
-              <a:t>July 25, 2021</a:t>
+              <a:t>August 5, 2021</a:t>
             </a:fld>
             <a:endParaRPr lang="en-US" dirty="0"/>
           </a:p>
@@ -1779,7 +1779,7 @@
           <a:p>
             <a:fld id="{10E38F1C-BEA5-784A-83C8-5B6DC70122C6}" type="datetime4">
               <a:rPr lang="en-CA" smtClean="0"/>
-              <a:t>July 25, 2021</a:t>
+              <a:t>August 5, 2021</a:t>
             </a:fld>
             <a:endParaRPr lang="en-US" dirty="0"/>
           </a:p>
@@ -2300,7 +2300,7 @@
           <a:p>
             <a:fld id="{685E96B0-41DE-F440-80BA-6CFE5B0D6B94}" type="datetime4">
               <a:rPr lang="en-CA" smtClean="0"/>
-              <a:t>July 25, 2021</a:t>
+              <a:t>August 5, 2021</a:t>
             </a:fld>
             <a:endParaRPr lang="en-US"/>
           </a:p>
@@ -2691,7 +2691,7 @@
           <a:p>
             <a:fld id="{8FDE5476-5569-604A-8A87-08C5982958A2}" type="datetime4">
               <a:rPr lang="en-CA" smtClean="0"/>
-              <a:t>July 25, 2021</a:t>
+              <a:t>August 5, 2021</a:t>
             </a:fld>
             <a:endParaRPr lang="en-US" dirty="0"/>
           </a:p>
@@ -2910,7 +2910,7 @@
           <a:p>
             <a:fld id="{E7C71A3B-F3C1-4447-8716-2DA1915E9000}" type="datetime4">
               <a:rPr lang="en-CA" smtClean="0"/>
-              <a:t>July 25, 2021</a:t>
+              <a:t>August 5, 2021</a:t>
             </a:fld>
             <a:endParaRPr lang="en-US"/>
           </a:p>
@@ -3104,7 +3104,7 @@
           <a:p>
             <a:fld id="{788EC684-F565-6140-A5D6-DA9A9407E56E}" type="datetime4">
               <a:rPr lang="en-CA" smtClean="0"/>
-              <a:t>July 25, 2021</a:t>
+              <a:t>August 5, 2021</a:t>
             </a:fld>
             <a:endParaRPr lang="en-US"/>
           </a:p>
@@ -3635,7 +3635,7 @@
           <a:p>
             <a:fld id="{9C84DA30-0C2B-9F48-A1E1-0748AFD0DC6B}" type="datetime4">
               <a:rPr lang="en-CA" smtClean="0"/>
-              <a:t>July 25, 2021</a:t>
+              <a:t>August 5, 2021</a:t>
             </a:fld>
             <a:endParaRPr lang="en-US"/>
           </a:p>
@@ -3949,7 +3949,7 @@
           <a:p>
             <a:fld id="{BE5294DF-69CC-B446-91AB-0C6001469F63}" type="datetime4">
               <a:rPr lang="en-CA" smtClean="0"/>
-              <a:t>July 25, 2021</a:t>
+              <a:t>August 5, 2021</a:t>
             </a:fld>
             <a:endParaRPr lang="en-US"/>
           </a:p>
@@ -4128,7 +4128,7 @@
           <a:p>
             <a:fld id="{1E192792-884A-AD43-BE8E-8F1FC1D5646F}" type="datetime4">
               <a:rPr lang="en-CA" smtClean="0"/>
-              <a:t>July 25, 2021</a:t>
+              <a:t>August 5, 2021</a:t>
             </a:fld>
             <a:endParaRPr lang="en-US" dirty="0"/>
           </a:p>
@@ -4322,7 +4322,7 @@
           <a:p>
             <a:fld id="{4ABFA5F4-1252-224A-99A5-A35556FE5E1C}" type="datetime4">
               <a:rPr lang="en-CA" smtClean="0"/>
-              <a:t>July 25, 2021</a:t>
+              <a:t>August 5, 2021</a:t>
             </a:fld>
             <a:endParaRPr lang="en-US"/>
           </a:p>
@@ -4712,7 +4712,7 @@
           <a:p>
             <a:fld id="{C0814498-84C9-1446-B8F0-92F3EC01D033}" type="datetime4">
               <a:rPr lang="en-CA" smtClean="0"/>
-              <a:t>July 25, 2021</a:t>
+              <a:t>August 5, 2021</a:t>
             </a:fld>
             <a:endParaRPr lang="en-US"/>
           </a:p>
@@ -5244,7 +5244,7 @@
           <a:p>
             <a:fld id="{F8D88939-0256-8E43-94E7-E508EE61424E}" type="datetime4">
               <a:rPr lang="en-CA" smtClean="0"/>
-              <a:t>July 25, 2021</a:t>
+              <a:t>August 5, 2021</a:t>
             </a:fld>
             <a:endParaRPr lang="en-US" dirty="0"/>
           </a:p>
@@ -6446,7 +6446,7 @@
             <a:fld id="{84A601FB-51CE-0D47-9BCA-D722657D0795}" type="datetime4">
               <a:rPr lang="en-CA" smtClean="0"/>
               <a:pPr/>
-              <a:t>July 25, 2021</a:t>
+              <a:t>August 5, 2021</a:t>
             </a:fld>
             <a:endParaRPr lang="en-US" dirty="0"/>
           </a:p>
@@ -6566,7 +6566,7 @@
             <a:fld id="{49FF2BEF-23C6-5D43-816C-81833513DDC1}" type="datetime4">
               <a:rPr lang="en-CA" smtClean="0"/>
               <a:pPr/>
-              <a:t>July 25, 2021</a:t>
+              <a:t>August 5, 2021</a:t>
             </a:fld>
             <a:endParaRPr lang="en-US"/>
           </a:p>
@@ -6669,11 +6669,7 @@
             </a:pPr>
             <a:r>
               <a:rPr lang="en-US" dirty="0" smtClean="0"/>
-              <a:t>Divide cells into multiple equal size blocks along latitude and longitude. Assume each block from the same cell has the same initial physical properties, including tonnage, ounces, leaching performance, etc. The only differences between blocks in the same cell are the coordinates</a:t>
-            </a:r>
-            <a:r>
-              <a:rPr lang="en-US" dirty="0" smtClean="0"/>
-              <a:t>.</a:t>
+              <a:t>Divide cells into multiple equal size blocks along latitude and longitude. Assume each block from the same cell has the same initial physical properties, including tonnage, ounces, leaching performance, etc. The only differences between blocks in the same cell are the coordinates.</a:t>
             </a:r>
           </a:p>
           <a:p>
@@ -6704,7 +6700,6 @@
               <a:rPr lang="en-US" dirty="0" smtClean="0"/>
               <a:t>receives cyanide solution drained down from the block above this block.</a:t>
             </a:r>
-            <a:endParaRPr lang="en-US" dirty="0" smtClean="0"/>
           </a:p>
           <a:p>
             <a:pPr lvl="1"/>
@@ -6945,7 +6940,7 @@
             <a:fld id="{F78F707E-E062-5C47-A7FE-62DAAA8D2156}" type="datetime4">
               <a:rPr lang="en-CA" smtClean="0"/>
               <a:pPr/>
-              <a:t>July 25, 2021</a:t>
+              <a:t>August 5, 2021</a:t>
             </a:fld>
             <a:endParaRPr lang="en-US"/>
           </a:p>
@@ -7042,7 +7037,7 @@
             <a:fld id="{9FCBCA37-E9DE-A841-81BB-554CC890BCE4}" type="datetime4">
               <a:rPr lang="en-CA" smtClean="0"/>
               <a:pPr/>
-              <a:t>July 25, 2021</a:t>
+              <a:t>August 5, 2021</a:t>
             </a:fld>
             <a:endParaRPr lang="en-US"/>
           </a:p>
@@ -7266,7 +7261,7 @@
           <a:p>
             <a:fld id="{938A8CA3-7F0C-5446-9644-486EEACF7FAF}" type="datetime4">
               <a:rPr lang="en-CA" smtClean="0"/>
-              <a:t>July 25, 2021</a:t>
+              <a:t>August 5, 2021</a:t>
             </a:fld>
             <a:endParaRPr lang="en-US"/>
           </a:p>
@@ -7400,7 +7395,7 @@
             <a:fld id="{01726941-DB26-E74E-AA79-985F679517B7}" type="datetime4">
               <a:rPr lang="en-CA" smtClean="0"/>
               <a:pPr/>
-              <a:t>July 25, 2021</a:t>
+              <a:t>August 5, 2021</a:t>
             </a:fld>
             <a:endParaRPr lang="en-US"/>
           </a:p>
@@ -7479,175 +7474,6 @@
           <a:chExt cx="0" cy="0"/>
         </a:xfrm>
       </p:grpSpPr>
-      <p:pic>
-        <p:nvPicPr>
-          <p:cNvPr id="9" name="Picture Placeholder 8"/>
-          <p:cNvPicPr>
-            <a:picLocks noGrp="1" noChangeAspect="1"/>
-          </p:cNvPicPr>
-          <p:nvPr>
-            <p:ph type="pic" sz="quarter" idx="13"/>
-          </p:nvPr>
-        </p:nvPicPr>
-        <p:blipFill>
-          <a:blip r:embed="rId2" cstate="screen">
-            <a:alphaModFix amt="5000"/>
-            <a:extLst>
-              <a:ext uri="{28A0092B-C50C-407E-A947-70E740481C1C}">
-                <a14:useLocalDpi xmlns:a14="http://schemas.microsoft.com/office/drawing/2010/main"/>
-              </a:ext>
-            </a:extLst>
-          </a:blip>
-          <a:srcRect/>
-          <a:stretch>
-            <a:fillRect/>
-          </a:stretch>
-        </p:blipFill>
-        <p:spPr/>
-      </p:pic>
-      <p:sp>
-        <p:nvSpPr>
-          <p:cNvPr id="2" name="Title 1"/>
-          <p:cNvSpPr>
-            <a:spLocks noGrp="1"/>
-          </p:cNvSpPr>
-          <p:nvPr>
-            <p:ph type="title"/>
-          </p:nvPr>
-        </p:nvSpPr>
-        <p:spPr/>
-        <p:txBody>
-          <a:bodyPr/>
-          <a:lstStyle/>
-          <a:p>
-            <a:r>
-              <a:rPr lang="en-US" dirty="0" smtClean="0"/>
-              <a:t>I poured root beer in a square glass. What did I get?</a:t>
-            </a:r>
-            <a:endParaRPr lang="en-US" dirty="0"/>
-          </a:p>
-        </p:txBody>
-      </p:sp>
-      <p:sp>
-        <p:nvSpPr>
-          <p:cNvPr id="3" name="Text Placeholder 2"/>
-          <p:cNvSpPr>
-            <a:spLocks noGrp="1"/>
-          </p:cNvSpPr>
-          <p:nvPr>
-            <p:ph type="body" idx="1"/>
-          </p:nvPr>
-        </p:nvSpPr>
-        <p:spPr/>
-        <p:txBody>
-          <a:bodyPr/>
-          <a:lstStyle/>
-          <a:p>
-            <a:r>
-              <a:rPr lang="en-US" dirty="0" smtClean="0"/>
-              <a:t>Just beer.</a:t>
-            </a:r>
-            <a:endParaRPr lang="en-US" dirty="0"/>
-          </a:p>
-        </p:txBody>
-      </p:sp>
-      <p:sp>
-        <p:nvSpPr>
-          <p:cNvPr id="4" name="Date Placeholder 3"/>
-          <p:cNvSpPr>
-            <a:spLocks noGrp="1"/>
-          </p:cNvSpPr>
-          <p:nvPr>
-            <p:ph type="dt" sz="half" idx="10"/>
-          </p:nvPr>
-        </p:nvSpPr>
-        <p:spPr/>
-        <p:txBody>
-          <a:bodyPr/>
-          <a:lstStyle/>
-          <a:p>
-            <a:fld id="{01726941-DB26-E74E-AA79-985F679517B7}" type="datetime4">
-              <a:rPr lang="en-CA" smtClean="0"/>
-              <a:pPr/>
-              <a:t>July 25, 2021</a:t>
-            </a:fld>
-            <a:endParaRPr lang="en-US"/>
-          </a:p>
-        </p:txBody>
-      </p:sp>
-      <p:sp>
-        <p:nvSpPr>
-          <p:cNvPr id="19" name="Footer Placeholder 18"/>
-          <p:cNvSpPr>
-            <a:spLocks noGrp="1"/>
-          </p:cNvSpPr>
-          <p:nvPr>
-            <p:ph type="ftr" sz="quarter" idx="11"/>
-          </p:nvPr>
-        </p:nvSpPr>
-        <p:spPr/>
-        <p:txBody>
-          <a:bodyPr/>
-          <a:lstStyle/>
-          <a:p>
-            <a:endParaRPr lang="en-US" dirty="0"/>
-          </a:p>
-        </p:txBody>
-      </p:sp>
-      <p:sp>
-        <p:nvSpPr>
-          <p:cNvPr id="5" name="Slide Number Placeholder 4"/>
-          <p:cNvSpPr>
-            <a:spLocks noGrp="1"/>
-          </p:cNvSpPr>
-          <p:nvPr>
-            <p:ph type="sldNum" sz="quarter" idx="12"/>
-          </p:nvPr>
-        </p:nvSpPr>
-        <p:spPr/>
-        <p:txBody>
-          <a:bodyPr/>
-          <a:lstStyle/>
-          <a:p>
-            <a:fld id="{70341EDA-DF76-394C-B359-28542C3A7753}" type="slidenum">
-              <a:rPr lang="en-US" smtClean="0"/>
-              <a:pPr/>
-              <a:t>4</a:t>
-            </a:fld>
-            <a:endParaRPr lang="en-US"/>
-          </a:p>
-        </p:txBody>
-      </p:sp>
-    </p:spTree>
-    <p:extLst>
-      <p:ext uri="{BB962C8B-B14F-4D97-AF65-F5344CB8AC3E}">
-        <p14:creationId xmlns:p14="http://schemas.microsoft.com/office/powerpoint/2010/main" val="1719727536"/>
-      </p:ext>
-    </p:extLst>
-  </p:cSld>
-  <p:clrMapOvr>
-    <a:masterClrMapping/>
-  </p:clrMapOvr>
-</p:sld>
-</file>
-
-<file path=ppt/slides/slide5.xml><?xml version="1.0" encoding="utf-8"?>
-<p:sld xmlns:a="http://schemas.openxmlformats.org/drawingml/2006/main" xmlns:r="http://schemas.openxmlformats.org/officeDocument/2006/relationships" xmlns:p="http://schemas.openxmlformats.org/presentationml/2006/main">
-  <p:cSld>
-    <p:spTree>
-      <p:nvGrpSpPr>
-        <p:cNvPr id="1" name=""/>
-        <p:cNvGrpSpPr/>
-        <p:nvPr/>
-      </p:nvGrpSpPr>
-      <p:grpSpPr>
-        <a:xfrm>
-          <a:off x="0" y="0"/>
-          <a:ext cx="0" cy="0"/>
-          <a:chOff x="0" y="0"/>
-          <a:chExt cx="0" cy="0"/>
-        </a:xfrm>
-      </p:grpSpPr>
       <p:sp>
         <p:nvSpPr>
           <p:cNvPr id="2" name="Title 1"/>
@@ -7740,7 +7566,7 @@
             <a:fld id="{E35C74F7-D47D-EC46-9833-7ECFE3470865}" type="datetime4">
               <a:rPr lang="en-CA" smtClean="0"/>
               <a:pPr/>
-              <a:t>July 25, 2021</a:t>
+              <a:t>August 5, 2021</a:t>
             </a:fld>
             <a:endParaRPr lang="en-US"/>
           </a:p>
@@ -7783,7 +7609,7 @@
             <a:fld id="{70341EDA-DF76-394C-B359-28542C3A7753}" type="slidenum">
               <a:rPr lang="en-US" smtClean="0"/>
               <a:pPr/>
-              <a:t>5</a:t>
+              <a:t>4</a:t>
             </a:fld>
             <a:endParaRPr lang="en-US"/>
           </a:p>
@@ -7824,7 +7650,7 @@
 </p:sld>
 </file>
 
-<file path=ppt/slides/slide6.xml><?xml version="1.0" encoding="utf-8"?>
+<file path=ppt/slides/slide5.xml><?xml version="1.0" encoding="utf-8"?>
 <p:sld xmlns:a="http://schemas.openxmlformats.org/drawingml/2006/main" xmlns:r="http://schemas.openxmlformats.org/officeDocument/2006/relationships" xmlns:p="http://schemas.openxmlformats.org/presentationml/2006/main">
   <p:cSld>
     <p:spTree>
@@ -7929,7 +7755,7 @@
             <a:fld id="{1E192792-884A-AD43-BE8E-8F1FC1D5646F}" type="datetime4">
               <a:rPr lang="en-CA" smtClean="0"/>
               <a:pPr/>
-              <a:t>July 25, 2021</a:t>
+              <a:t>August 5, 2021</a:t>
             </a:fld>
             <a:endParaRPr lang="en-US" dirty="0"/>
           </a:p>
@@ -7984,7 +7810,7 @@
             <a:fld id="{70341EDA-DF76-394C-B359-28542C3A7753}" type="slidenum">
               <a:rPr lang="en-US" smtClean="0"/>
               <a:pPr/>
-              <a:t>6</a:t>
+              <a:t>5</a:t>
             </a:fld>
             <a:endParaRPr lang="en-US"/>
           </a:p>
@@ -9424,6 +9250,175 @@
 </p:sld>
 </file>
 
+<file path=ppt/slides/slide6.xml><?xml version="1.0" encoding="utf-8"?>
+<p:sld xmlns:a="http://schemas.openxmlformats.org/drawingml/2006/main" xmlns:r="http://schemas.openxmlformats.org/officeDocument/2006/relationships" xmlns:p="http://schemas.openxmlformats.org/presentationml/2006/main">
+  <p:cSld>
+    <p:spTree>
+      <p:nvGrpSpPr>
+        <p:cNvPr id="1" name=""/>
+        <p:cNvGrpSpPr/>
+        <p:nvPr/>
+      </p:nvGrpSpPr>
+      <p:grpSpPr>
+        <a:xfrm>
+          <a:off x="0" y="0"/>
+          <a:ext cx="0" cy="0"/>
+          <a:chOff x="0" y="0"/>
+          <a:chExt cx="0" cy="0"/>
+        </a:xfrm>
+      </p:grpSpPr>
+      <p:pic>
+        <p:nvPicPr>
+          <p:cNvPr id="9" name="Picture Placeholder 8"/>
+          <p:cNvPicPr>
+            <a:picLocks noGrp="1" noChangeAspect="1"/>
+          </p:cNvPicPr>
+          <p:nvPr>
+            <p:ph type="pic" sz="quarter" idx="13"/>
+          </p:nvPr>
+        </p:nvPicPr>
+        <p:blipFill>
+          <a:blip r:embed="rId2" cstate="screen">
+            <a:alphaModFix amt="5000"/>
+            <a:extLst>
+              <a:ext uri="{28A0092B-C50C-407E-A947-70E740481C1C}">
+                <a14:useLocalDpi xmlns:a14="http://schemas.microsoft.com/office/drawing/2010/main"/>
+              </a:ext>
+            </a:extLst>
+          </a:blip>
+          <a:srcRect/>
+          <a:stretch>
+            <a:fillRect/>
+          </a:stretch>
+        </p:blipFill>
+        <p:spPr/>
+      </p:pic>
+      <p:sp>
+        <p:nvSpPr>
+          <p:cNvPr id="2" name="Title 1"/>
+          <p:cNvSpPr>
+            <a:spLocks noGrp="1"/>
+          </p:cNvSpPr>
+          <p:nvPr>
+            <p:ph type="title"/>
+          </p:nvPr>
+        </p:nvSpPr>
+        <p:spPr/>
+        <p:txBody>
+          <a:bodyPr/>
+          <a:lstStyle/>
+          <a:p>
+            <a:r>
+              <a:rPr lang="en-US" dirty="0" smtClean="0"/>
+              <a:t>I poured root beer in a square glass. What did I get?</a:t>
+            </a:r>
+            <a:endParaRPr lang="en-US" dirty="0"/>
+          </a:p>
+        </p:txBody>
+      </p:sp>
+      <p:sp>
+        <p:nvSpPr>
+          <p:cNvPr id="3" name="Text Placeholder 2"/>
+          <p:cNvSpPr>
+            <a:spLocks noGrp="1"/>
+          </p:cNvSpPr>
+          <p:nvPr>
+            <p:ph type="body" idx="1"/>
+          </p:nvPr>
+        </p:nvSpPr>
+        <p:spPr/>
+        <p:txBody>
+          <a:bodyPr/>
+          <a:lstStyle/>
+          <a:p>
+            <a:r>
+              <a:rPr lang="en-US" dirty="0" smtClean="0"/>
+              <a:t>Just beer.</a:t>
+            </a:r>
+            <a:endParaRPr lang="en-US" dirty="0"/>
+          </a:p>
+        </p:txBody>
+      </p:sp>
+      <p:sp>
+        <p:nvSpPr>
+          <p:cNvPr id="4" name="Date Placeholder 3"/>
+          <p:cNvSpPr>
+            <a:spLocks noGrp="1"/>
+          </p:cNvSpPr>
+          <p:nvPr>
+            <p:ph type="dt" sz="half" idx="10"/>
+          </p:nvPr>
+        </p:nvSpPr>
+        <p:spPr/>
+        <p:txBody>
+          <a:bodyPr/>
+          <a:lstStyle/>
+          <a:p>
+            <a:fld id="{01726941-DB26-E74E-AA79-985F679517B7}" type="datetime4">
+              <a:rPr lang="en-CA" smtClean="0"/>
+              <a:pPr/>
+              <a:t>August 5, 2021</a:t>
+            </a:fld>
+            <a:endParaRPr lang="en-US"/>
+          </a:p>
+        </p:txBody>
+      </p:sp>
+      <p:sp>
+        <p:nvSpPr>
+          <p:cNvPr id="19" name="Footer Placeholder 18"/>
+          <p:cNvSpPr>
+            <a:spLocks noGrp="1"/>
+          </p:cNvSpPr>
+          <p:nvPr>
+            <p:ph type="ftr" sz="quarter" idx="11"/>
+          </p:nvPr>
+        </p:nvSpPr>
+        <p:spPr/>
+        <p:txBody>
+          <a:bodyPr/>
+          <a:lstStyle/>
+          <a:p>
+            <a:endParaRPr lang="en-US" dirty="0"/>
+          </a:p>
+        </p:txBody>
+      </p:sp>
+      <p:sp>
+        <p:nvSpPr>
+          <p:cNvPr id="5" name="Slide Number Placeholder 4"/>
+          <p:cNvSpPr>
+            <a:spLocks noGrp="1"/>
+          </p:cNvSpPr>
+          <p:nvPr>
+            <p:ph type="sldNum" sz="quarter" idx="12"/>
+          </p:nvPr>
+        </p:nvSpPr>
+        <p:spPr/>
+        <p:txBody>
+          <a:bodyPr/>
+          <a:lstStyle/>
+          <a:p>
+            <a:fld id="{70341EDA-DF76-394C-B359-28542C3A7753}" type="slidenum">
+              <a:rPr lang="en-US" smtClean="0"/>
+              <a:pPr/>
+              <a:t>6</a:t>
+            </a:fld>
+            <a:endParaRPr lang="en-US"/>
+          </a:p>
+        </p:txBody>
+      </p:sp>
+    </p:spTree>
+    <p:extLst>
+      <p:ext uri="{BB962C8B-B14F-4D97-AF65-F5344CB8AC3E}">
+        <p14:creationId xmlns:p14="http://schemas.microsoft.com/office/powerpoint/2010/main" val="1719727536"/>
+      </p:ext>
+    </p:extLst>
+  </p:cSld>
+  <p:clrMapOvr>
+    <a:masterClrMapping/>
+  </p:clrMapOvr>
+</p:sld>
+</file>
+
 <file path=ppt/slides/slide7.xml><?xml version="1.0" encoding="utf-8"?>
 <p:sld xmlns:a="http://schemas.openxmlformats.org/drawingml/2006/main" xmlns:r="http://schemas.openxmlformats.org/officeDocument/2006/relationships" xmlns:p="http://schemas.openxmlformats.org/presentationml/2006/main">
   <p:cSld>
@@ -9482,7 +9477,7 @@
             <a:fld id="{49FF2BEF-23C6-5D43-816C-81833513DDC1}" type="datetime4">
               <a:rPr lang="en-CA" smtClean="0"/>
               <a:pPr/>
-              <a:t>July 25, 2021</a:t>
+              <a:t>August 5, 2021</a:t>
             </a:fld>
             <a:endParaRPr lang="en-US"/>
           </a:p>
@@ -9697,7 +9692,7 @@
             <a:fld id="{53176067-3430-564D-886D-71DF85FF18D6}" type="datetime4">
               <a:rPr lang="en-CA" smtClean="0"/>
               <a:pPr/>
-              <a:t>July 25, 2021</a:t>
+              <a:t>August 5, 2021</a:t>
             </a:fld>
             <a:endParaRPr lang="en-US"/>
           </a:p>
@@ -9974,7 +9969,7 @@
             <a:fld id="{49FF2BEF-23C6-5D43-816C-81833513DDC1}" type="datetime4">
               <a:rPr lang="en-CA" smtClean="0"/>
               <a:pPr/>
-              <a:t>July 25, 2021</a:t>
+              <a:t>August 5, 2021</a:t>
             </a:fld>
             <a:endParaRPr lang="en-US"/>
           </a:p>
@@ -10071,11 +10066,7 @@
           <a:p>
             <a:r>
               <a:rPr lang="en-US" dirty="0" smtClean="0"/>
-              <a:t>Geochemistry </a:t>
-            </a:r>
-            <a:r>
-              <a:rPr lang="en-US" dirty="0" smtClean="0"/>
-              <a:t>information:</a:t>
+              <a:t>Geochemistry information:</a:t>
             </a:r>
           </a:p>
           <a:p>
@@ -10091,7 +10082,6 @@
               <a:rPr lang="en-US" dirty="0" smtClean="0"/>
               <a:t>Data includes multi-element assays, intersection range, drill hole depth.</a:t>
             </a:r>
-            <a:endParaRPr lang="en-US" dirty="0" smtClean="0"/>
           </a:p>
           <a:p>
             <a:endParaRPr lang="en-US" dirty="0" smtClean="0"/>
@@ -10656,9 +10646,12 @@
 </file>
 
 <file path=customXml/item1.xml><?xml version="1.0" encoding="utf-8"?>
-<p:properties xmlns:p="http://schemas.microsoft.com/office/2006/metadata/properties" xmlns:xsi="http://www.w3.org/2001/XMLSchema-instance" xmlns:pc="http://schemas.microsoft.com/office/infopath/2007/PartnerControls">
-  <documentManagement/>
-</p:properties>
+<?mso-contentType ?>
+<FormTemplates xmlns="http://schemas.microsoft.com/sharepoint/v3/contenttype/forms">
+  <Display>DocumentLibraryForm</Display>
+  <Edit>DocumentLibraryForm</Edit>
+  <New>DocumentLibraryForm</New>
+</FormTemplates>
 </file>
 
 <file path=customXml/item2.xml><?xml version="1.0" encoding="utf-8"?>
@@ -10776,25 +10769,15 @@
 </file>
 
 <file path=customXml/item3.xml><?xml version="1.0" encoding="utf-8"?>
-<?mso-contentType ?>
-<FormTemplates xmlns="http://schemas.microsoft.com/sharepoint/v3/contenttype/forms">
-  <Display>DocumentLibraryForm</Display>
-  <Edit>DocumentLibraryForm</Edit>
-  <New>DocumentLibraryForm</New>
-</FormTemplates>
+<p:properties xmlns:p="http://schemas.microsoft.com/office/2006/metadata/properties" xmlns:xsi="http://www.w3.org/2001/XMLSchema-instance" xmlns:pc="http://schemas.microsoft.com/office/infopath/2007/PartnerControls">
+  <documentManagement/>
+</p:properties>
 </file>
 
 <file path=customXml/itemProps1.xml><?xml version="1.0" encoding="utf-8"?>
-<ds:datastoreItem xmlns:ds="http://schemas.openxmlformats.org/officeDocument/2006/customXml" ds:itemID="{87EC307F-6696-4FF8-8677-D3EF1D29AE74}">
+<ds:datastoreItem xmlns:ds="http://schemas.openxmlformats.org/officeDocument/2006/customXml" ds:itemID="{19036592-6B47-4660-8F42-1BC6503C71A9}">
   <ds:schemaRefs>
-    <ds:schemaRef ds:uri="http://purl.org/dc/elements/1.1/"/>
-    <ds:schemaRef ds:uri="http://purl.org/dc/dcmitype/"/>
-    <ds:schemaRef ds:uri="http://schemas.microsoft.com/office/2006/metadata/properties"/>
-    <ds:schemaRef ds:uri="http://www.w3.org/XML/1998/namespace"/>
-    <ds:schemaRef ds:uri="http://schemas.microsoft.com/office/2006/documentManagement/types"/>
-    <ds:schemaRef ds:uri="http://schemas.microsoft.com/office/infopath/2007/PartnerControls"/>
-    <ds:schemaRef ds:uri="http://schemas.openxmlformats.org/package/2006/metadata/core-properties"/>
-    <ds:schemaRef ds:uri="http://purl.org/dc/terms/"/>
+    <ds:schemaRef ds:uri="http://schemas.microsoft.com/sharepoint/v3/contenttype/forms"/>
   </ds:schemaRefs>
 </ds:datastoreItem>
 </file>
@@ -10816,9 +10799,16 @@
 </file>
 
 <file path=customXml/itemProps3.xml><?xml version="1.0" encoding="utf-8"?>
-<ds:datastoreItem xmlns:ds="http://schemas.openxmlformats.org/officeDocument/2006/customXml" ds:itemID="{19036592-6B47-4660-8F42-1BC6503C71A9}">
+<ds:datastoreItem xmlns:ds="http://schemas.openxmlformats.org/officeDocument/2006/customXml" ds:itemID="{87EC307F-6696-4FF8-8677-D3EF1D29AE74}">
   <ds:schemaRefs>
-    <ds:schemaRef ds:uri="http://schemas.microsoft.com/sharepoint/v3/contenttype/forms"/>
+    <ds:schemaRef ds:uri="http://purl.org/dc/dcmitype/"/>
+    <ds:schemaRef ds:uri="http://purl.org/dc/terms/"/>
+    <ds:schemaRef ds:uri="http://purl.org/dc/elements/1.1/"/>
+    <ds:schemaRef ds:uri="http://schemas.microsoft.com/office/2006/documentManagement/types"/>
+    <ds:schemaRef ds:uri="http://schemas.microsoft.com/office/2006/metadata/properties"/>
+    <ds:schemaRef ds:uri="http://schemas.microsoft.com/office/infopath/2007/PartnerControls"/>
+    <ds:schemaRef ds:uri="http://schemas.openxmlformats.org/package/2006/metadata/core-properties"/>
+    <ds:schemaRef ds:uri="http://www.w3.org/XML/1998/namespace"/>
   </ds:schemaRefs>
 </ds:datastoreItem>
 </file>
</xml_diff>